<commit_message>
Update the Zowe architecture to remove JMON
</commit_message>
<xml_diff>
--- a/docs/images/common/zowe-architecture.pptx
+++ b/docs/images/common/zowe-architecture.pptx
@@ -259,7 +259,7 @@
           <a:p>
             <a:fld id="{B1DB1BE8-3F77-D044-8747-9903AC5CD864}" type="datetimeFigureOut">
               <a:rPr lang="en-US" smtClean="0"/>
-              <a:t>2/8/2019</a:t>
+              <a:t>2/12/2019</a:t>
             </a:fld>
             <a:endParaRPr lang="en-US"/>
           </a:p>
@@ -457,7 +457,7 @@
           <a:p>
             <a:fld id="{B1DB1BE8-3F77-D044-8747-9903AC5CD864}" type="datetimeFigureOut">
               <a:rPr lang="en-US" smtClean="0"/>
-              <a:t>2/8/2019</a:t>
+              <a:t>2/12/2019</a:t>
             </a:fld>
             <a:endParaRPr lang="en-US"/>
           </a:p>
@@ -665,7 +665,7 @@
           <a:p>
             <a:fld id="{B1DB1BE8-3F77-D044-8747-9903AC5CD864}" type="datetimeFigureOut">
               <a:rPr lang="en-US" smtClean="0"/>
-              <a:t>2/8/2019</a:t>
+              <a:t>2/12/2019</a:t>
             </a:fld>
             <a:endParaRPr lang="en-US"/>
           </a:p>
@@ -863,7 +863,7 @@
           <a:p>
             <a:fld id="{B1DB1BE8-3F77-D044-8747-9903AC5CD864}" type="datetimeFigureOut">
               <a:rPr lang="en-US" smtClean="0"/>
-              <a:t>2/8/2019</a:t>
+              <a:t>2/12/2019</a:t>
             </a:fld>
             <a:endParaRPr lang="en-US"/>
           </a:p>
@@ -1138,7 +1138,7 @@
           <a:p>
             <a:fld id="{B1DB1BE8-3F77-D044-8747-9903AC5CD864}" type="datetimeFigureOut">
               <a:rPr lang="en-US" smtClean="0"/>
-              <a:t>2/8/2019</a:t>
+              <a:t>2/12/2019</a:t>
             </a:fld>
             <a:endParaRPr lang="en-US"/>
           </a:p>
@@ -1403,7 +1403,7 @@
           <a:p>
             <a:fld id="{B1DB1BE8-3F77-D044-8747-9903AC5CD864}" type="datetimeFigureOut">
               <a:rPr lang="en-US" smtClean="0"/>
-              <a:t>2/8/2019</a:t>
+              <a:t>2/12/2019</a:t>
             </a:fld>
             <a:endParaRPr lang="en-US"/>
           </a:p>
@@ -1815,7 +1815,7 @@
           <a:p>
             <a:fld id="{B1DB1BE8-3F77-D044-8747-9903AC5CD864}" type="datetimeFigureOut">
               <a:rPr lang="en-US" smtClean="0"/>
-              <a:t>2/8/2019</a:t>
+              <a:t>2/12/2019</a:t>
             </a:fld>
             <a:endParaRPr lang="en-US"/>
           </a:p>
@@ -1956,7 +1956,7 @@
           <a:p>
             <a:fld id="{B1DB1BE8-3F77-D044-8747-9903AC5CD864}" type="datetimeFigureOut">
               <a:rPr lang="en-US" smtClean="0"/>
-              <a:t>2/8/2019</a:t>
+              <a:t>2/12/2019</a:t>
             </a:fld>
             <a:endParaRPr lang="en-US"/>
           </a:p>
@@ -2069,7 +2069,7 @@
           <a:p>
             <a:fld id="{B1DB1BE8-3F77-D044-8747-9903AC5CD864}" type="datetimeFigureOut">
               <a:rPr lang="en-US" smtClean="0"/>
-              <a:t>2/8/2019</a:t>
+              <a:t>2/12/2019</a:t>
             </a:fld>
             <a:endParaRPr lang="en-US"/>
           </a:p>
@@ -2380,7 +2380,7 @@
           <a:p>
             <a:fld id="{B1DB1BE8-3F77-D044-8747-9903AC5CD864}" type="datetimeFigureOut">
               <a:rPr lang="en-US" smtClean="0"/>
-              <a:t>2/8/2019</a:t>
+              <a:t>2/12/2019</a:t>
             </a:fld>
             <a:endParaRPr lang="en-US"/>
           </a:p>
@@ -2668,7 +2668,7 @@
           <a:p>
             <a:fld id="{B1DB1BE8-3F77-D044-8747-9903AC5CD864}" type="datetimeFigureOut">
               <a:rPr lang="en-US" smtClean="0"/>
-              <a:t>2/8/2019</a:t>
+              <a:t>2/12/2019</a:t>
             </a:fld>
             <a:endParaRPr lang="en-US"/>
           </a:p>
@@ -2909,7 +2909,7 @@
           <a:p>
             <a:fld id="{B1DB1BE8-3F77-D044-8747-9903AC5CD864}" type="datetimeFigureOut">
               <a:rPr lang="en-US" smtClean="0"/>
-              <a:t>2/8/2019</a:t>
+              <a:t>2/12/2019</a:t>
             </a:fld>
             <a:endParaRPr lang="en-US"/>
           </a:p>
@@ -5232,50 +5232,6 @@
       </p:sp>
       <p:cxnSp>
         <p:nvCxnSpPr>
-          <p:cNvPr id="63" name="Elbow Connector 62">
-            <a:extLst>
-              <a:ext uri="{FF2B5EF4-FFF2-40B4-BE49-F238E27FC236}">
-                <a16:creationId xmlns:a16="http://schemas.microsoft.com/office/drawing/2014/main" id="{7D8D3EAB-DFC7-9B42-BA25-E16D4D26B53E}"/>
-              </a:ext>
-            </a:extLst>
-          </p:cNvPr>
-          <p:cNvCxnSpPr>
-            <a:cxnSpLocks/>
-          </p:cNvCxnSpPr>
-          <p:nvPr/>
-        </p:nvCxnSpPr>
-        <p:spPr>
-          <a:xfrm flipV="1">
-            <a:off x="5988816" y="3873644"/>
-            <a:ext cx="1003655" cy="285881"/>
-          </a:xfrm>
-          <a:prstGeom prst="bentConnector3">
-            <a:avLst>
-              <a:gd name="adj1" fmla="val 50000"/>
-            </a:avLst>
-          </a:prstGeom>
-          <a:ln>
-            <a:headEnd type="triangle"/>
-            <a:tailEnd type="triangle"/>
-          </a:ln>
-        </p:spPr>
-        <p:style>
-          <a:lnRef idx="1">
-            <a:schemeClr val="accent1"/>
-          </a:lnRef>
-          <a:fillRef idx="0">
-            <a:schemeClr val="accent1"/>
-          </a:fillRef>
-          <a:effectRef idx="0">
-            <a:schemeClr val="accent1"/>
-          </a:effectRef>
-          <a:fontRef idx="minor">
-            <a:schemeClr val="tx1"/>
-          </a:fontRef>
-        </p:style>
-      </p:cxnSp>
-      <p:cxnSp>
-        <p:nvCxnSpPr>
           <p:cNvPr id="65" name="Elbow Connector 64">
             <a:extLst>
               <a:ext uri="{FF2B5EF4-FFF2-40B4-BE49-F238E27FC236}">
@@ -6372,68 +6328,6 @@
               <a:t>Zowe-install.apf-server.yaml</a:t>
             </a:r>
             <a:endParaRPr lang="en-US" sz="1200" b="1" dirty="0"/>
-          </a:p>
-        </p:txBody>
-      </p:sp>
-      <p:sp>
-        <p:nvSpPr>
-          <p:cNvPr id="66" name="Rectangle 65">
-            <a:extLst>
-              <a:ext uri="{FF2B5EF4-FFF2-40B4-BE49-F238E27FC236}">
-                <a16:creationId xmlns:a16="http://schemas.microsoft.com/office/drawing/2014/main" id="{2F710D5B-4AB8-124B-8753-D88640B44EDE}"/>
-              </a:ext>
-            </a:extLst>
-          </p:cNvPr>
-          <p:cNvSpPr/>
-          <p:nvPr/>
-        </p:nvSpPr>
-        <p:spPr>
-          <a:xfrm>
-            <a:off x="7013928" y="3752431"/>
-            <a:ext cx="634760" cy="296879"/>
-          </a:xfrm>
-          <a:prstGeom prst="rect">
-            <a:avLst/>
-          </a:prstGeom>
-          <a:solidFill>
-            <a:schemeClr val="accent4">
-              <a:lumMod val="20000"/>
-              <a:lumOff val="80000"/>
-            </a:schemeClr>
-          </a:solidFill>
-        </p:spPr>
-        <p:style>
-          <a:lnRef idx="2">
-            <a:schemeClr val="accent1">
-              <a:shade val="50000"/>
-            </a:schemeClr>
-          </a:lnRef>
-          <a:fillRef idx="1">
-            <a:schemeClr val="accent1"/>
-          </a:fillRef>
-          <a:effectRef idx="0">
-            <a:schemeClr val="accent1"/>
-          </a:effectRef>
-          <a:fontRef idx="minor">
-            <a:schemeClr val="lt1"/>
-          </a:fontRef>
-        </p:style>
-        <p:txBody>
-          <a:bodyPr rtlCol="0" anchor="ctr"/>
-          <a:lstStyle/>
-          <a:p>
-            <a:pPr algn="ctr"/>
-            <a:r>
-              <a:rPr lang="en-US" sz="1000" dirty="0">
-                <a:solidFill>
-                  <a:schemeClr val="tx1"/>
-                </a:solidFill>
-                <a:latin typeface="Menlo" panose="020B0609030804020204" pitchFamily="49" charset="0"/>
-                <a:ea typeface="Menlo" panose="020B0609030804020204" pitchFamily="49" charset="0"/>
-                <a:cs typeface="Menlo" panose="020B0609030804020204" pitchFamily="49" charset="0"/>
-              </a:rPr>
-              <a:t>JMON</a:t>
-            </a:r>
           </a:p>
         </p:txBody>
       </p:sp>

</xml_diff>

<commit_message>
#388 Change ZISSRV01 to ZWESIS01 in the architecture diagram
</commit_message>
<xml_diff>
--- a/docs/images/common/zowe-architecture.pptx
+++ b/docs/images/common/zowe-architecture.pptx
@@ -259,7 +259,7 @@
           <a:p>
             <a:fld id="{B1DB1BE8-3F77-D044-8747-9903AC5CD864}" type="datetimeFigureOut">
               <a:rPr lang="en-US" smtClean="0"/>
-              <a:t>2/12/2019</a:t>
+              <a:t>2/22/2019</a:t>
             </a:fld>
             <a:endParaRPr lang="en-US"/>
           </a:p>
@@ -457,7 +457,7 @@
           <a:p>
             <a:fld id="{B1DB1BE8-3F77-D044-8747-9903AC5CD864}" type="datetimeFigureOut">
               <a:rPr lang="en-US" smtClean="0"/>
-              <a:t>2/12/2019</a:t>
+              <a:t>2/22/2019</a:t>
             </a:fld>
             <a:endParaRPr lang="en-US"/>
           </a:p>
@@ -665,7 +665,7 @@
           <a:p>
             <a:fld id="{B1DB1BE8-3F77-D044-8747-9903AC5CD864}" type="datetimeFigureOut">
               <a:rPr lang="en-US" smtClean="0"/>
-              <a:t>2/12/2019</a:t>
+              <a:t>2/22/2019</a:t>
             </a:fld>
             <a:endParaRPr lang="en-US"/>
           </a:p>
@@ -863,7 +863,7 @@
           <a:p>
             <a:fld id="{B1DB1BE8-3F77-D044-8747-9903AC5CD864}" type="datetimeFigureOut">
               <a:rPr lang="en-US" smtClean="0"/>
-              <a:t>2/12/2019</a:t>
+              <a:t>2/22/2019</a:t>
             </a:fld>
             <a:endParaRPr lang="en-US"/>
           </a:p>
@@ -1138,7 +1138,7 @@
           <a:p>
             <a:fld id="{B1DB1BE8-3F77-D044-8747-9903AC5CD864}" type="datetimeFigureOut">
               <a:rPr lang="en-US" smtClean="0"/>
-              <a:t>2/12/2019</a:t>
+              <a:t>2/22/2019</a:t>
             </a:fld>
             <a:endParaRPr lang="en-US"/>
           </a:p>
@@ -1403,7 +1403,7 @@
           <a:p>
             <a:fld id="{B1DB1BE8-3F77-D044-8747-9903AC5CD864}" type="datetimeFigureOut">
               <a:rPr lang="en-US" smtClean="0"/>
-              <a:t>2/12/2019</a:t>
+              <a:t>2/22/2019</a:t>
             </a:fld>
             <a:endParaRPr lang="en-US"/>
           </a:p>
@@ -1815,7 +1815,7 @@
           <a:p>
             <a:fld id="{B1DB1BE8-3F77-D044-8747-9903AC5CD864}" type="datetimeFigureOut">
               <a:rPr lang="en-US" smtClean="0"/>
-              <a:t>2/12/2019</a:t>
+              <a:t>2/22/2019</a:t>
             </a:fld>
             <a:endParaRPr lang="en-US"/>
           </a:p>
@@ -1956,7 +1956,7 @@
           <a:p>
             <a:fld id="{B1DB1BE8-3F77-D044-8747-9903AC5CD864}" type="datetimeFigureOut">
               <a:rPr lang="en-US" smtClean="0"/>
-              <a:t>2/12/2019</a:t>
+              <a:t>2/22/2019</a:t>
             </a:fld>
             <a:endParaRPr lang="en-US"/>
           </a:p>
@@ -2069,7 +2069,7 @@
           <a:p>
             <a:fld id="{B1DB1BE8-3F77-D044-8747-9903AC5CD864}" type="datetimeFigureOut">
               <a:rPr lang="en-US" smtClean="0"/>
-              <a:t>2/12/2019</a:t>
+              <a:t>2/22/2019</a:t>
             </a:fld>
             <a:endParaRPr lang="en-US"/>
           </a:p>
@@ -2380,7 +2380,7 @@
           <a:p>
             <a:fld id="{B1DB1BE8-3F77-D044-8747-9903AC5CD864}" type="datetimeFigureOut">
               <a:rPr lang="en-US" smtClean="0"/>
-              <a:t>2/12/2019</a:t>
+              <a:t>2/22/2019</a:t>
             </a:fld>
             <a:endParaRPr lang="en-US"/>
           </a:p>
@@ -2668,7 +2668,7 @@
           <a:p>
             <a:fld id="{B1DB1BE8-3F77-D044-8747-9903AC5CD864}" type="datetimeFigureOut">
               <a:rPr lang="en-US" smtClean="0"/>
-              <a:t>2/12/2019</a:t>
+              <a:t>2/22/2019</a:t>
             </a:fld>
             <a:endParaRPr lang="en-US"/>
           </a:p>
@@ -2909,7 +2909,7 @@
           <a:p>
             <a:fld id="{B1DB1BE8-3F77-D044-8747-9903AC5CD864}" type="datetimeFigureOut">
               <a:rPr lang="en-US" smtClean="0"/>
-              <a:t>2/12/2019</a:t>
+              <a:t>2/22/2019</a:t>
             </a:fld>
             <a:endParaRPr lang="en-US"/>
           </a:p>
@@ -4500,7 +4500,7 @@
                 <a:ea typeface="Menlo" panose="020B0609030804020204" pitchFamily="49" charset="0"/>
                 <a:cs typeface="Menlo" panose="020B0609030804020204" pitchFamily="49" charset="0"/>
               </a:rPr>
-              <a:t>ZISSRV01</a:t>
+              <a:t>ZWESIS01</a:t>
             </a:r>
           </a:p>
           <a:p>
@@ -4514,29 +4514,7 @@
                 <a:ea typeface="Menlo" panose="020B0609030804020204" pitchFamily="49" charset="0"/>
                 <a:cs typeface="Menlo" panose="020B0609030804020204" pitchFamily="49" charset="0"/>
               </a:rPr>
-              <a:t>APF </a:t>
-            </a:r>
-            <a:r>
-              <a:rPr lang="en-US" sz="1000" dirty="0" err="1">
-                <a:solidFill>
-                  <a:schemeClr val="tx1"/>
-                </a:solidFill>
-                <a:latin typeface="Menlo" panose="020B0609030804020204" pitchFamily="49" charset="0"/>
-                <a:ea typeface="Menlo" panose="020B0609030804020204" pitchFamily="49" charset="0"/>
-                <a:cs typeface="Menlo" panose="020B0609030804020204" pitchFamily="49" charset="0"/>
-              </a:rPr>
-              <a:t>Auth</a:t>
-            </a:r>
-            <a:r>
-              <a:rPr lang="en-US" sz="1000" dirty="0">
-                <a:solidFill>
-                  <a:schemeClr val="tx1"/>
-                </a:solidFill>
-                <a:latin typeface="Menlo" panose="020B0609030804020204" pitchFamily="49" charset="0"/>
-                <a:ea typeface="Menlo" panose="020B0609030804020204" pitchFamily="49" charset="0"/>
-                <a:cs typeface="Menlo" panose="020B0609030804020204" pitchFamily="49" charset="0"/>
-              </a:rPr>
-              <a:t> load Lib</a:t>
+              <a:t>APF Auth load Lib</a:t>
             </a:r>
           </a:p>
         </p:txBody>

</xml_diff>

<commit_message>
#388 Change ZISSRV01 to ZWESIS01 in the architecture diagram (#389)
Signed-off-by: Jack (T.) Jia <jack-tiefeng.jia@ibm.com>
</commit_message>
<xml_diff>
--- a/docs/images/common/zowe-architecture.pptx
+++ b/docs/images/common/zowe-architecture.pptx
@@ -259,7 +259,7 @@
           <a:p>
             <a:fld id="{B1DB1BE8-3F77-D044-8747-9903AC5CD864}" type="datetimeFigureOut">
               <a:rPr lang="en-US" smtClean="0"/>
-              <a:t>2/12/2019</a:t>
+              <a:t>2/22/2019</a:t>
             </a:fld>
             <a:endParaRPr lang="en-US"/>
           </a:p>
@@ -457,7 +457,7 @@
           <a:p>
             <a:fld id="{B1DB1BE8-3F77-D044-8747-9903AC5CD864}" type="datetimeFigureOut">
               <a:rPr lang="en-US" smtClean="0"/>
-              <a:t>2/12/2019</a:t>
+              <a:t>2/22/2019</a:t>
             </a:fld>
             <a:endParaRPr lang="en-US"/>
           </a:p>
@@ -665,7 +665,7 @@
           <a:p>
             <a:fld id="{B1DB1BE8-3F77-D044-8747-9903AC5CD864}" type="datetimeFigureOut">
               <a:rPr lang="en-US" smtClean="0"/>
-              <a:t>2/12/2019</a:t>
+              <a:t>2/22/2019</a:t>
             </a:fld>
             <a:endParaRPr lang="en-US"/>
           </a:p>
@@ -863,7 +863,7 @@
           <a:p>
             <a:fld id="{B1DB1BE8-3F77-D044-8747-9903AC5CD864}" type="datetimeFigureOut">
               <a:rPr lang="en-US" smtClean="0"/>
-              <a:t>2/12/2019</a:t>
+              <a:t>2/22/2019</a:t>
             </a:fld>
             <a:endParaRPr lang="en-US"/>
           </a:p>
@@ -1138,7 +1138,7 @@
           <a:p>
             <a:fld id="{B1DB1BE8-3F77-D044-8747-9903AC5CD864}" type="datetimeFigureOut">
               <a:rPr lang="en-US" smtClean="0"/>
-              <a:t>2/12/2019</a:t>
+              <a:t>2/22/2019</a:t>
             </a:fld>
             <a:endParaRPr lang="en-US"/>
           </a:p>
@@ -1403,7 +1403,7 @@
           <a:p>
             <a:fld id="{B1DB1BE8-3F77-D044-8747-9903AC5CD864}" type="datetimeFigureOut">
               <a:rPr lang="en-US" smtClean="0"/>
-              <a:t>2/12/2019</a:t>
+              <a:t>2/22/2019</a:t>
             </a:fld>
             <a:endParaRPr lang="en-US"/>
           </a:p>
@@ -1815,7 +1815,7 @@
           <a:p>
             <a:fld id="{B1DB1BE8-3F77-D044-8747-9903AC5CD864}" type="datetimeFigureOut">
               <a:rPr lang="en-US" smtClean="0"/>
-              <a:t>2/12/2019</a:t>
+              <a:t>2/22/2019</a:t>
             </a:fld>
             <a:endParaRPr lang="en-US"/>
           </a:p>
@@ -1956,7 +1956,7 @@
           <a:p>
             <a:fld id="{B1DB1BE8-3F77-D044-8747-9903AC5CD864}" type="datetimeFigureOut">
               <a:rPr lang="en-US" smtClean="0"/>
-              <a:t>2/12/2019</a:t>
+              <a:t>2/22/2019</a:t>
             </a:fld>
             <a:endParaRPr lang="en-US"/>
           </a:p>
@@ -2069,7 +2069,7 @@
           <a:p>
             <a:fld id="{B1DB1BE8-3F77-D044-8747-9903AC5CD864}" type="datetimeFigureOut">
               <a:rPr lang="en-US" smtClean="0"/>
-              <a:t>2/12/2019</a:t>
+              <a:t>2/22/2019</a:t>
             </a:fld>
             <a:endParaRPr lang="en-US"/>
           </a:p>
@@ -2380,7 +2380,7 @@
           <a:p>
             <a:fld id="{B1DB1BE8-3F77-D044-8747-9903AC5CD864}" type="datetimeFigureOut">
               <a:rPr lang="en-US" smtClean="0"/>
-              <a:t>2/12/2019</a:t>
+              <a:t>2/22/2019</a:t>
             </a:fld>
             <a:endParaRPr lang="en-US"/>
           </a:p>
@@ -2668,7 +2668,7 @@
           <a:p>
             <a:fld id="{B1DB1BE8-3F77-D044-8747-9903AC5CD864}" type="datetimeFigureOut">
               <a:rPr lang="en-US" smtClean="0"/>
-              <a:t>2/12/2019</a:t>
+              <a:t>2/22/2019</a:t>
             </a:fld>
             <a:endParaRPr lang="en-US"/>
           </a:p>
@@ -2909,7 +2909,7 @@
           <a:p>
             <a:fld id="{B1DB1BE8-3F77-D044-8747-9903AC5CD864}" type="datetimeFigureOut">
               <a:rPr lang="en-US" smtClean="0"/>
-              <a:t>2/12/2019</a:t>
+              <a:t>2/22/2019</a:t>
             </a:fld>
             <a:endParaRPr lang="en-US"/>
           </a:p>
@@ -4500,7 +4500,7 @@
                 <a:ea typeface="Menlo" panose="020B0609030804020204" pitchFamily="49" charset="0"/>
                 <a:cs typeface="Menlo" panose="020B0609030804020204" pitchFamily="49" charset="0"/>
               </a:rPr>
-              <a:t>ZISSRV01</a:t>
+              <a:t>ZWESIS01</a:t>
             </a:r>
           </a:p>
           <a:p>
@@ -4514,29 +4514,7 @@
                 <a:ea typeface="Menlo" panose="020B0609030804020204" pitchFamily="49" charset="0"/>
                 <a:cs typeface="Menlo" panose="020B0609030804020204" pitchFamily="49" charset="0"/>
               </a:rPr>
-              <a:t>APF </a:t>
-            </a:r>
-            <a:r>
-              <a:rPr lang="en-US" sz="1000" dirty="0" err="1">
-                <a:solidFill>
-                  <a:schemeClr val="tx1"/>
-                </a:solidFill>
-                <a:latin typeface="Menlo" panose="020B0609030804020204" pitchFamily="49" charset="0"/>
-                <a:ea typeface="Menlo" panose="020B0609030804020204" pitchFamily="49" charset="0"/>
-                <a:cs typeface="Menlo" panose="020B0609030804020204" pitchFamily="49" charset="0"/>
-              </a:rPr>
-              <a:t>Auth</a:t>
-            </a:r>
-            <a:r>
-              <a:rPr lang="en-US" sz="1000" dirty="0">
-                <a:solidFill>
-                  <a:schemeClr val="tx1"/>
-                </a:solidFill>
-                <a:latin typeface="Menlo" panose="020B0609030804020204" pitchFamily="49" charset="0"/>
-                <a:ea typeface="Menlo" panose="020B0609030804020204" pitchFamily="49" charset="0"/>
-                <a:cs typeface="Menlo" panose="020B0609030804020204" pitchFamily="49" charset="0"/>
-              </a:rPr>
-              <a:t> load Lib</a:t>
+              <a:t>APF Auth load Lib</a:t>
             </a:r>
           </a:p>
         </p:txBody>

</xml_diff>

<commit_message>
update docs-staging from master (#390)
* fix title typo

* Use stop command to terminate cross-memory server

Signed-off-by: Irek Fakhrutdinov <ifakhrutdinov@rocketsoftware.com>

* #388 Change ZISSRV01 to ZWESIS01 in the architecture diagram (#389)
</commit_message>
<xml_diff>
--- a/docs/images/common/zowe-architecture.pptx
+++ b/docs/images/common/zowe-architecture.pptx
@@ -259,7 +259,7 @@
           <a:p>
             <a:fld id="{B1DB1BE8-3F77-D044-8747-9903AC5CD864}" type="datetimeFigureOut">
               <a:rPr lang="en-US" smtClean="0"/>
-              <a:t>2/12/2019</a:t>
+              <a:t>2/22/2019</a:t>
             </a:fld>
             <a:endParaRPr lang="en-US"/>
           </a:p>
@@ -457,7 +457,7 @@
           <a:p>
             <a:fld id="{B1DB1BE8-3F77-D044-8747-9903AC5CD864}" type="datetimeFigureOut">
               <a:rPr lang="en-US" smtClean="0"/>
-              <a:t>2/12/2019</a:t>
+              <a:t>2/22/2019</a:t>
             </a:fld>
             <a:endParaRPr lang="en-US"/>
           </a:p>
@@ -665,7 +665,7 @@
           <a:p>
             <a:fld id="{B1DB1BE8-3F77-D044-8747-9903AC5CD864}" type="datetimeFigureOut">
               <a:rPr lang="en-US" smtClean="0"/>
-              <a:t>2/12/2019</a:t>
+              <a:t>2/22/2019</a:t>
             </a:fld>
             <a:endParaRPr lang="en-US"/>
           </a:p>
@@ -863,7 +863,7 @@
           <a:p>
             <a:fld id="{B1DB1BE8-3F77-D044-8747-9903AC5CD864}" type="datetimeFigureOut">
               <a:rPr lang="en-US" smtClean="0"/>
-              <a:t>2/12/2019</a:t>
+              <a:t>2/22/2019</a:t>
             </a:fld>
             <a:endParaRPr lang="en-US"/>
           </a:p>
@@ -1138,7 +1138,7 @@
           <a:p>
             <a:fld id="{B1DB1BE8-3F77-D044-8747-9903AC5CD864}" type="datetimeFigureOut">
               <a:rPr lang="en-US" smtClean="0"/>
-              <a:t>2/12/2019</a:t>
+              <a:t>2/22/2019</a:t>
             </a:fld>
             <a:endParaRPr lang="en-US"/>
           </a:p>
@@ -1403,7 +1403,7 @@
           <a:p>
             <a:fld id="{B1DB1BE8-3F77-D044-8747-9903AC5CD864}" type="datetimeFigureOut">
               <a:rPr lang="en-US" smtClean="0"/>
-              <a:t>2/12/2019</a:t>
+              <a:t>2/22/2019</a:t>
             </a:fld>
             <a:endParaRPr lang="en-US"/>
           </a:p>
@@ -1815,7 +1815,7 @@
           <a:p>
             <a:fld id="{B1DB1BE8-3F77-D044-8747-9903AC5CD864}" type="datetimeFigureOut">
               <a:rPr lang="en-US" smtClean="0"/>
-              <a:t>2/12/2019</a:t>
+              <a:t>2/22/2019</a:t>
             </a:fld>
             <a:endParaRPr lang="en-US"/>
           </a:p>
@@ -1956,7 +1956,7 @@
           <a:p>
             <a:fld id="{B1DB1BE8-3F77-D044-8747-9903AC5CD864}" type="datetimeFigureOut">
               <a:rPr lang="en-US" smtClean="0"/>
-              <a:t>2/12/2019</a:t>
+              <a:t>2/22/2019</a:t>
             </a:fld>
             <a:endParaRPr lang="en-US"/>
           </a:p>
@@ -2069,7 +2069,7 @@
           <a:p>
             <a:fld id="{B1DB1BE8-3F77-D044-8747-9903AC5CD864}" type="datetimeFigureOut">
               <a:rPr lang="en-US" smtClean="0"/>
-              <a:t>2/12/2019</a:t>
+              <a:t>2/22/2019</a:t>
             </a:fld>
             <a:endParaRPr lang="en-US"/>
           </a:p>
@@ -2380,7 +2380,7 @@
           <a:p>
             <a:fld id="{B1DB1BE8-3F77-D044-8747-9903AC5CD864}" type="datetimeFigureOut">
               <a:rPr lang="en-US" smtClean="0"/>
-              <a:t>2/12/2019</a:t>
+              <a:t>2/22/2019</a:t>
             </a:fld>
             <a:endParaRPr lang="en-US"/>
           </a:p>
@@ -2668,7 +2668,7 @@
           <a:p>
             <a:fld id="{B1DB1BE8-3F77-D044-8747-9903AC5CD864}" type="datetimeFigureOut">
               <a:rPr lang="en-US" smtClean="0"/>
-              <a:t>2/12/2019</a:t>
+              <a:t>2/22/2019</a:t>
             </a:fld>
             <a:endParaRPr lang="en-US"/>
           </a:p>
@@ -2909,7 +2909,7 @@
           <a:p>
             <a:fld id="{B1DB1BE8-3F77-D044-8747-9903AC5CD864}" type="datetimeFigureOut">
               <a:rPr lang="en-US" smtClean="0"/>
-              <a:t>2/12/2019</a:t>
+              <a:t>2/22/2019</a:t>
             </a:fld>
             <a:endParaRPr lang="en-US"/>
           </a:p>
@@ -4500,7 +4500,7 @@
                 <a:ea typeface="Menlo" panose="020B0609030804020204" pitchFamily="49" charset="0"/>
                 <a:cs typeface="Menlo" panose="020B0609030804020204" pitchFamily="49" charset="0"/>
               </a:rPr>
-              <a:t>ZISSRV01</a:t>
+              <a:t>ZWESIS01</a:t>
             </a:r>
           </a:p>
           <a:p>
@@ -4514,29 +4514,7 @@
                 <a:ea typeface="Menlo" panose="020B0609030804020204" pitchFamily="49" charset="0"/>
                 <a:cs typeface="Menlo" panose="020B0609030804020204" pitchFamily="49" charset="0"/>
               </a:rPr>
-              <a:t>APF </a:t>
-            </a:r>
-            <a:r>
-              <a:rPr lang="en-US" sz="1000" dirty="0" err="1">
-                <a:solidFill>
-                  <a:schemeClr val="tx1"/>
-                </a:solidFill>
-                <a:latin typeface="Menlo" panose="020B0609030804020204" pitchFamily="49" charset="0"/>
-                <a:ea typeface="Menlo" panose="020B0609030804020204" pitchFamily="49" charset="0"/>
-                <a:cs typeface="Menlo" panose="020B0609030804020204" pitchFamily="49" charset="0"/>
-              </a:rPr>
-              <a:t>Auth</a:t>
-            </a:r>
-            <a:r>
-              <a:rPr lang="en-US" sz="1000" dirty="0">
-                <a:solidFill>
-                  <a:schemeClr val="tx1"/>
-                </a:solidFill>
-                <a:latin typeface="Menlo" panose="020B0609030804020204" pitchFamily="49" charset="0"/>
-                <a:ea typeface="Menlo" panose="020B0609030804020204" pitchFamily="49" charset="0"/>
-                <a:cs typeface="Menlo" panose="020B0609030804020204" pitchFamily="49" charset="0"/>
-              </a:rPr>
-              <a:t> load Lib</a:t>
+              <a:t>APF Auth load Lib</a:t>
             </a:r>
           </a:p>
         </p:txBody>

</xml_diff>

<commit_message>
Fix a typo in the architecture diagram
Signed-off-by: nannanli <nannanli@cn.ibm.com>
</commit_message>
<xml_diff>
--- a/docs/images/common/zowe-architecture.pptx
+++ b/docs/images/common/zowe-architecture.pptx
@@ -259,7 +259,7 @@
           <a:p>
             <a:fld id="{B1DB1BE8-3F77-D044-8747-9903AC5CD864}" type="datetimeFigureOut">
               <a:rPr lang="en-US" smtClean="0"/>
-              <a:t>6/21/19</a:t>
+              <a:t>7/25/19</a:t>
             </a:fld>
             <a:endParaRPr lang="en-US"/>
           </a:p>
@@ -457,7 +457,7 @@
           <a:p>
             <a:fld id="{B1DB1BE8-3F77-D044-8747-9903AC5CD864}" type="datetimeFigureOut">
               <a:rPr lang="en-US" smtClean="0"/>
-              <a:t>6/21/19</a:t>
+              <a:t>7/25/19</a:t>
             </a:fld>
             <a:endParaRPr lang="en-US"/>
           </a:p>
@@ -665,7 +665,7 @@
           <a:p>
             <a:fld id="{B1DB1BE8-3F77-D044-8747-9903AC5CD864}" type="datetimeFigureOut">
               <a:rPr lang="en-US" smtClean="0"/>
-              <a:t>6/21/19</a:t>
+              <a:t>7/25/19</a:t>
             </a:fld>
             <a:endParaRPr lang="en-US"/>
           </a:p>
@@ -863,7 +863,7 @@
           <a:p>
             <a:fld id="{B1DB1BE8-3F77-D044-8747-9903AC5CD864}" type="datetimeFigureOut">
               <a:rPr lang="en-US" smtClean="0"/>
-              <a:t>6/21/19</a:t>
+              <a:t>7/25/19</a:t>
             </a:fld>
             <a:endParaRPr lang="en-US"/>
           </a:p>
@@ -1138,7 +1138,7 @@
           <a:p>
             <a:fld id="{B1DB1BE8-3F77-D044-8747-9903AC5CD864}" type="datetimeFigureOut">
               <a:rPr lang="en-US" smtClean="0"/>
-              <a:t>6/21/19</a:t>
+              <a:t>7/25/19</a:t>
             </a:fld>
             <a:endParaRPr lang="en-US"/>
           </a:p>
@@ -1403,7 +1403,7 @@
           <a:p>
             <a:fld id="{B1DB1BE8-3F77-D044-8747-9903AC5CD864}" type="datetimeFigureOut">
               <a:rPr lang="en-US" smtClean="0"/>
-              <a:t>6/21/19</a:t>
+              <a:t>7/25/19</a:t>
             </a:fld>
             <a:endParaRPr lang="en-US"/>
           </a:p>
@@ -1815,7 +1815,7 @@
           <a:p>
             <a:fld id="{B1DB1BE8-3F77-D044-8747-9903AC5CD864}" type="datetimeFigureOut">
               <a:rPr lang="en-US" smtClean="0"/>
-              <a:t>6/21/19</a:t>
+              <a:t>7/25/19</a:t>
             </a:fld>
             <a:endParaRPr lang="en-US"/>
           </a:p>
@@ -1956,7 +1956,7 @@
           <a:p>
             <a:fld id="{B1DB1BE8-3F77-D044-8747-9903AC5CD864}" type="datetimeFigureOut">
               <a:rPr lang="en-US" smtClean="0"/>
-              <a:t>6/21/19</a:t>
+              <a:t>7/25/19</a:t>
             </a:fld>
             <a:endParaRPr lang="en-US"/>
           </a:p>
@@ -2069,7 +2069,7 @@
           <a:p>
             <a:fld id="{B1DB1BE8-3F77-D044-8747-9903AC5CD864}" type="datetimeFigureOut">
               <a:rPr lang="en-US" smtClean="0"/>
-              <a:t>6/21/19</a:t>
+              <a:t>7/25/19</a:t>
             </a:fld>
             <a:endParaRPr lang="en-US"/>
           </a:p>
@@ -2380,7 +2380,7 @@
           <a:p>
             <a:fld id="{B1DB1BE8-3F77-D044-8747-9903AC5CD864}" type="datetimeFigureOut">
               <a:rPr lang="en-US" smtClean="0"/>
-              <a:t>6/21/19</a:t>
+              <a:t>7/25/19</a:t>
             </a:fld>
             <a:endParaRPr lang="en-US"/>
           </a:p>
@@ -2668,7 +2668,7 @@
           <a:p>
             <a:fld id="{B1DB1BE8-3F77-D044-8747-9903AC5CD864}" type="datetimeFigureOut">
               <a:rPr lang="en-US" smtClean="0"/>
-              <a:t>6/21/19</a:t>
+              <a:t>7/25/19</a:t>
             </a:fld>
             <a:endParaRPr lang="en-US"/>
           </a:p>
@@ -2909,7 +2909,7 @@
           <a:p>
             <a:fld id="{B1DB1BE8-3F77-D044-8747-9903AC5CD864}" type="datetimeFigureOut">
               <a:rPr lang="en-US" smtClean="0"/>
-              <a:t>6/21/19</a:t>
+              <a:t>7/25/19</a:t>
             </a:fld>
             <a:endParaRPr lang="en-US"/>
           </a:p>
@@ -3340,7 +3340,7 @@
         </p:nvSpPr>
         <p:spPr>
           <a:xfrm>
-            <a:off x="6846137" y="0"/>
+            <a:off x="6846137" y="29817"/>
             <a:ext cx="1397988" cy="474353"/>
           </a:xfrm>
           <a:prstGeom prst="rect">
@@ -3566,7 +3566,7 @@
           <a:p>
             <a:pPr algn="ctr"/>
             <a:r>
-              <a:rPr lang="en-US" sz="533" dirty="0" err="1">
+              <a:rPr lang="en-US" sz="533" dirty="0">
                 <a:solidFill>
                   <a:schemeClr val="tx1"/>
                 </a:solidFill>
@@ -3576,14 +3576,6 @@
               </a:rPr>
               <a:t>iFrame</a:t>
             </a:r>
-            <a:endParaRPr lang="en-US" sz="533" dirty="0">
-              <a:solidFill>
-                <a:schemeClr val="tx1"/>
-              </a:solidFill>
-              <a:latin typeface="Menlo" panose="020B0609030804020204" pitchFamily="49" charset="0"/>
-              <a:ea typeface="Menlo" panose="020B0609030804020204" pitchFamily="49" charset="0"/>
-              <a:cs typeface="Menlo" panose="020B0609030804020204" pitchFamily="49" charset="0"/>
-            </a:endParaRPr>
           </a:p>
         </p:txBody>
       </p:sp>
@@ -3607,17 +3599,12 @@
           <a:prstGeom prst="rect">
             <a:avLst/>
           </a:prstGeom>
-          <a:pattFill prst="dkVert">
-            <a:fgClr>
-              <a:schemeClr val="accent1">
-                <a:lumMod val="20000"/>
-                <a:lumOff val="80000"/>
-              </a:schemeClr>
-            </a:fgClr>
-            <a:bgClr>
-              <a:schemeClr val="bg1"/>
-            </a:bgClr>
-          </a:pattFill>
+          <a:solidFill>
+            <a:schemeClr val="accent1">
+              <a:lumMod val="20000"/>
+              <a:lumOff val="80000"/>
+            </a:schemeClr>
+          </a:solidFill>
           <a:ln>
             <a:prstDash val="solid"/>
           </a:ln>
@@ -3642,7 +3629,7 @@
           <a:p>
             <a:pPr algn="ctr"/>
             <a:r>
-              <a:rPr lang="en-US" sz="1467" dirty="0">
+              <a:rPr lang="en-US" sz="1467">
                 <a:solidFill>
                   <a:schemeClr val="tx1"/>
                 </a:solidFill>
@@ -3655,7 +3642,7 @@
           </a:p>
           <a:p>
             <a:pPr algn="ctr"/>
-            <a:endParaRPr lang="en-US" sz="1467" dirty="0">
+            <a:endParaRPr lang="en-US" sz="1467">
               <a:solidFill>
                 <a:schemeClr val="tx1"/>
               </a:solidFill>
@@ -3666,7 +3653,7 @@
           </a:p>
           <a:p>
             <a:pPr algn="ctr"/>
-            <a:endParaRPr lang="en-US" sz="1467" dirty="0">
+            <a:endParaRPr lang="en-US" sz="1467">
               <a:solidFill>
                 <a:schemeClr val="tx1"/>
               </a:solidFill>
@@ -3773,7 +3760,7 @@
           <a:p>
             <a:pPr algn="ctr"/>
             <a:r>
-              <a:rPr lang="en-US" sz="1000" dirty="0">
+              <a:rPr lang="en-US" sz="1000">
                 <a:solidFill>
                   <a:schemeClr val="tx1"/>
                 </a:solidFill>
@@ -3835,7 +3822,7 @@
           <a:p>
             <a:pPr algn="ctr"/>
             <a:r>
-              <a:rPr lang="en-US" sz="933" dirty="0">
+              <a:rPr lang="en-US" sz="933">
                 <a:solidFill>
                   <a:schemeClr val="tx1"/>
                 </a:solidFill>
@@ -3897,7 +3884,7 @@
           <a:p>
             <a:pPr algn="ctr"/>
             <a:r>
-              <a:rPr lang="en-US" sz="933" dirty="0">
+              <a:rPr lang="en-US" sz="933">
                 <a:solidFill>
                   <a:schemeClr val="tx1"/>
                 </a:solidFill>
@@ -4044,7 +4031,7 @@
           <a:p>
             <a:pPr algn="ctr"/>
             <a:r>
-              <a:rPr lang="en-US" sz="933" dirty="0">
+              <a:rPr lang="en-US" sz="933">
                 <a:solidFill>
                   <a:schemeClr val="tx1"/>
                 </a:solidFill>
@@ -4106,7 +4093,7 @@
           <a:p>
             <a:pPr algn="ctr"/>
             <a:r>
-              <a:rPr lang="en-US" sz="933" dirty="0">
+              <a:rPr lang="en-US" sz="933">
                 <a:solidFill>
                   <a:schemeClr val="tx1"/>
                 </a:solidFill>
@@ -4168,7 +4155,7 @@
           <a:p>
             <a:pPr algn="ctr"/>
             <a:r>
-              <a:rPr lang="en-US" sz="933" dirty="0">
+              <a:rPr lang="en-US" sz="933">
                 <a:solidFill>
                   <a:schemeClr val="tx1"/>
                 </a:solidFill>
@@ -4182,7 +4169,7 @@
           <a:p>
             <a:pPr algn="ctr"/>
             <a:r>
-              <a:rPr lang="en-US" sz="933" dirty="0">
+              <a:rPr lang="en-US" sz="933">
                 <a:solidFill>
                   <a:schemeClr val="tx1"/>
                 </a:solidFill>
@@ -4244,7 +4231,7 @@
           <a:p>
             <a:pPr algn="ctr"/>
             <a:r>
-              <a:rPr lang="en-US" sz="933" dirty="0">
+              <a:rPr lang="en-US" sz="933">
                 <a:solidFill>
                   <a:schemeClr val="tx1"/>
                 </a:solidFill>
@@ -4306,7 +4293,7 @@
           <a:p>
             <a:pPr algn="ctr"/>
             <a:r>
-              <a:rPr lang="en-US" sz="933" dirty="0">
+              <a:rPr lang="en-US" sz="933">
                 <a:solidFill>
                   <a:schemeClr val="tx1"/>
                 </a:solidFill>
@@ -4432,7 +4419,7 @@
           <a:lstStyle/>
           <a:p>
             <a:r>
-              <a:rPr lang="en-US" sz="1100" dirty="0">
+              <a:rPr lang="en-US" sz="1100">
                 <a:latin typeface="Menlo" panose="020B0609030804020204" pitchFamily="49" charset="0"/>
                 <a:ea typeface="Menlo" panose="020B0609030804020204" pitchFamily="49" charset="0"/>
                 <a:cs typeface="Menlo" panose="020B0609030804020204" pitchFamily="49" charset="0"/>
@@ -4471,7 +4458,7 @@
           <a:lstStyle/>
           <a:p>
             <a:r>
-              <a:rPr lang="en-US" sz="1100" dirty="0">
+              <a:rPr lang="en-US" sz="1100">
                 <a:latin typeface="Menlo" panose="020B0609030804020204" pitchFamily="49" charset="0"/>
                 <a:ea typeface="Menlo" panose="020B0609030804020204" pitchFamily="49" charset="0"/>
                 <a:cs typeface="Menlo" panose="020B0609030804020204" pitchFamily="49" charset="0"/>
@@ -4510,7 +4497,7 @@
           <a:lstStyle/>
           <a:p>
             <a:r>
-              <a:rPr lang="en-US" sz="1100" dirty="0">
+              <a:rPr lang="en-US" sz="1100">
                 <a:latin typeface="Menlo" panose="020B0609030804020204" pitchFamily="49" charset="0"/>
                 <a:ea typeface="Menlo" panose="020B0609030804020204" pitchFamily="49" charset="0"/>
                 <a:cs typeface="Menlo" panose="020B0609030804020204" pitchFamily="49" charset="0"/>
@@ -4549,7 +4536,7 @@
           <a:lstStyle/>
           <a:p>
             <a:r>
-              <a:rPr lang="en-US" sz="1067" dirty="0">
+              <a:rPr lang="en-US" sz="1067">
                 <a:latin typeface="Menlo" panose="020B0609030804020204" pitchFamily="49" charset="0"/>
                 <a:ea typeface="Menlo" panose="020B0609030804020204" pitchFamily="49" charset="0"/>
                 <a:cs typeface="Menlo" panose="020B0609030804020204" pitchFamily="49" charset="0"/>
@@ -4630,7 +4617,7 @@
           <a:lstStyle/>
           <a:p>
             <a:r>
-              <a:rPr lang="en-US" sz="1100" dirty="0">
+              <a:rPr lang="en-US" sz="1100">
                 <a:latin typeface="Menlo" panose="020B0609030804020204" pitchFamily="49" charset="0"/>
                 <a:ea typeface="Menlo" panose="020B0609030804020204" pitchFamily="49" charset="0"/>
                 <a:cs typeface="Menlo" panose="020B0609030804020204" pitchFamily="49" charset="0"/>
@@ -4795,7 +4782,7 @@
           <a:lstStyle/>
           <a:p>
             <a:r>
-              <a:rPr lang="en-US" sz="1100" dirty="0">
+              <a:rPr lang="en-US" sz="1100">
                 <a:latin typeface="Menlo" panose="020B0609030804020204" pitchFamily="49" charset="0"/>
                 <a:ea typeface="Menlo" panose="020B0609030804020204" pitchFamily="49" charset="0"/>
                 <a:cs typeface="Menlo" panose="020B0609030804020204" pitchFamily="49" charset="0"/>
@@ -4834,7 +4821,7 @@
           <a:lstStyle/>
           <a:p>
             <a:r>
-              <a:rPr lang="en-US" sz="1100" dirty="0">
+              <a:rPr lang="en-US" sz="1100">
                 <a:latin typeface="Menlo" panose="020B0609030804020204" pitchFamily="49" charset="0"/>
                 <a:ea typeface="Menlo" panose="020B0609030804020204" pitchFamily="49" charset="0"/>
                 <a:cs typeface="Menlo" panose="020B0609030804020204" pitchFamily="49" charset="0"/>
@@ -4873,7 +4860,7 @@
           <a:lstStyle/>
           <a:p>
             <a:r>
-              <a:rPr lang="en-US" sz="1100" dirty="0">
+              <a:rPr lang="en-US" sz="1100">
                 <a:latin typeface="Menlo" panose="020B0609030804020204" pitchFamily="49" charset="0"/>
                 <a:ea typeface="Menlo" panose="020B0609030804020204" pitchFamily="49" charset="0"/>
                 <a:cs typeface="Menlo" panose="020B0609030804020204" pitchFamily="49" charset="0"/>
@@ -4882,7 +4869,7 @@
             </a:r>
           </a:p>
           <a:p>
-            <a:endParaRPr lang="en-US" sz="1100" dirty="0">
+            <a:endParaRPr lang="en-US" sz="1100">
               <a:latin typeface="Menlo" panose="020B0609030804020204" pitchFamily="49" charset="0"/>
               <a:ea typeface="Menlo" panose="020B0609030804020204" pitchFamily="49" charset="0"/>
               <a:cs typeface="Menlo" panose="020B0609030804020204" pitchFamily="49" charset="0"/>
@@ -4946,7 +4933,7 @@
           <a:lstStyle/>
           <a:p>
             <a:pPr algn="ctr"/>
-            <a:endParaRPr lang="en-US" sz="1000" dirty="0">
+            <a:endParaRPr lang="en-US" sz="1000">
               <a:solidFill>
                 <a:schemeClr val="tx1"/>
               </a:solidFill>
@@ -4978,6 +4965,218 @@
             <a:avLst/>
           </a:prstGeom>
           <a:noFill/>
+        </p:spPr>
+        <p:style>
+          <a:lnRef idx="2">
+            <a:schemeClr val="accent1">
+              <a:shade val="50000"/>
+            </a:schemeClr>
+          </a:lnRef>
+          <a:fillRef idx="1">
+            <a:schemeClr val="accent1"/>
+          </a:fillRef>
+          <a:effectRef idx="0">
+            <a:schemeClr val="accent1"/>
+          </a:effectRef>
+          <a:fontRef idx="minor">
+            <a:schemeClr val="lt1"/>
+          </a:fontRef>
+        </p:style>
+        <p:txBody>
+          <a:bodyPr rtlCol="0" anchor="ctr"/>
+          <a:lstStyle/>
+          <a:p>
+            <a:pPr algn="ctr"/>
+            <a:r>
+              <a:rPr lang="en-US" sz="1000">
+                <a:solidFill>
+                  <a:schemeClr val="tx1"/>
+                </a:solidFill>
+                <a:latin typeface="Menlo" panose="020B0609030804020204" pitchFamily="49" charset="0"/>
+                <a:ea typeface="Menlo" panose="020B0609030804020204" pitchFamily="49" charset="0"/>
+                <a:cs typeface="Menlo" panose="020B0609030804020204" pitchFamily="49" charset="0"/>
+              </a:rPr>
+              <a:t>TN3270</a:t>
+            </a:r>
+          </a:p>
+        </p:txBody>
+      </p:sp>
+      <p:sp>
+        <p:nvSpPr>
+          <p:cNvPr id="63" name="Rectangle 62">
+            <a:extLst>
+              <a:ext uri="{FF2B5EF4-FFF2-40B4-BE49-F238E27FC236}">
+                <a16:creationId xmlns:a16="http://schemas.microsoft.com/office/drawing/2014/main" id="{656EF613-5B84-354E-925D-A378D66F1CF1}"/>
+              </a:ext>
+            </a:extLst>
+          </p:cNvPr>
+          <p:cNvSpPr/>
+          <p:nvPr/>
+        </p:nvSpPr>
+        <p:spPr>
+          <a:xfrm>
+            <a:off x="832031" y="4840722"/>
+            <a:ext cx="673240" cy="329105"/>
+          </a:xfrm>
+          <a:prstGeom prst="rect">
+            <a:avLst/>
+          </a:prstGeom>
+          <a:noFill/>
+        </p:spPr>
+        <p:style>
+          <a:lnRef idx="2">
+            <a:schemeClr val="accent1">
+              <a:shade val="50000"/>
+            </a:schemeClr>
+          </a:lnRef>
+          <a:fillRef idx="1">
+            <a:schemeClr val="accent1"/>
+          </a:fillRef>
+          <a:effectRef idx="0">
+            <a:schemeClr val="accent1"/>
+          </a:effectRef>
+          <a:fontRef idx="minor">
+            <a:schemeClr val="lt1"/>
+          </a:fontRef>
+        </p:style>
+        <p:txBody>
+          <a:bodyPr rtlCol="0" anchor="ctr"/>
+          <a:lstStyle/>
+          <a:p>
+            <a:pPr algn="ctr"/>
+            <a:r>
+              <a:rPr lang="en-US" sz="1000">
+                <a:solidFill>
+                  <a:schemeClr val="tx1"/>
+                </a:solidFill>
+                <a:latin typeface="Menlo" panose="020B0609030804020204" pitchFamily="49" charset="0"/>
+                <a:ea typeface="Menlo" panose="020B0609030804020204" pitchFamily="49" charset="0"/>
+                <a:cs typeface="Menlo" panose="020B0609030804020204" pitchFamily="49" charset="0"/>
+              </a:rPr>
+              <a:t>VT</a:t>
+            </a:r>
+          </a:p>
+        </p:txBody>
+      </p:sp>
+      <p:sp>
+        <p:nvSpPr>
+          <p:cNvPr id="64" name="Rectangle 63">
+            <a:extLst>
+              <a:ext uri="{FF2B5EF4-FFF2-40B4-BE49-F238E27FC236}">
+                <a16:creationId xmlns:a16="http://schemas.microsoft.com/office/drawing/2014/main" id="{B7ADD677-D2DA-7F4A-AC17-74AA3E9225A1}"/>
+              </a:ext>
+            </a:extLst>
+          </p:cNvPr>
+          <p:cNvSpPr/>
+          <p:nvPr/>
+        </p:nvSpPr>
+        <p:spPr>
+          <a:xfrm>
+            <a:off x="376507" y="3771034"/>
+            <a:ext cx="1128765" cy="492369"/>
+          </a:xfrm>
+          <a:prstGeom prst="rect">
+            <a:avLst/>
+          </a:prstGeom>
+          <a:noFill/>
+        </p:spPr>
+        <p:style>
+          <a:lnRef idx="2">
+            <a:schemeClr val="accent1">
+              <a:shade val="50000"/>
+            </a:schemeClr>
+          </a:lnRef>
+          <a:fillRef idx="1">
+            <a:schemeClr val="accent1"/>
+          </a:fillRef>
+          <a:effectRef idx="0">
+            <a:schemeClr val="accent1"/>
+          </a:effectRef>
+          <a:fontRef idx="minor">
+            <a:schemeClr val="lt1"/>
+          </a:fontRef>
+        </p:style>
+        <p:txBody>
+          <a:bodyPr rtlCol="0" anchor="ctr"/>
+          <a:lstStyle/>
+          <a:p>
+            <a:pPr algn="ctr"/>
+            <a:r>
+              <a:rPr lang="en-US" sz="1000">
+                <a:solidFill>
+                  <a:schemeClr val="tx1"/>
+                </a:solidFill>
+                <a:latin typeface="Menlo" panose="020B0609030804020204" pitchFamily="49" charset="0"/>
+                <a:ea typeface="Menlo" panose="020B0609030804020204" pitchFamily="49" charset="0"/>
+                <a:cs typeface="Menlo" panose="020B0609030804020204" pitchFamily="49" charset="0"/>
+              </a:rPr>
+              <a:t>ZLUX</a:t>
+            </a:r>
+          </a:p>
+        </p:txBody>
+      </p:sp>
+      <p:sp>
+        <p:nvSpPr>
+          <p:cNvPr id="65" name="TextBox 64">
+            <a:extLst>
+              <a:ext uri="{FF2B5EF4-FFF2-40B4-BE49-F238E27FC236}">
+                <a16:creationId xmlns:a16="http://schemas.microsoft.com/office/drawing/2014/main" id="{5812FD3A-B0DF-7746-BD53-0047BF61959E}"/>
+              </a:ext>
+            </a:extLst>
+          </p:cNvPr>
+          <p:cNvSpPr txBox="1"/>
+          <p:nvPr/>
+        </p:nvSpPr>
+        <p:spPr>
+          <a:xfrm>
+            <a:off x="454836" y="3509422"/>
+            <a:ext cx="524503" cy="261610"/>
+          </a:xfrm>
+          <a:prstGeom prst="rect">
+            <a:avLst/>
+          </a:prstGeom>
+          <a:noFill/>
+        </p:spPr>
+        <p:txBody>
+          <a:bodyPr wrap="none" rtlCol="0">
+            <a:spAutoFit/>
+          </a:bodyPr>
+          <a:lstStyle/>
+          <a:p>
+            <a:r>
+              <a:rPr lang="en-US" sz="1100">
+                <a:latin typeface="Menlo" panose="020B0609030804020204" pitchFamily="49" charset="0"/>
+                <a:ea typeface="Menlo" panose="020B0609030804020204" pitchFamily="49" charset="0"/>
+                <a:cs typeface="Menlo" panose="020B0609030804020204" pitchFamily="49" charset="0"/>
+              </a:rPr>
+              <a:t>8544</a:t>
+            </a:r>
+          </a:p>
+        </p:txBody>
+      </p:sp>
+      <p:sp>
+        <p:nvSpPr>
+          <p:cNvPr id="66" name="Rectangle 65">
+            <a:extLst>
+              <a:ext uri="{FF2B5EF4-FFF2-40B4-BE49-F238E27FC236}">
+                <a16:creationId xmlns:a16="http://schemas.microsoft.com/office/drawing/2014/main" id="{E70C2438-F7B1-AA4F-85F2-E8948FBA6F32}"/>
+              </a:ext>
+            </a:extLst>
+          </p:cNvPr>
+          <p:cNvSpPr/>
+          <p:nvPr/>
+        </p:nvSpPr>
+        <p:spPr>
+          <a:xfrm>
+            <a:off x="376504" y="5715002"/>
+            <a:ext cx="1128765" cy="276391"/>
+          </a:xfrm>
+          <a:prstGeom prst="rect">
+            <a:avLst/>
+          </a:prstGeom>
+          <a:solidFill>
+            <a:srgbClr val="F3A4FF"/>
+          </a:solidFill>
         </p:spPr>
         <p:style>
           <a:lnRef idx="2">
@@ -5009,17 +5208,98 @@
                 <a:ea typeface="Menlo" panose="020B0609030804020204" pitchFamily="49" charset="0"/>
                 <a:cs typeface="Menlo" panose="020B0609030804020204" pitchFamily="49" charset="0"/>
               </a:rPr>
-              <a:t>TN3270</a:t>
-            </a:r>
-          </a:p>
-        </p:txBody>
-      </p:sp>
-      <p:sp>
-        <p:nvSpPr>
-          <p:cNvPr id="63" name="Rectangle 62">
-            <a:extLst>
-              <a:ext uri="{FF2B5EF4-FFF2-40B4-BE49-F238E27FC236}">
-                <a16:creationId xmlns:a16="http://schemas.microsoft.com/office/drawing/2014/main" id="{656EF613-5B84-354E-925D-A378D66F1CF1}"/>
+              <a:t>zssServer</a:t>
+            </a:r>
+          </a:p>
+        </p:txBody>
+      </p:sp>
+      <p:cxnSp>
+        <p:nvCxnSpPr>
+          <p:cNvPr id="67" name="Straight Arrow Connector 66">
+            <a:extLst>
+              <a:ext uri="{FF2B5EF4-FFF2-40B4-BE49-F238E27FC236}">
+                <a16:creationId xmlns:a16="http://schemas.microsoft.com/office/drawing/2014/main" id="{14C9C9C0-A1B2-754A-8AC7-11549460EE6B}"/>
+              </a:ext>
+            </a:extLst>
+          </p:cNvPr>
+          <p:cNvCxnSpPr>
+            <a:cxnSpLocks/>
+          </p:cNvCxnSpPr>
+          <p:nvPr/>
+        </p:nvCxnSpPr>
+        <p:spPr>
+          <a:xfrm>
+            <a:off x="915053" y="5216206"/>
+            <a:ext cx="0" cy="462817"/>
+          </a:xfrm>
+          <a:prstGeom prst="straightConnector1">
+            <a:avLst/>
+          </a:prstGeom>
+          <a:ln>
+            <a:headEnd type="triangle"/>
+            <a:tailEnd type="triangle"/>
+          </a:ln>
+        </p:spPr>
+        <p:style>
+          <a:lnRef idx="1">
+            <a:schemeClr val="accent1"/>
+          </a:lnRef>
+          <a:fillRef idx="0">
+            <a:schemeClr val="accent1"/>
+          </a:fillRef>
+          <a:effectRef idx="0">
+            <a:schemeClr val="accent1"/>
+          </a:effectRef>
+          <a:fontRef idx="minor">
+            <a:schemeClr val="tx1"/>
+          </a:fontRef>
+        </p:style>
+      </p:cxnSp>
+      <p:sp>
+        <p:nvSpPr>
+          <p:cNvPr id="68" name="TextBox 67">
+            <a:extLst>
+              <a:ext uri="{FF2B5EF4-FFF2-40B4-BE49-F238E27FC236}">
+                <a16:creationId xmlns:a16="http://schemas.microsoft.com/office/drawing/2014/main" id="{AB4D9C28-D784-F04E-A506-95C735B37F48}"/>
+              </a:ext>
+            </a:extLst>
+          </p:cNvPr>
+          <p:cNvSpPr txBox="1"/>
+          <p:nvPr/>
+        </p:nvSpPr>
+        <p:spPr>
+          <a:xfrm>
+            <a:off x="420382" y="5416951"/>
+            <a:ext cx="524503" cy="261610"/>
+          </a:xfrm>
+          <a:prstGeom prst="rect">
+            <a:avLst/>
+          </a:prstGeom>
+          <a:noFill/>
+        </p:spPr>
+        <p:txBody>
+          <a:bodyPr wrap="none" rtlCol="0">
+            <a:spAutoFit/>
+          </a:bodyPr>
+          <a:lstStyle/>
+          <a:p>
+            <a:r>
+              <a:rPr lang="en-US" sz="1100">
+                <a:latin typeface="Menlo" panose="020B0609030804020204" pitchFamily="49" charset="0"/>
+                <a:ea typeface="Menlo" panose="020B0609030804020204" pitchFamily="49" charset="0"/>
+                <a:cs typeface="Menlo" panose="020B0609030804020204" pitchFamily="49" charset="0"/>
+              </a:rPr>
+              <a:t>8542</a:t>
+            </a:r>
+          </a:p>
+        </p:txBody>
+      </p:sp>
+      <p:sp>
+        <p:nvSpPr>
+          <p:cNvPr id="69" name="Rectangle 68">
+            <a:extLst>
+              <a:ext uri="{FF2B5EF4-FFF2-40B4-BE49-F238E27FC236}">
+                <a16:creationId xmlns:a16="http://schemas.microsoft.com/office/drawing/2014/main" id="{F31D35DC-3E8F-BA43-878A-435AAA2C67B2}"/>
               </a:ext>
             </a:extLst>
           </p:cNvPr>
@@ -5028,13 +5308,15 @@
         </p:nvSpPr>
         <p:spPr>
           <a:xfrm>
-            <a:off x="832031" y="4840722"/>
-            <a:ext cx="673240" cy="329105"/>
+            <a:off x="376504" y="6483230"/>
+            <a:ext cx="1128765" cy="276391"/>
           </a:xfrm>
           <a:prstGeom prst="rect">
             <a:avLst/>
           </a:prstGeom>
-          <a:noFill/>
+          <a:solidFill>
+            <a:srgbClr val="F3A4FF"/>
+          </a:solidFill>
         </p:spPr>
         <p:style>
           <a:lnRef idx="2">
@@ -5058,310 +5340,7 @@
           <a:p>
             <a:pPr algn="ctr"/>
             <a:r>
-              <a:rPr lang="en-US" sz="1000" dirty="0">
-                <a:solidFill>
-                  <a:schemeClr val="tx1"/>
-                </a:solidFill>
-                <a:latin typeface="Menlo" panose="020B0609030804020204" pitchFamily="49" charset="0"/>
-                <a:ea typeface="Menlo" panose="020B0609030804020204" pitchFamily="49" charset="0"/>
-                <a:cs typeface="Menlo" panose="020B0609030804020204" pitchFamily="49" charset="0"/>
-              </a:rPr>
-              <a:t>VT</a:t>
-            </a:r>
-          </a:p>
-        </p:txBody>
-      </p:sp>
-      <p:sp>
-        <p:nvSpPr>
-          <p:cNvPr id="64" name="Rectangle 63">
-            <a:extLst>
-              <a:ext uri="{FF2B5EF4-FFF2-40B4-BE49-F238E27FC236}">
-                <a16:creationId xmlns:a16="http://schemas.microsoft.com/office/drawing/2014/main" id="{B7ADD677-D2DA-7F4A-AC17-74AA3E9225A1}"/>
-              </a:ext>
-            </a:extLst>
-          </p:cNvPr>
-          <p:cNvSpPr/>
-          <p:nvPr/>
-        </p:nvSpPr>
-        <p:spPr>
-          <a:xfrm>
-            <a:off x="376507" y="3771034"/>
-            <a:ext cx="1128765" cy="492369"/>
-          </a:xfrm>
-          <a:prstGeom prst="rect">
-            <a:avLst/>
-          </a:prstGeom>
-          <a:noFill/>
-        </p:spPr>
-        <p:style>
-          <a:lnRef idx="2">
-            <a:schemeClr val="accent1">
-              <a:shade val="50000"/>
-            </a:schemeClr>
-          </a:lnRef>
-          <a:fillRef idx="1">
-            <a:schemeClr val="accent1"/>
-          </a:fillRef>
-          <a:effectRef idx="0">
-            <a:schemeClr val="accent1"/>
-          </a:effectRef>
-          <a:fontRef idx="minor">
-            <a:schemeClr val="lt1"/>
-          </a:fontRef>
-        </p:style>
-        <p:txBody>
-          <a:bodyPr rtlCol="0" anchor="ctr"/>
-          <a:lstStyle/>
-          <a:p>
-            <a:pPr algn="ctr"/>
-            <a:r>
-              <a:rPr lang="en-US" sz="1000" dirty="0">
-                <a:solidFill>
-                  <a:schemeClr val="tx1"/>
-                </a:solidFill>
-                <a:latin typeface="Menlo" panose="020B0609030804020204" pitchFamily="49" charset="0"/>
-                <a:ea typeface="Menlo" panose="020B0609030804020204" pitchFamily="49" charset="0"/>
-                <a:cs typeface="Menlo" panose="020B0609030804020204" pitchFamily="49" charset="0"/>
-              </a:rPr>
-              <a:t>ZLUX</a:t>
-            </a:r>
-          </a:p>
-        </p:txBody>
-      </p:sp>
-      <p:sp>
-        <p:nvSpPr>
-          <p:cNvPr id="65" name="TextBox 64">
-            <a:extLst>
-              <a:ext uri="{FF2B5EF4-FFF2-40B4-BE49-F238E27FC236}">
-                <a16:creationId xmlns:a16="http://schemas.microsoft.com/office/drawing/2014/main" id="{5812FD3A-B0DF-7746-BD53-0047BF61959E}"/>
-              </a:ext>
-            </a:extLst>
-          </p:cNvPr>
-          <p:cNvSpPr txBox="1"/>
-          <p:nvPr/>
-        </p:nvSpPr>
-        <p:spPr>
-          <a:xfrm>
-            <a:off x="454836" y="3509422"/>
-            <a:ext cx="524503" cy="261610"/>
-          </a:xfrm>
-          <a:prstGeom prst="rect">
-            <a:avLst/>
-          </a:prstGeom>
-          <a:noFill/>
-        </p:spPr>
-        <p:txBody>
-          <a:bodyPr wrap="none" rtlCol="0">
-            <a:spAutoFit/>
-          </a:bodyPr>
-          <a:lstStyle/>
-          <a:p>
-            <a:r>
-              <a:rPr lang="en-US" sz="1100" dirty="0">
-                <a:latin typeface="Menlo" panose="020B0609030804020204" pitchFamily="49" charset="0"/>
-                <a:ea typeface="Menlo" panose="020B0609030804020204" pitchFamily="49" charset="0"/>
-                <a:cs typeface="Menlo" panose="020B0609030804020204" pitchFamily="49" charset="0"/>
-              </a:rPr>
-              <a:t>8544</a:t>
-            </a:r>
-          </a:p>
-        </p:txBody>
-      </p:sp>
-      <p:sp>
-        <p:nvSpPr>
-          <p:cNvPr id="66" name="Rectangle 65">
-            <a:extLst>
-              <a:ext uri="{FF2B5EF4-FFF2-40B4-BE49-F238E27FC236}">
-                <a16:creationId xmlns:a16="http://schemas.microsoft.com/office/drawing/2014/main" id="{E70C2438-F7B1-AA4F-85F2-E8948FBA6F32}"/>
-              </a:ext>
-            </a:extLst>
-          </p:cNvPr>
-          <p:cNvSpPr/>
-          <p:nvPr/>
-        </p:nvSpPr>
-        <p:spPr>
-          <a:xfrm>
-            <a:off x="376504" y="5715002"/>
-            <a:ext cx="1128765" cy="276391"/>
-          </a:xfrm>
-          <a:prstGeom prst="rect">
-            <a:avLst/>
-          </a:prstGeom>
-          <a:solidFill>
-            <a:srgbClr val="F3A4FF"/>
-          </a:solidFill>
-        </p:spPr>
-        <p:style>
-          <a:lnRef idx="2">
-            <a:schemeClr val="accent1">
-              <a:shade val="50000"/>
-            </a:schemeClr>
-          </a:lnRef>
-          <a:fillRef idx="1">
-            <a:schemeClr val="accent1"/>
-          </a:fillRef>
-          <a:effectRef idx="0">
-            <a:schemeClr val="accent1"/>
-          </a:effectRef>
-          <a:fontRef idx="minor">
-            <a:schemeClr val="lt1"/>
-          </a:fontRef>
-        </p:style>
-        <p:txBody>
-          <a:bodyPr rtlCol="0" anchor="ctr"/>
-          <a:lstStyle/>
-          <a:p>
-            <a:pPr algn="ctr"/>
-            <a:r>
-              <a:rPr lang="en-US" sz="1000" dirty="0" err="1">
-                <a:solidFill>
-                  <a:schemeClr val="tx1"/>
-                </a:solidFill>
-                <a:latin typeface="Menlo" panose="020B0609030804020204" pitchFamily="49" charset="0"/>
-                <a:ea typeface="Menlo" panose="020B0609030804020204" pitchFamily="49" charset="0"/>
-                <a:cs typeface="Menlo" panose="020B0609030804020204" pitchFamily="49" charset="0"/>
-              </a:rPr>
-              <a:t>zssServer</a:t>
-            </a:r>
-            <a:endParaRPr lang="en-US" sz="1000" dirty="0">
-              <a:solidFill>
-                <a:schemeClr val="tx1"/>
-              </a:solidFill>
-              <a:latin typeface="Menlo" panose="020B0609030804020204" pitchFamily="49" charset="0"/>
-              <a:ea typeface="Menlo" panose="020B0609030804020204" pitchFamily="49" charset="0"/>
-              <a:cs typeface="Menlo" panose="020B0609030804020204" pitchFamily="49" charset="0"/>
-            </a:endParaRPr>
-          </a:p>
-        </p:txBody>
-      </p:sp>
-      <p:cxnSp>
-        <p:nvCxnSpPr>
-          <p:cNvPr id="67" name="Straight Arrow Connector 66">
-            <a:extLst>
-              <a:ext uri="{FF2B5EF4-FFF2-40B4-BE49-F238E27FC236}">
-                <a16:creationId xmlns:a16="http://schemas.microsoft.com/office/drawing/2014/main" id="{14C9C9C0-A1B2-754A-8AC7-11549460EE6B}"/>
-              </a:ext>
-            </a:extLst>
-          </p:cNvPr>
-          <p:cNvCxnSpPr>
-            <a:cxnSpLocks/>
-          </p:cNvCxnSpPr>
-          <p:nvPr/>
-        </p:nvCxnSpPr>
-        <p:spPr>
-          <a:xfrm>
-            <a:off x="915053" y="5216206"/>
-            <a:ext cx="0" cy="462817"/>
-          </a:xfrm>
-          <a:prstGeom prst="straightConnector1">
-            <a:avLst/>
-          </a:prstGeom>
-          <a:ln>
-            <a:headEnd type="triangle"/>
-            <a:tailEnd type="triangle"/>
-          </a:ln>
-        </p:spPr>
-        <p:style>
-          <a:lnRef idx="1">
-            <a:schemeClr val="accent1"/>
-          </a:lnRef>
-          <a:fillRef idx="0">
-            <a:schemeClr val="accent1"/>
-          </a:fillRef>
-          <a:effectRef idx="0">
-            <a:schemeClr val="accent1"/>
-          </a:effectRef>
-          <a:fontRef idx="minor">
-            <a:schemeClr val="tx1"/>
-          </a:fontRef>
-        </p:style>
-      </p:cxnSp>
-      <p:sp>
-        <p:nvSpPr>
-          <p:cNvPr id="68" name="TextBox 67">
-            <a:extLst>
-              <a:ext uri="{FF2B5EF4-FFF2-40B4-BE49-F238E27FC236}">
-                <a16:creationId xmlns:a16="http://schemas.microsoft.com/office/drawing/2014/main" id="{AB4D9C28-D784-F04E-A506-95C735B37F48}"/>
-              </a:ext>
-            </a:extLst>
-          </p:cNvPr>
-          <p:cNvSpPr txBox="1"/>
-          <p:nvPr/>
-        </p:nvSpPr>
-        <p:spPr>
-          <a:xfrm>
-            <a:off x="420382" y="5416951"/>
-            <a:ext cx="524503" cy="261610"/>
-          </a:xfrm>
-          <a:prstGeom prst="rect">
-            <a:avLst/>
-          </a:prstGeom>
-          <a:noFill/>
-        </p:spPr>
-        <p:txBody>
-          <a:bodyPr wrap="none" rtlCol="0">
-            <a:spAutoFit/>
-          </a:bodyPr>
-          <a:lstStyle/>
-          <a:p>
-            <a:r>
-              <a:rPr lang="en-US" sz="1100" dirty="0">
-                <a:latin typeface="Menlo" panose="020B0609030804020204" pitchFamily="49" charset="0"/>
-                <a:ea typeface="Menlo" panose="020B0609030804020204" pitchFamily="49" charset="0"/>
-                <a:cs typeface="Menlo" panose="020B0609030804020204" pitchFamily="49" charset="0"/>
-              </a:rPr>
-              <a:t>8542</a:t>
-            </a:r>
-          </a:p>
-        </p:txBody>
-      </p:sp>
-      <p:sp>
-        <p:nvSpPr>
-          <p:cNvPr id="69" name="Rectangle 68">
-            <a:extLst>
-              <a:ext uri="{FF2B5EF4-FFF2-40B4-BE49-F238E27FC236}">
-                <a16:creationId xmlns:a16="http://schemas.microsoft.com/office/drawing/2014/main" id="{F31D35DC-3E8F-BA43-878A-435AAA2C67B2}"/>
-              </a:ext>
-            </a:extLst>
-          </p:cNvPr>
-          <p:cNvSpPr/>
-          <p:nvPr/>
-        </p:nvSpPr>
-        <p:spPr>
-          <a:xfrm>
-            <a:off x="376504" y="6483230"/>
-            <a:ext cx="1128765" cy="276391"/>
-          </a:xfrm>
-          <a:prstGeom prst="rect">
-            <a:avLst/>
-          </a:prstGeom>
-          <a:solidFill>
-            <a:srgbClr val="F3A4FF"/>
-          </a:solidFill>
-        </p:spPr>
-        <p:style>
-          <a:lnRef idx="2">
-            <a:schemeClr val="accent1">
-              <a:shade val="50000"/>
-            </a:schemeClr>
-          </a:lnRef>
-          <a:fillRef idx="1">
-            <a:schemeClr val="accent1"/>
-          </a:fillRef>
-          <a:effectRef idx="0">
-            <a:schemeClr val="accent1"/>
-          </a:effectRef>
-          <a:fontRef idx="minor">
-            <a:schemeClr val="lt1"/>
-          </a:fontRef>
-        </p:style>
-        <p:txBody>
-          <a:bodyPr rtlCol="0" anchor="ctr"/>
-          <a:lstStyle/>
-          <a:p>
-            <a:pPr algn="ctr"/>
-            <a:r>
-              <a:rPr lang="en-US" sz="1000" dirty="0">
+              <a:rPr lang="en-US" sz="1000">
                 <a:solidFill>
                   <a:schemeClr val="tx1"/>
                 </a:solidFill>
@@ -5446,7 +5425,7 @@
           <a:lstStyle/>
           <a:p>
             <a:r>
-              <a:rPr lang="en-US" sz="1100" dirty="0">
+              <a:rPr lang="en-US" sz="1100">
                 <a:latin typeface="Menlo" panose="020B0609030804020204" pitchFamily="49" charset="0"/>
                 <a:ea typeface="Menlo" panose="020B0609030804020204" pitchFamily="49" charset="0"/>
                 <a:cs typeface="Menlo" panose="020B0609030804020204" pitchFamily="49" charset="0"/>
@@ -5500,7 +5479,7 @@
           <a:p>
             <a:pPr algn="ctr"/>
             <a:r>
-              <a:rPr lang="en-US" sz="1000" dirty="0">
+              <a:rPr lang="en-US" sz="1000">
                 <a:solidFill>
                   <a:schemeClr val="tx1"/>
                 </a:solidFill>
@@ -5608,7 +5587,7 @@
           <a:p>
             <a:pPr algn="ctr"/>
             <a:r>
-              <a:rPr lang="en-US" sz="1000" dirty="0">
+              <a:rPr lang="en-US" sz="1000">
                 <a:solidFill>
                   <a:schemeClr val="tx1"/>
                 </a:solidFill>
@@ -5621,7 +5600,7 @@
           </a:p>
           <a:p>
             <a:pPr algn="ctr"/>
-            <a:endParaRPr lang="en-US" sz="1000" dirty="0">
+            <a:endParaRPr lang="en-US" sz="1000">
               <a:solidFill>
                 <a:schemeClr val="tx1"/>
               </a:solidFill>
@@ -5632,7 +5611,7 @@
           </a:p>
           <a:p>
             <a:pPr algn="ctr"/>
-            <a:endParaRPr lang="en-US" sz="1000" dirty="0">
+            <a:endParaRPr lang="en-US" sz="1000">
               <a:solidFill>
                 <a:schemeClr val="tx1"/>
               </a:solidFill>
@@ -5643,7 +5622,7 @@
           </a:p>
           <a:p>
             <a:pPr algn="ctr"/>
-            <a:endParaRPr lang="en-US" sz="1000" dirty="0">
+            <a:endParaRPr lang="en-US" sz="1000">
               <a:solidFill>
                 <a:schemeClr val="tx1"/>
               </a:solidFill>
@@ -5698,7 +5677,7 @@
           <a:p>
             <a:pPr algn="ctr"/>
             <a:r>
-              <a:rPr lang="en-US" sz="1000" b="1" dirty="0">
+              <a:rPr lang="en-US" sz="1000" b="1">
                 <a:solidFill>
                   <a:schemeClr val="tx1"/>
                 </a:solidFill>
@@ -5711,7 +5690,7 @@
           </a:p>
           <a:p>
             <a:r>
-              <a:rPr lang="en-US" sz="1067" dirty="0">
+              <a:rPr lang="en-US" sz="1067">
                 <a:solidFill>
                   <a:schemeClr val="tx1"/>
                 </a:solidFill>
@@ -5724,7 +5703,7 @@
           </a:p>
           <a:p>
             <a:r>
-              <a:rPr lang="en-US" sz="1067" dirty="0">
+              <a:rPr lang="en-US" sz="1067">
                 <a:solidFill>
                   <a:schemeClr val="tx1"/>
                 </a:solidFill>
@@ -5737,7 +5716,7 @@
           </a:p>
           <a:p>
             <a:r>
-              <a:rPr lang="en-US" sz="1067" dirty="0">
+              <a:rPr lang="en-US" sz="1067">
                 <a:solidFill>
                   <a:schemeClr val="tx1"/>
                 </a:solidFill>
@@ -5750,7 +5729,7 @@
           </a:p>
           <a:p>
             <a:r>
-              <a:rPr lang="en-US" sz="1067" dirty="0">
+              <a:rPr lang="en-US" sz="1067">
                 <a:solidFill>
                   <a:schemeClr val="tx1"/>
                 </a:solidFill>
@@ -5792,7 +5771,7 @@
           <a:lstStyle/>
           <a:p>
             <a:r>
-              <a:rPr lang="en-US" sz="1100" dirty="0">
+              <a:rPr lang="en-US" sz="1100">
                 <a:latin typeface="Menlo" panose="020B0609030804020204" pitchFamily="49" charset="0"/>
                 <a:ea typeface="Menlo" panose="020B0609030804020204" pitchFamily="49" charset="0"/>
                 <a:cs typeface="Menlo" panose="020B0609030804020204" pitchFamily="49" charset="0"/>
@@ -5848,17 +5827,6 @@
           <a:lstStyle/>
           <a:p>
             <a:pPr algn="ctr"/>
-            <a:r>
-              <a:rPr lang="en-US" sz="800" dirty="0" err="1">
-                <a:solidFill>
-                  <a:schemeClr val="tx1"/>
-                </a:solidFill>
-                <a:latin typeface="Menlo" charset="0"/>
-                <a:ea typeface="Menlo" charset="0"/>
-                <a:cs typeface="Menlo" charset="0"/>
-              </a:rPr>
-              <a:t>Zowe</a:t>
-            </a:r>
             <a:r>
               <a:rPr lang="en-US" sz="800" dirty="0">
                 <a:solidFill>
@@ -5868,7 +5836,7 @@
                 <a:ea typeface="Menlo" charset="0"/>
                 <a:cs typeface="Menlo" charset="0"/>
               </a:rPr>
-              <a:t> Desktop running in web browser</a:t>
+              <a:t>Zowe Desktop running in web browser</a:t>
             </a:r>
           </a:p>
         </p:txBody>
@@ -5924,7 +5892,7 @@
           <a:lstStyle/>
           <a:p>
             <a:pPr algn="ctr"/>
-            <a:endParaRPr lang="en-US" sz="533" dirty="0">
+            <a:endParaRPr lang="en-US" sz="533">
               <a:solidFill>
                 <a:schemeClr val="tx1"/>
               </a:solidFill>
@@ -5935,7 +5903,7 @@
           </a:p>
           <a:p>
             <a:pPr algn="ctr"/>
-            <a:endParaRPr lang="en-US" sz="533" dirty="0">
+            <a:endParaRPr lang="en-US" sz="533">
               <a:solidFill>
                 <a:schemeClr val="tx1"/>
               </a:solidFill>
@@ -5946,7 +5914,7 @@
           </a:p>
           <a:p>
             <a:pPr algn="ctr"/>
-            <a:endParaRPr lang="en-US" sz="533" dirty="0">
+            <a:endParaRPr lang="en-US" sz="533">
               <a:solidFill>
                 <a:schemeClr val="tx1"/>
               </a:solidFill>
@@ -5957,7 +5925,7 @@
           </a:p>
           <a:p>
             <a:pPr algn="ctr"/>
-            <a:endParaRPr lang="en-US" sz="533" dirty="0">
+            <a:endParaRPr lang="en-US" sz="533">
               <a:solidFill>
                 <a:schemeClr val="tx1"/>
               </a:solidFill>
@@ -5968,7 +5936,7 @@
           </a:p>
           <a:p>
             <a:pPr algn="ctr"/>
-            <a:endParaRPr lang="en-US" sz="533" dirty="0">
+            <a:endParaRPr lang="en-US" sz="533">
               <a:solidFill>
                 <a:schemeClr val="tx1"/>
               </a:solidFill>
@@ -5980,7 +5948,7 @@
           <a:p>
             <a:pPr algn="ctr"/>
             <a:r>
-              <a:rPr lang="en-US" sz="533" dirty="0">
+              <a:rPr lang="en-US" sz="533">
                 <a:solidFill>
                   <a:schemeClr val="tx1"/>
                 </a:solidFill>
@@ -6074,7 +6042,7 @@
           <a:lstStyle/>
           <a:p>
             <a:pPr algn="ctr"/>
-            <a:endParaRPr lang="en-US" sz="533" dirty="0">
+            <a:endParaRPr lang="en-US" sz="533">
               <a:solidFill>
                 <a:schemeClr val="tx1"/>
               </a:solidFill>
@@ -6085,7 +6053,7 @@
           </a:p>
           <a:p>
             <a:pPr algn="ctr"/>
-            <a:endParaRPr lang="en-US" sz="533" dirty="0">
+            <a:endParaRPr lang="en-US" sz="533">
               <a:solidFill>
                 <a:schemeClr val="tx1"/>
               </a:solidFill>
@@ -6096,7 +6064,7 @@
           </a:p>
           <a:p>
             <a:pPr algn="ctr"/>
-            <a:endParaRPr lang="en-US" sz="533" dirty="0">
+            <a:endParaRPr lang="en-US" sz="533">
               <a:solidFill>
                 <a:schemeClr val="tx1"/>
               </a:solidFill>
@@ -6107,7 +6075,7 @@
           </a:p>
           <a:p>
             <a:pPr algn="ctr"/>
-            <a:endParaRPr lang="en-US" sz="533" dirty="0">
+            <a:endParaRPr lang="en-US" sz="533">
               <a:solidFill>
                 <a:schemeClr val="tx1"/>
               </a:solidFill>
@@ -6118,7 +6086,7 @@
           </a:p>
           <a:p>
             <a:pPr algn="ctr"/>
-            <a:endParaRPr lang="en-US" sz="533" dirty="0">
+            <a:endParaRPr lang="en-US" sz="533">
               <a:solidFill>
                 <a:schemeClr val="tx1"/>
               </a:solidFill>
@@ -6130,7 +6098,7 @@
           <a:p>
             <a:pPr algn="ctr"/>
             <a:r>
-              <a:rPr lang="en-US" sz="533" dirty="0">
+              <a:rPr lang="en-US" sz="533">
                 <a:solidFill>
                   <a:schemeClr val="tx1"/>
                 </a:solidFill>
@@ -6224,7 +6192,7 @@
           <a:lstStyle/>
           <a:p>
             <a:pPr algn="ctr"/>
-            <a:endParaRPr lang="en-US" sz="533" dirty="0">
+            <a:endParaRPr lang="en-US" sz="533">
               <a:solidFill>
                 <a:schemeClr val="tx1"/>
               </a:solidFill>
@@ -6235,7 +6203,7 @@
           </a:p>
           <a:p>
             <a:pPr algn="ctr"/>
-            <a:endParaRPr lang="en-US" sz="533" dirty="0">
+            <a:endParaRPr lang="en-US" sz="533">
               <a:solidFill>
                 <a:schemeClr val="tx1"/>
               </a:solidFill>
@@ -6246,7 +6214,7 @@
           </a:p>
           <a:p>
             <a:pPr algn="ctr"/>
-            <a:endParaRPr lang="en-US" sz="533" dirty="0">
+            <a:endParaRPr lang="en-US" sz="533">
               <a:solidFill>
                 <a:schemeClr val="tx1"/>
               </a:solidFill>
@@ -6257,7 +6225,7 @@
           </a:p>
           <a:p>
             <a:pPr algn="ctr"/>
-            <a:endParaRPr lang="en-US" sz="533" dirty="0">
+            <a:endParaRPr lang="en-US" sz="533">
               <a:solidFill>
                 <a:schemeClr val="tx1"/>
               </a:solidFill>
@@ -6268,7 +6236,7 @@
           </a:p>
           <a:p>
             <a:pPr algn="ctr"/>
-            <a:endParaRPr lang="en-US" sz="533" dirty="0">
+            <a:endParaRPr lang="en-US" sz="533">
               <a:solidFill>
                 <a:schemeClr val="tx1"/>
               </a:solidFill>
@@ -6280,7 +6248,7 @@
           <a:p>
             <a:pPr algn="ctr"/>
             <a:r>
-              <a:rPr lang="en-US" sz="533" dirty="0">
+              <a:rPr lang="en-US" sz="533">
                 <a:solidFill>
                   <a:schemeClr val="tx1"/>
                 </a:solidFill>
@@ -6374,7 +6342,7 @@
           <a:lstStyle/>
           <a:p>
             <a:pPr algn="ctr"/>
-            <a:endParaRPr lang="en-US" sz="533" dirty="0">
+            <a:endParaRPr lang="en-US" sz="533">
               <a:solidFill>
                 <a:schemeClr val="tx1"/>
               </a:solidFill>
@@ -6385,7 +6353,7 @@
           </a:p>
           <a:p>
             <a:pPr algn="ctr"/>
-            <a:endParaRPr lang="en-US" sz="533" dirty="0">
+            <a:endParaRPr lang="en-US" sz="533">
               <a:solidFill>
                 <a:schemeClr val="tx1"/>
               </a:solidFill>
@@ -6396,7 +6364,7 @@
           </a:p>
           <a:p>
             <a:pPr algn="ctr"/>
-            <a:endParaRPr lang="en-US" sz="533" dirty="0">
+            <a:endParaRPr lang="en-US" sz="533">
               <a:solidFill>
                 <a:schemeClr val="tx1"/>
               </a:solidFill>
@@ -6407,7 +6375,7 @@
           </a:p>
           <a:p>
             <a:pPr algn="ctr"/>
-            <a:endParaRPr lang="en-US" sz="533" dirty="0">
+            <a:endParaRPr lang="en-US" sz="533">
               <a:solidFill>
                 <a:schemeClr val="tx1"/>
               </a:solidFill>
@@ -6418,7 +6386,7 @@
           </a:p>
           <a:p>
             <a:pPr algn="ctr"/>
-            <a:endParaRPr lang="en-US" sz="533" dirty="0">
+            <a:endParaRPr lang="en-US" sz="533">
               <a:solidFill>
                 <a:schemeClr val="tx1"/>
               </a:solidFill>
@@ -6430,7 +6398,7 @@
           <a:p>
             <a:pPr algn="ctr"/>
             <a:r>
-              <a:rPr lang="en-US" sz="533" dirty="0">
+              <a:rPr lang="en-US" sz="533">
                 <a:solidFill>
                   <a:schemeClr val="tx1"/>
                 </a:solidFill>
@@ -6524,7 +6492,7 @@
           <a:lstStyle/>
           <a:p>
             <a:pPr algn="ctr"/>
-            <a:endParaRPr lang="en-US" sz="533" dirty="0">
+            <a:endParaRPr lang="en-US" sz="533">
               <a:solidFill>
                 <a:schemeClr val="tx1"/>
               </a:solidFill>
@@ -6535,7 +6503,7 @@
           </a:p>
           <a:p>
             <a:pPr algn="ctr"/>
-            <a:endParaRPr lang="en-US" sz="533" dirty="0">
+            <a:endParaRPr lang="en-US" sz="533">
               <a:solidFill>
                 <a:schemeClr val="tx1"/>
               </a:solidFill>
@@ -6546,7 +6514,7 @@
           </a:p>
           <a:p>
             <a:pPr algn="ctr"/>
-            <a:endParaRPr lang="en-US" sz="533" dirty="0">
+            <a:endParaRPr lang="en-US" sz="533">
               <a:solidFill>
                 <a:schemeClr val="tx1"/>
               </a:solidFill>
@@ -6557,7 +6525,7 @@
           </a:p>
           <a:p>
             <a:pPr algn="ctr"/>
-            <a:endParaRPr lang="en-US" sz="533" dirty="0">
+            <a:endParaRPr lang="en-US" sz="533">
               <a:solidFill>
                 <a:schemeClr val="tx1"/>
               </a:solidFill>
@@ -6568,7 +6536,7 @@
           </a:p>
           <a:p>
             <a:pPr algn="ctr"/>
-            <a:endParaRPr lang="en-US" sz="533" dirty="0">
+            <a:endParaRPr lang="en-US" sz="533">
               <a:solidFill>
                 <a:schemeClr val="tx1"/>
               </a:solidFill>
@@ -6580,7 +6548,7 @@
           <a:p>
             <a:pPr algn="ctr"/>
             <a:r>
-              <a:rPr lang="en-US" sz="533" dirty="0">
+              <a:rPr lang="en-US" sz="533">
                 <a:solidFill>
                   <a:schemeClr val="tx1"/>
                 </a:solidFill>
@@ -6588,27 +6556,8 @@
                 <a:ea typeface="Menlo" panose="020B0609030804020204" pitchFamily="49" charset="0"/>
                 <a:cs typeface="Menlo" panose="020B0609030804020204" pitchFamily="49" charset="0"/>
               </a:rPr>
-              <a:t>VT </a:t>
-            </a:r>
-            <a:r>
-              <a:rPr lang="en-US" sz="533" dirty="0" err="1">
-                <a:solidFill>
-                  <a:schemeClr val="tx1"/>
-                </a:solidFill>
-                <a:latin typeface="Menlo" panose="020B0609030804020204" pitchFamily="49" charset="0"/>
-                <a:ea typeface="Menlo" panose="020B0609030804020204" pitchFamily="49" charset="0"/>
-                <a:cs typeface="Menlo" panose="020B0609030804020204" pitchFamily="49" charset="0"/>
-              </a:rPr>
-              <a:t>Terminak</a:t>
-            </a:r>
-            <a:endParaRPr lang="en-US" sz="533" dirty="0">
-              <a:solidFill>
-                <a:schemeClr val="tx1"/>
-              </a:solidFill>
-              <a:latin typeface="Menlo" panose="020B0609030804020204" pitchFamily="49" charset="0"/>
-              <a:ea typeface="Menlo" panose="020B0609030804020204" pitchFamily="49" charset="0"/>
-              <a:cs typeface="Menlo" panose="020B0609030804020204" pitchFamily="49" charset="0"/>
-            </a:endParaRPr>
+              <a:t>VT Terminal</a:t>
+            </a:r>
           </a:p>
         </p:txBody>
       </p:sp>
@@ -6688,7 +6637,7 @@
           <a:lstStyle/>
           <a:p>
             <a:pPr algn="ctr"/>
-            <a:endParaRPr lang="en-US" sz="1467" dirty="0">
+            <a:endParaRPr lang="en-US" sz="1467">
               <a:solidFill>
                 <a:schemeClr val="tx1"/>
               </a:solidFill>
@@ -6699,7 +6648,7 @@
           </a:p>
           <a:p>
             <a:pPr algn="ctr"/>
-            <a:endParaRPr lang="en-US" sz="1467" dirty="0">
+            <a:endParaRPr lang="en-US" sz="1467">
               <a:solidFill>
                 <a:schemeClr val="tx1"/>
               </a:solidFill>
@@ -6786,7 +6735,7 @@
           <a:p>
             <a:pPr algn="ctr"/>
             <a:r>
-              <a:rPr lang="en-US" sz="933" dirty="0">
+              <a:rPr lang="en-US" sz="933">
                 <a:solidFill>
                   <a:schemeClr val="tx1"/>
                 </a:solidFill>
@@ -6800,7 +6749,7 @@
           <a:p>
             <a:pPr algn="ctr"/>
             <a:r>
-              <a:rPr lang="en-US" sz="933" dirty="0">
+              <a:rPr lang="en-US" sz="933">
                 <a:solidFill>
                   <a:schemeClr val="tx1"/>
                 </a:solidFill>
@@ -6860,7 +6809,7 @@
           <a:p>
             <a:pPr algn="ctr"/>
             <a:r>
-              <a:rPr lang="en-US" sz="1000" dirty="0">
+              <a:rPr lang="en-US" sz="1000">
                 <a:solidFill>
                   <a:schemeClr val="tx1"/>
                 </a:solidFill>
@@ -7004,7 +6953,7 @@
           <a:p>
             <a:pPr algn="ctr"/>
             <a:r>
-              <a:rPr lang="en-US" sz="1000" dirty="0">
+              <a:rPr lang="en-US" sz="1000">
                 <a:solidFill>
                   <a:schemeClr val="tx1"/>
                 </a:solidFill>
@@ -7107,7 +7056,7 @@
           <a:p>
             <a:pPr algn="ctr"/>
             <a:r>
-              <a:rPr lang="en-US" sz="1000" dirty="0">
+              <a:rPr lang="en-US" sz="1000">
                 <a:solidFill>
                   <a:schemeClr val="tx1"/>
                 </a:solidFill>
@@ -7149,7 +7098,7 @@
           <a:lstStyle/>
           <a:p>
             <a:r>
-              <a:rPr lang="en-US" sz="1200" dirty="0"/>
+              <a:rPr lang="en-US" sz="1200"/>
               <a:t>Plugins</a:t>
             </a:r>
           </a:p>
@@ -7184,7 +7133,7 @@
           <a:lstStyle/>
           <a:p>
             <a:r>
-              <a:rPr lang="en-US" sz="1200" dirty="0"/>
+              <a:rPr lang="en-US" sz="1200"/>
               <a:t>CLI</a:t>
             </a:r>
           </a:p>
@@ -7205,6 +7154,208 @@
         <p:spPr>
           <a:xfrm>
             <a:off x="9789594" y="5238729"/>
+            <a:ext cx="729047" cy="476273"/>
+          </a:xfrm>
+          <a:prstGeom prst="rect">
+            <a:avLst/>
+          </a:prstGeom>
+          <a:solidFill>
+            <a:schemeClr val="bg1"/>
+          </a:solidFill>
+        </p:spPr>
+        <p:style>
+          <a:lnRef idx="2">
+            <a:schemeClr val="accent1">
+              <a:shade val="50000"/>
+            </a:schemeClr>
+          </a:lnRef>
+          <a:fillRef idx="1">
+            <a:schemeClr val="accent1"/>
+          </a:fillRef>
+          <a:effectRef idx="0">
+            <a:schemeClr val="accent1"/>
+          </a:effectRef>
+          <a:fontRef idx="minor">
+            <a:schemeClr val="lt1"/>
+          </a:fontRef>
+        </p:style>
+        <p:txBody>
+          <a:bodyPr rtlCol="0" anchor="ctr"/>
+          <a:lstStyle/>
+          <a:p>
+            <a:pPr algn="ctr"/>
+            <a:r>
+              <a:rPr lang="en-US" sz="933">
+                <a:solidFill>
+                  <a:schemeClr val="tx1"/>
+                </a:solidFill>
+                <a:latin typeface="Menlo" panose="020B0609030804020204" pitchFamily="49" charset="0"/>
+                <a:ea typeface="Menlo" panose="020B0609030804020204" pitchFamily="49" charset="0"/>
+                <a:cs typeface="Menlo" panose="020B0609030804020204" pitchFamily="49" charset="0"/>
+              </a:rPr>
+              <a:t>IMS Connect</a:t>
+            </a:r>
+          </a:p>
+        </p:txBody>
+      </p:sp>
+      <p:cxnSp>
+        <p:nvCxnSpPr>
+          <p:cNvPr id="96" name="Straight Arrow Connector 95">
+            <a:extLst>
+              <a:ext uri="{FF2B5EF4-FFF2-40B4-BE49-F238E27FC236}">
+                <a16:creationId xmlns:a16="http://schemas.microsoft.com/office/drawing/2014/main" id="{8461BFE1-0158-274C-AE10-9E9FC9AC283F}"/>
+              </a:ext>
+            </a:extLst>
+          </p:cNvPr>
+          <p:cNvCxnSpPr>
+            <a:cxnSpLocks/>
+          </p:cNvCxnSpPr>
+          <p:nvPr/>
+        </p:nvCxnSpPr>
+        <p:spPr>
+          <a:xfrm>
+            <a:off x="10254608" y="1346469"/>
+            <a:ext cx="0" cy="3869737"/>
+          </a:xfrm>
+          <a:prstGeom prst="straightConnector1">
+            <a:avLst/>
+          </a:prstGeom>
+          <a:ln>
+            <a:headEnd type="triangle"/>
+            <a:tailEnd type="triangle"/>
+          </a:ln>
+        </p:spPr>
+        <p:style>
+          <a:lnRef idx="1">
+            <a:schemeClr val="accent1"/>
+          </a:lnRef>
+          <a:fillRef idx="0">
+            <a:schemeClr val="accent1"/>
+          </a:fillRef>
+          <a:effectRef idx="0">
+            <a:schemeClr val="accent1"/>
+          </a:effectRef>
+          <a:fontRef idx="minor">
+            <a:schemeClr val="tx1"/>
+          </a:fontRef>
+        </p:style>
+      </p:cxnSp>
+      <p:sp>
+        <p:nvSpPr>
+          <p:cNvPr id="98" name="Rectangle 97">
+            <a:extLst>
+              <a:ext uri="{FF2B5EF4-FFF2-40B4-BE49-F238E27FC236}">
+                <a16:creationId xmlns:a16="http://schemas.microsoft.com/office/drawing/2014/main" id="{86332291-5142-D54E-A76D-38429542624A}"/>
+              </a:ext>
+            </a:extLst>
+          </p:cNvPr>
+          <p:cNvSpPr/>
+          <p:nvPr/>
+        </p:nvSpPr>
+        <p:spPr>
+          <a:xfrm>
+            <a:off x="5600905" y="5296318"/>
+            <a:ext cx="1196983" cy="476273"/>
+          </a:xfrm>
+          <a:prstGeom prst="rect">
+            <a:avLst/>
+          </a:prstGeom>
+          <a:solidFill>
+            <a:srgbClr val="00B0F0"/>
+          </a:solidFill>
+        </p:spPr>
+        <p:style>
+          <a:lnRef idx="2">
+            <a:schemeClr val="accent1">
+              <a:shade val="50000"/>
+            </a:schemeClr>
+          </a:lnRef>
+          <a:fillRef idx="1">
+            <a:schemeClr val="accent1"/>
+          </a:fillRef>
+          <a:effectRef idx="0">
+            <a:schemeClr val="accent1"/>
+          </a:effectRef>
+          <a:fontRef idx="minor">
+            <a:schemeClr val="lt1"/>
+          </a:fontRef>
+        </p:style>
+        <p:txBody>
+          <a:bodyPr rtlCol="0" anchor="ctr"/>
+          <a:lstStyle/>
+          <a:p>
+            <a:pPr algn="ctr"/>
+            <a:r>
+              <a:rPr lang="en-US" sz="933">
+                <a:solidFill>
+                  <a:schemeClr val="tx1"/>
+                </a:solidFill>
+                <a:latin typeface="Menlo" panose="020B0609030804020204" pitchFamily="49" charset="0"/>
+                <a:ea typeface="Menlo" panose="020B0609030804020204" pitchFamily="49" charset="0"/>
+                <a:cs typeface="Menlo" panose="020B0609030804020204" pitchFamily="49" charset="0"/>
+              </a:rPr>
+              <a:t>Existing REST API Server</a:t>
+            </a:r>
+          </a:p>
+        </p:txBody>
+      </p:sp>
+      <p:cxnSp>
+        <p:nvCxnSpPr>
+          <p:cNvPr id="99" name="Straight Arrow Connector 98">
+            <a:extLst>
+              <a:ext uri="{FF2B5EF4-FFF2-40B4-BE49-F238E27FC236}">
+                <a16:creationId xmlns:a16="http://schemas.microsoft.com/office/drawing/2014/main" id="{4B42528F-1505-AD4C-9BDE-78737EA3D84D}"/>
+              </a:ext>
+            </a:extLst>
+          </p:cNvPr>
+          <p:cNvCxnSpPr>
+            <a:cxnSpLocks/>
+          </p:cNvCxnSpPr>
+          <p:nvPr/>
+        </p:nvCxnSpPr>
+        <p:spPr>
+          <a:xfrm>
+            <a:off x="7746244" y="3291402"/>
+            <a:ext cx="0" cy="1994120"/>
+          </a:xfrm>
+          <a:prstGeom prst="straightConnector1">
+            <a:avLst/>
+          </a:prstGeom>
+          <a:ln>
+            <a:headEnd type="triangle"/>
+            <a:tailEnd type="triangle"/>
+          </a:ln>
+        </p:spPr>
+        <p:style>
+          <a:lnRef idx="1">
+            <a:schemeClr val="accent1"/>
+          </a:lnRef>
+          <a:fillRef idx="0">
+            <a:schemeClr val="accent1"/>
+          </a:fillRef>
+          <a:effectRef idx="0">
+            <a:schemeClr val="accent1"/>
+          </a:effectRef>
+          <a:fontRef idx="minor">
+            <a:schemeClr val="tx1"/>
+          </a:fontRef>
+        </p:style>
+      </p:cxnSp>
+      <p:sp>
+        <p:nvSpPr>
+          <p:cNvPr id="100" name="Rectangle 99">
+            <a:extLst>
+              <a:ext uri="{FF2B5EF4-FFF2-40B4-BE49-F238E27FC236}">
+                <a16:creationId xmlns:a16="http://schemas.microsoft.com/office/drawing/2014/main" id="{BE2E16C4-C228-214F-A8D2-AB42DA5A7F50}"/>
+              </a:ext>
+            </a:extLst>
+          </p:cNvPr>
+          <p:cNvSpPr/>
+          <p:nvPr/>
+        </p:nvSpPr>
+        <p:spPr>
+          <a:xfrm>
+            <a:off x="9788056" y="6006956"/>
             <a:ext cx="729047" cy="476273"/>
           </a:xfrm>
           <a:prstGeom prst="rect">
@@ -7244,17 +7395,17 @@
                 <a:ea typeface="Menlo" panose="020B0609030804020204" pitchFamily="49" charset="0"/>
                 <a:cs typeface="Menlo" panose="020B0609030804020204" pitchFamily="49" charset="0"/>
               </a:rPr>
-              <a:t>IMS Connect</a:t>
+              <a:t>IMS Plex</a:t>
             </a:r>
           </a:p>
         </p:txBody>
       </p:sp>
       <p:cxnSp>
         <p:nvCxnSpPr>
-          <p:cNvPr id="96" name="Straight Arrow Connector 95">
-            <a:extLst>
-              <a:ext uri="{FF2B5EF4-FFF2-40B4-BE49-F238E27FC236}">
-                <a16:creationId xmlns:a16="http://schemas.microsoft.com/office/drawing/2014/main" id="{8461BFE1-0158-274C-AE10-9E9FC9AC283F}"/>
+          <p:cNvPr id="101" name="Straight Arrow Connector 100">
+            <a:extLst>
+              <a:ext uri="{FF2B5EF4-FFF2-40B4-BE49-F238E27FC236}">
+                <a16:creationId xmlns:a16="http://schemas.microsoft.com/office/drawing/2014/main" id="{30262FA7-8966-D140-9D5F-195D7E4B7DC0}"/>
               </a:ext>
             </a:extLst>
           </p:cNvPr>
@@ -7265,8 +7416,8 @@
         </p:nvCxnSpPr>
         <p:spPr>
           <a:xfrm>
-            <a:off x="10254608" y="1346469"/>
-            <a:ext cx="0" cy="3869737"/>
+            <a:off x="10254608" y="5715002"/>
+            <a:ext cx="0" cy="291954"/>
           </a:xfrm>
           <a:prstGeom prst="straightConnector1">
             <a:avLst/>
@@ -7293,10 +7444,10 @@
       </p:cxnSp>
       <p:sp>
         <p:nvSpPr>
-          <p:cNvPr id="98" name="Rectangle 97">
-            <a:extLst>
-              <a:ext uri="{FF2B5EF4-FFF2-40B4-BE49-F238E27FC236}">
-                <a16:creationId xmlns:a16="http://schemas.microsoft.com/office/drawing/2014/main" id="{86332291-5142-D54E-A76D-38429542624A}"/>
+          <p:cNvPr id="102" name="Rectangle 101">
+            <a:extLst>
+              <a:ext uri="{FF2B5EF4-FFF2-40B4-BE49-F238E27FC236}">
+                <a16:creationId xmlns:a16="http://schemas.microsoft.com/office/drawing/2014/main" id="{69C93468-CA2A-FA45-8519-4E7D1360318E}"/>
               </a:ext>
             </a:extLst>
           </p:cNvPr>
@@ -7305,14 +7456,14 @@
         </p:nvSpPr>
         <p:spPr>
           <a:xfrm>
-            <a:off x="5600905" y="5296318"/>
-            <a:ext cx="1196983" cy="476273"/>
+            <a:off x="10693542" y="5238729"/>
+            <a:ext cx="729047" cy="476273"/>
           </a:xfrm>
           <a:prstGeom prst="rect">
             <a:avLst/>
           </a:prstGeom>
           <a:solidFill>
-            <a:srgbClr val="00B0F0"/>
+            <a:schemeClr val="bg1"/>
           </a:solidFill>
         </p:spPr>
         <p:style>
@@ -7337,228 +7488,7 @@
           <a:p>
             <a:pPr algn="ctr"/>
             <a:r>
-              <a:rPr lang="en-US" sz="933" dirty="0">
-                <a:solidFill>
-                  <a:schemeClr val="tx1"/>
-                </a:solidFill>
-                <a:latin typeface="Menlo" panose="020B0609030804020204" pitchFamily="49" charset="0"/>
-                <a:ea typeface="Menlo" panose="020B0609030804020204" pitchFamily="49" charset="0"/>
-                <a:cs typeface="Menlo" panose="020B0609030804020204" pitchFamily="49" charset="0"/>
-              </a:rPr>
-              <a:t>Existing REST API Server</a:t>
-            </a:r>
-          </a:p>
-        </p:txBody>
-      </p:sp>
-      <p:cxnSp>
-        <p:nvCxnSpPr>
-          <p:cNvPr id="99" name="Straight Arrow Connector 98">
-            <a:extLst>
-              <a:ext uri="{FF2B5EF4-FFF2-40B4-BE49-F238E27FC236}">
-                <a16:creationId xmlns:a16="http://schemas.microsoft.com/office/drawing/2014/main" id="{4B42528F-1505-AD4C-9BDE-78737EA3D84D}"/>
-              </a:ext>
-            </a:extLst>
-          </p:cNvPr>
-          <p:cNvCxnSpPr>
-            <a:cxnSpLocks/>
-          </p:cNvCxnSpPr>
-          <p:nvPr/>
-        </p:nvCxnSpPr>
-        <p:spPr>
-          <a:xfrm>
-            <a:off x="7746244" y="3291402"/>
-            <a:ext cx="0" cy="1994120"/>
-          </a:xfrm>
-          <a:prstGeom prst="straightConnector1">
-            <a:avLst/>
-          </a:prstGeom>
-          <a:ln>
-            <a:headEnd type="triangle"/>
-            <a:tailEnd type="triangle"/>
-          </a:ln>
-        </p:spPr>
-        <p:style>
-          <a:lnRef idx="1">
-            <a:schemeClr val="accent1"/>
-          </a:lnRef>
-          <a:fillRef idx="0">
-            <a:schemeClr val="accent1"/>
-          </a:fillRef>
-          <a:effectRef idx="0">
-            <a:schemeClr val="accent1"/>
-          </a:effectRef>
-          <a:fontRef idx="minor">
-            <a:schemeClr val="tx1"/>
-          </a:fontRef>
-        </p:style>
-      </p:cxnSp>
-      <p:sp>
-        <p:nvSpPr>
-          <p:cNvPr id="100" name="Rectangle 99">
-            <a:extLst>
-              <a:ext uri="{FF2B5EF4-FFF2-40B4-BE49-F238E27FC236}">
-                <a16:creationId xmlns:a16="http://schemas.microsoft.com/office/drawing/2014/main" id="{BE2E16C4-C228-214F-A8D2-AB42DA5A7F50}"/>
-              </a:ext>
-            </a:extLst>
-          </p:cNvPr>
-          <p:cNvSpPr/>
-          <p:nvPr/>
-        </p:nvSpPr>
-        <p:spPr>
-          <a:xfrm>
-            <a:off x="9788056" y="6006956"/>
-            <a:ext cx="729047" cy="476273"/>
-          </a:xfrm>
-          <a:prstGeom prst="rect">
-            <a:avLst/>
-          </a:prstGeom>
-          <a:solidFill>
-            <a:schemeClr val="bg1"/>
-          </a:solidFill>
-        </p:spPr>
-        <p:style>
-          <a:lnRef idx="2">
-            <a:schemeClr val="accent1">
-              <a:shade val="50000"/>
-            </a:schemeClr>
-          </a:lnRef>
-          <a:fillRef idx="1">
-            <a:schemeClr val="accent1"/>
-          </a:fillRef>
-          <a:effectRef idx="0">
-            <a:schemeClr val="accent1"/>
-          </a:effectRef>
-          <a:fontRef idx="minor">
-            <a:schemeClr val="lt1"/>
-          </a:fontRef>
-        </p:style>
-        <p:txBody>
-          <a:bodyPr rtlCol="0" anchor="ctr"/>
-          <a:lstStyle/>
-          <a:p>
-            <a:pPr algn="ctr"/>
-            <a:r>
-              <a:rPr lang="en-US" sz="933" dirty="0">
-                <a:solidFill>
-                  <a:schemeClr val="tx1"/>
-                </a:solidFill>
-                <a:latin typeface="Menlo" panose="020B0609030804020204" pitchFamily="49" charset="0"/>
-                <a:ea typeface="Menlo" panose="020B0609030804020204" pitchFamily="49" charset="0"/>
-                <a:cs typeface="Menlo" panose="020B0609030804020204" pitchFamily="49" charset="0"/>
-              </a:rPr>
-              <a:t>IMS </a:t>
-            </a:r>
-            <a:r>
-              <a:rPr lang="en-US" sz="933" dirty="0" err="1">
-                <a:solidFill>
-                  <a:schemeClr val="tx1"/>
-                </a:solidFill>
-                <a:latin typeface="Menlo" panose="020B0609030804020204" pitchFamily="49" charset="0"/>
-                <a:ea typeface="Menlo" panose="020B0609030804020204" pitchFamily="49" charset="0"/>
-                <a:cs typeface="Menlo" panose="020B0609030804020204" pitchFamily="49" charset="0"/>
-              </a:rPr>
-              <a:t>Plex</a:t>
-            </a:r>
-            <a:endParaRPr lang="en-US" sz="933" dirty="0">
-              <a:solidFill>
-                <a:schemeClr val="tx1"/>
-              </a:solidFill>
-              <a:latin typeface="Menlo" panose="020B0609030804020204" pitchFamily="49" charset="0"/>
-              <a:ea typeface="Menlo" panose="020B0609030804020204" pitchFamily="49" charset="0"/>
-              <a:cs typeface="Menlo" panose="020B0609030804020204" pitchFamily="49" charset="0"/>
-            </a:endParaRPr>
-          </a:p>
-        </p:txBody>
-      </p:sp>
-      <p:cxnSp>
-        <p:nvCxnSpPr>
-          <p:cNvPr id="101" name="Straight Arrow Connector 100">
-            <a:extLst>
-              <a:ext uri="{FF2B5EF4-FFF2-40B4-BE49-F238E27FC236}">
-                <a16:creationId xmlns:a16="http://schemas.microsoft.com/office/drawing/2014/main" id="{30262FA7-8966-D140-9D5F-195D7E4B7DC0}"/>
-              </a:ext>
-            </a:extLst>
-          </p:cNvPr>
-          <p:cNvCxnSpPr>
-            <a:cxnSpLocks/>
-          </p:cNvCxnSpPr>
-          <p:nvPr/>
-        </p:nvCxnSpPr>
-        <p:spPr>
-          <a:xfrm>
-            <a:off x="10254608" y="5715002"/>
-            <a:ext cx="0" cy="291954"/>
-          </a:xfrm>
-          <a:prstGeom prst="straightConnector1">
-            <a:avLst/>
-          </a:prstGeom>
-          <a:ln>
-            <a:headEnd type="triangle"/>
-            <a:tailEnd type="triangle"/>
-          </a:ln>
-        </p:spPr>
-        <p:style>
-          <a:lnRef idx="1">
-            <a:schemeClr val="accent1"/>
-          </a:lnRef>
-          <a:fillRef idx="0">
-            <a:schemeClr val="accent1"/>
-          </a:fillRef>
-          <a:effectRef idx="0">
-            <a:schemeClr val="accent1"/>
-          </a:effectRef>
-          <a:fontRef idx="minor">
-            <a:schemeClr val="tx1"/>
-          </a:fontRef>
-        </p:style>
-      </p:cxnSp>
-      <p:sp>
-        <p:nvSpPr>
-          <p:cNvPr id="102" name="Rectangle 101">
-            <a:extLst>
-              <a:ext uri="{FF2B5EF4-FFF2-40B4-BE49-F238E27FC236}">
-                <a16:creationId xmlns:a16="http://schemas.microsoft.com/office/drawing/2014/main" id="{69C93468-CA2A-FA45-8519-4E7D1360318E}"/>
-              </a:ext>
-            </a:extLst>
-          </p:cNvPr>
-          <p:cNvSpPr/>
-          <p:nvPr/>
-        </p:nvSpPr>
-        <p:spPr>
-          <a:xfrm>
-            <a:off x="10693542" y="5238729"/>
-            <a:ext cx="729047" cy="476273"/>
-          </a:xfrm>
-          <a:prstGeom prst="rect">
-            <a:avLst/>
-          </a:prstGeom>
-          <a:solidFill>
-            <a:schemeClr val="bg1"/>
-          </a:solidFill>
-        </p:spPr>
-        <p:style>
-          <a:lnRef idx="2">
-            <a:schemeClr val="accent1">
-              <a:shade val="50000"/>
-            </a:schemeClr>
-          </a:lnRef>
-          <a:fillRef idx="1">
-            <a:schemeClr val="accent1"/>
-          </a:fillRef>
-          <a:effectRef idx="0">
-            <a:schemeClr val="accent1"/>
-          </a:effectRef>
-          <a:fontRef idx="minor">
-            <a:schemeClr val="lt1"/>
-          </a:fontRef>
-        </p:style>
-        <p:txBody>
-          <a:bodyPr rtlCol="0" anchor="ctr"/>
-          <a:lstStyle/>
-          <a:p>
-            <a:pPr algn="ctr"/>
-            <a:r>
-              <a:rPr lang="en-US" sz="933" dirty="0">
+              <a:rPr lang="en-US" sz="933">
                 <a:solidFill>
                   <a:schemeClr val="tx1"/>
                 </a:solidFill>
@@ -7615,77 +7545,6 @@
       </p:cxnSp>
       <p:sp>
         <p:nvSpPr>
-          <p:cNvPr id="94" name="Rectangle 93">
-            <a:extLst>
-              <a:ext uri="{FF2B5EF4-FFF2-40B4-BE49-F238E27FC236}">
-                <a16:creationId xmlns:a16="http://schemas.microsoft.com/office/drawing/2014/main" id="{2E6E6968-C58B-AC42-AC3C-471BE14361C4}"/>
-              </a:ext>
-            </a:extLst>
-          </p:cNvPr>
-          <p:cNvSpPr/>
-          <p:nvPr/>
-        </p:nvSpPr>
-        <p:spPr>
-          <a:xfrm>
-            <a:off x="6878388" y="1463160"/>
-            <a:ext cx="5097850" cy="184138"/>
-          </a:xfrm>
-          <a:prstGeom prst="rect">
-            <a:avLst/>
-          </a:prstGeom>
-          <a:solidFill>
-            <a:schemeClr val="accent1">
-              <a:lumMod val="20000"/>
-              <a:lumOff val="80000"/>
-            </a:schemeClr>
-          </a:solidFill>
-        </p:spPr>
-        <p:style>
-          <a:lnRef idx="1">
-            <a:schemeClr val="accent1"/>
-          </a:lnRef>
-          <a:fillRef idx="3">
-            <a:schemeClr val="accent1"/>
-          </a:fillRef>
-          <a:effectRef idx="2">
-            <a:schemeClr val="accent1"/>
-          </a:effectRef>
-          <a:fontRef idx="minor">
-            <a:schemeClr val="lt1"/>
-          </a:fontRef>
-        </p:style>
-        <p:txBody>
-          <a:bodyPr rtlCol="0" anchor="ctr"/>
-          <a:lstStyle/>
-          <a:p>
-            <a:pPr algn="ctr"/>
-            <a:r>
-              <a:rPr lang="en-US" sz="800" dirty="0" err="1">
-                <a:solidFill>
-                  <a:schemeClr val="tx1"/>
-                </a:solidFill>
-                <a:latin typeface="Menlo" charset="0"/>
-                <a:ea typeface="Menlo" charset="0"/>
-                <a:cs typeface="Menlo" charset="0"/>
-              </a:rPr>
-              <a:t>Zowe</a:t>
-            </a:r>
-            <a:r>
-              <a:rPr lang="en-US" sz="800" dirty="0">
-                <a:solidFill>
-                  <a:schemeClr val="tx1"/>
-                </a:solidFill>
-                <a:latin typeface="Menlo" charset="0"/>
-                <a:ea typeface="Menlo" charset="0"/>
-                <a:cs typeface="Menlo" charset="0"/>
-              </a:rPr>
-              <a:t> CLI running in desktop shell</a:t>
-            </a:r>
-          </a:p>
-        </p:txBody>
-      </p:sp>
-      <p:sp>
-        <p:nvSpPr>
           <p:cNvPr id="105" name="TextBox 104">
             <a:extLst>
               <a:ext uri="{FF2B5EF4-FFF2-40B4-BE49-F238E27FC236}">
@@ -7713,18 +7572,13 @@
           <a:lstStyle/>
           <a:p>
             <a:r>
-              <a:rPr lang="en-US" sz="1100" dirty="0" err="1">
+              <a:rPr lang="en-US" sz="1100" dirty="0">
                 <a:latin typeface="Menlo" panose="020B0609030804020204" pitchFamily="49" charset="0"/>
                 <a:ea typeface="Menlo" panose="020B0609030804020204" pitchFamily="49" charset="0"/>
                 <a:cs typeface="Menlo" panose="020B0609030804020204" pitchFamily="49" charset="0"/>
               </a:rPr>
               <a:t>nnnn</a:t>
             </a:r>
-            <a:endParaRPr lang="en-US" sz="1100" dirty="0">
-              <a:latin typeface="Menlo" panose="020B0609030804020204" pitchFamily="49" charset="0"/>
-              <a:ea typeface="Menlo" panose="020B0609030804020204" pitchFamily="49" charset="0"/>
-              <a:cs typeface="Menlo" panose="020B0609030804020204" pitchFamily="49" charset="0"/>
-            </a:endParaRPr>
           </a:p>
         </p:txBody>
       </p:sp>
@@ -7774,7 +7628,7 @@
           <a:p>
             <a:pPr algn="ctr"/>
             <a:r>
-              <a:rPr lang="en-US" sz="600" dirty="0">
+              <a:rPr lang="en-US" sz="600">
                 <a:solidFill>
                   <a:schemeClr val="tx1"/>
                 </a:solidFill>
@@ -7785,7 +7639,7 @@
               <a:t>Existing</a:t>
             </a:r>
             <a:r>
-              <a:rPr lang="en-US" sz="933" dirty="0">
+              <a:rPr lang="en-US" sz="933">
                 <a:solidFill>
                   <a:schemeClr val="tx1"/>
                 </a:solidFill>
@@ -7927,7 +7781,7 @@
           <a:p>
             <a:pPr algn="ctr"/>
             <a:r>
-              <a:rPr lang="en-US" sz="1000" dirty="0">
+              <a:rPr lang="en-US" sz="1000">
                 <a:solidFill>
                   <a:schemeClr val="tx1"/>
                 </a:solidFill>
@@ -7941,7 +7795,7 @@
           <a:p>
             <a:pPr algn="ctr"/>
             <a:r>
-              <a:rPr lang="en-US" sz="600" dirty="0">
+              <a:rPr lang="en-US" sz="600">
                 <a:solidFill>
                   <a:schemeClr val="tx1"/>
                 </a:solidFill>
@@ -8043,13 +7897,13 @@
           <a:lstStyle/>
           <a:p>
             <a:r>
-              <a:rPr lang="en-US" sz="1200" dirty="0"/>
+              <a:rPr lang="en-US" sz="1200"/>
               <a:t>Visual </a:t>
             </a:r>
           </a:p>
           <a:p>
             <a:r>
-              <a:rPr lang="en-US" sz="1200" dirty="0"/>
+              <a:rPr lang="en-US" sz="1200"/>
               <a:t>Studio</a:t>
             </a:r>
           </a:p>
@@ -8126,7 +7980,7 @@
           <a:lstStyle/>
           <a:p>
             <a:r>
-              <a:rPr lang="en-US" dirty="0">
+              <a:rPr lang="en-US">
                 <a:solidFill>
                   <a:schemeClr val="accent6">
                     <a:lumMod val="60000"/>
@@ -8168,11 +8022,11 @@
           <a:lstStyle/>
           <a:p>
             <a:r>
-              <a:rPr lang="en-US" dirty="0">
+              <a:rPr lang="en-US">
                 <a:solidFill>
                   <a:schemeClr val="accent4">
-                    <a:lumMod val="40000"/>
-                    <a:lumOff val="60000"/>
+                    <a:lumMod val="60000"/>
+                    <a:lumOff val="40000"/>
                   </a:schemeClr>
                 </a:solidFill>
               </a:rPr>
@@ -8210,7 +8064,7 @@
           <a:lstStyle/>
           <a:p>
             <a:r>
-              <a:rPr lang="en-US" dirty="0">
+              <a:rPr lang="en-US">
                 <a:solidFill>
                   <a:srgbClr val="7030A0"/>
                 </a:solidFill>
@@ -8262,6 +8116,66 @@
           </a:fontRef>
         </p:style>
       </p:cxnSp>
+      <p:sp>
+        <p:nvSpPr>
+          <p:cNvPr id="94" name="Rectangle 93">
+            <a:extLst>
+              <a:ext uri="{FF2B5EF4-FFF2-40B4-BE49-F238E27FC236}">
+                <a16:creationId xmlns:a16="http://schemas.microsoft.com/office/drawing/2014/main" id="{2E6E6968-C58B-AC42-AC3C-471BE14361C4}"/>
+              </a:ext>
+            </a:extLst>
+          </p:cNvPr>
+          <p:cNvSpPr/>
+          <p:nvPr/>
+        </p:nvSpPr>
+        <p:spPr>
+          <a:xfrm>
+            <a:off x="6878388" y="1463160"/>
+            <a:ext cx="5097850" cy="184138"/>
+          </a:xfrm>
+          <a:prstGeom prst="rect">
+            <a:avLst/>
+          </a:prstGeom>
+          <a:solidFill>
+            <a:schemeClr val="accent1">
+              <a:lumMod val="20000"/>
+              <a:lumOff val="80000"/>
+            </a:schemeClr>
+          </a:solidFill>
+        </p:spPr>
+        <p:style>
+          <a:lnRef idx="1">
+            <a:schemeClr val="accent1"/>
+          </a:lnRef>
+          <a:fillRef idx="3">
+            <a:schemeClr val="accent1"/>
+          </a:fillRef>
+          <a:effectRef idx="2">
+            <a:schemeClr val="accent1"/>
+          </a:effectRef>
+          <a:fontRef idx="minor">
+            <a:schemeClr val="lt1"/>
+          </a:fontRef>
+        </p:style>
+        <p:txBody>
+          <a:bodyPr rtlCol="0" anchor="ctr"/>
+          <a:lstStyle/>
+          <a:p>
+            <a:pPr algn="ctr"/>
+            <a:r>
+              <a:rPr lang="en-US" sz="800" dirty="0">
+                <a:solidFill>
+                  <a:schemeClr val="tx1"/>
+                </a:solidFill>
+                <a:latin typeface="Menlo" charset="0"/>
+                <a:ea typeface="Menlo" charset="0"/>
+                <a:cs typeface="Menlo" charset="0"/>
+              </a:rPr>
+              <a:t>Zowe CLI running in desktop shell</a:t>
+            </a:r>
+          </a:p>
+        </p:txBody>
+      </p:sp>
     </p:spTree>
     <p:extLst>
       <p:ext uri="{BB962C8B-B14F-4D97-AF65-F5344CB8AC3E}">

</xml_diff>

<commit_message>
configure-certificate chapter for 1.15
Signed-off-by: Joe-Winchester <winchest@uk.ibm.com>
</commit_message>
<xml_diff>
--- a/docs/images/common/zowe-architecture.pptx
+++ b/docs/images/common/zowe-architecture.pptx
@@ -197,7 +197,7 @@
           <a:p>
             <a:fld id="{26E70E1E-3B7C-8D4D-B700-360134022E14}" type="datetimeFigureOut">
               <a:rPr lang="en-CN" smtClean="0"/>
-              <a:t>2020/8/5</a:t>
+              <a:t>9/2/20</a:t>
             </a:fld>
             <a:endParaRPr lang="en-CN"/>
           </a:p>
@@ -699,7 +699,7 @@
           <a:p>
             <a:fld id="{B1DB1BE8-3F77-D044-8747-9903AC5CD864}" type="datetimeFigureOut">
               <a:rPr lang="en-US" smtClean="0"/>
-              <a:t>8/5/20</a:t>
+              <a:t>9/2/20</a:t>
             </a:fld>
             <a:endParaRPr lang="en-US"/>
           </a:p>
@@ -897,7 +897,7 @@
           <a:p>
             <a:fld id="{B1DB1BE8-3F77-D044-8747-9903AC5CD864}" type="datetimeFigureOut">
               <a:rPr lang="en-US" smtClean="0"/>
-              <a:t>8/5/20</a:t>
+              <a:t>9/2/20</a:t>
             </a:fld>
             <a:endParaRPr lang="en-US"/>
           </a:p>
@@ -1105,7 +1105,7 @@
           <a:p>
             <a:fld id="{B1DB1BE8-3F77-D044-8747-9903AC5CD864}" type="datetimeFigureOut">
               <a:rPr lang="en-US" smtClean="0"/>
-              <a:t>8/5/20</a:t>
+              <a:t>9/2/20</a:t>
             </a:fld>
             <a:endParaRPr lang="en-US"/>
           </a:p>
@@ -1303,7 +1303,7 @@
           <a:p>
             <a:fld id="{B1DB1BE8-3F77-D044-8747-9903AC5CD864}" type="datetimeFigureOut">
               <a:rPr lang="en-US" smtClean="0"/>
-              <a:t>8/5/20</a:t>
+              <a:t>9/2/20</a:t>
             </a:fld>
             <a:endParaRPr lang="en-US"/>
           </a:p>
@@ -1578,7 +1578,7 @@
           <a:p>
             <a:fld id="{B1DB1BE8-3F77-D044-8747-9903AC5CD864}" type="datetimeFigureOut">
               <a:rPr lang="en-US" smtClean="0"/>
-              <a:t>8/5/20</a:t>
+              <a:t>9/2/20</a:t>
             </a:fld>
             <a:endParaRPr lang="en-US"/>
           </a:p>
@@ -1843,7 +1843,7 @@
           <a:p>
             <a:fld id="{B1DB1BE8-3F77-D044-8747-9903AC5CD864}" type="datetimeFigureOut">
               <a:rPr lang="en-US" smtClean="0"/>
-              <a:t>8/5/20</a:t>
+              <a:t>9/2/20</a:t>
             </a:fld>
             <a:endParaRPr lang="en-US"/>
           </a:p>
@@ -2255,7 +2255,7 @@
           <a:p>
             <a:fld id="{B1DB1BE8-3F77-D044-8747-9903AC5CD864}" type="datetimeFigureOut">
               <a:rPr lang="en-US" smtClean="0"/>
-              <a:t>8/5/20</a:t>
+              <a:t>9/2/20</a:t>
             </a:fld>
             <a:endParaRPr lang="en-US"/>
           </a:p>
@@ -2396,7 +2396,7 @@
           <a:p>
             <a:fld id="{B1DB1BE8-3F77-D044-8747-9903AC5CD864}" type="datetimeFigureOut">
               <a:rPr lang="en-US" smtClean="0"/>
-              <a:t>8/5/20</a:t>
+              <a:t>9/2/20</a:t>
             </a:fld>
             <a:endParaRPr lang="en-US"/>
           </a:p>
@@ -2509,7 +2509,7 @@
           <a:p>
             <a:fld id="{B1DB1BE8-3F77-D044-8747-9903AC5CD864}" type="datetimeFigureOut">
               <a:rPr lang="en-US" smtClean="0"/>
-              <a:t>8/5/20</a:t>
+              <a:t>9/2/20</a:t>
             </a:fld>
             <a:endParaRPr lang="en-US"/>
           </a:p>
@@ -2820,7 +2820,7 @@
           <a:p>
             <a:fld id="{B1DB1BE8-3F77-D044-8747-9903AC5CD864}" type="datetimeFigureOut">
               <a:rPr lang="en-US" smtClean="0"/>
-              <a:t>8/5/20</a:t>
+              <a:t>9/2/20</a:t>
             </a:fld>
             <a:endParaRPr lang="en-US"/>
           </a:p>
@@ -3108,7 +3108,7 @@
           <a:p>
             <a:fld id="{B1DB1BE8-3F77-D044-8747-9903AC5CD864}" type="datetimeFigureOut">
               <a:rPr lang="en-US" smtClean="0"/>
-              <a:t>8/5/20</a:t>
+              <a:t>9/2/20</a:t>
             </a:fld>
             <a:endParaRPr lang="en-US"/>
           </a:p>
@@ -3349,7 +3349,7 @@
           <a:p>
             <a:fld id="{B1DB1BE8-3F77-D044-8747-9903AC5CD864}" type="datetimeFigureOut">
               <a:rPr lang="en-US" smtClean="0"/>
-              <a:t>8/5/20</a:t>
+              <a:t>9/2/20</a:t>
             </a:fld>
             <a:endParaRPr lang="en-US"/>
           </a:p>
@@ -3908,7 +3908,7 @@
         </p:nvSpPr>
         <p:spPr>
           <a:xfrm>
-            <a:off x="745597" y="6047038"/>
+            <a:off x="698845" y="6044599"/>
             <a:ext cx="3814003" cy="631886"/>
           </a:xfrm>
           <a:prstGeom prst="rect">
@@ -4177,13 +4177,14 @@
           </p:cNvPr>
           <p:cNvCxnSpPr>
             <a:cxnSpLocks/>
+            <a:stCxn id="107" idx="3"/>
           </p:cNvCxnSpPr>
           <p:nvPr/>
         </p:nvCxnSpPr>
         <p:spPr>
-          <a:xfrm rot="16200000" flipH="1">
-            <a:off x="5829898" y="1307076"/>
-            <a:ext cx="1191855" cy="1145836"/>
+          <a:xfrm>
+            <a:off x="5953663" y="996312"/>
+            <a:ext cx="1259416" cy="891932"/>
           </a:xfrm>
           <a:prstGeom prst="bentConnector3">
             <a:avLst/>
@@ -4438,8 +4439,8 @@
         </p:nvSpPr>
         <p:spPr>
           <a:xfrm rot="5400000">
-            <a:off x="4640977" y="-1145926"/>
-            <a:ext cx="599846" cy="7809852"/>
+            <a:off x="3801862" y="-306811"/>
+            <a:ext cx="599846" cy="6131621"/>
           </a:xfrm>
           <a:prstGeom prst="rect">
             <a:avLst/>
@@ -5822,7 +5823,9 @@
             <a:avLst/>
           </a:prstGeom>
           <a:solidFill>
-            <a:srgbClr val="3D68B1"/>
+            <a:srgbClr val="7030A0">
+              <a:alpha val="75000"/>
+            </a:srgbClr>
           </a:solidFill>
         </p:spPr>
         <p:style>
@@ -5920,7 +5923,9 @@
             <a:avLst/>
           </a:prstGeom>
           <a:solidFill>
-            <a:srgbClr val="3D68B1"/>
+            <a:srgbClr val="7030A0">
+              <a:alpha val="75000"/>
+            </a:srgbClr>
           </a:solidFill>
         </p:spPr>
         <p:style>
@@ -6061,7 +6066,14 @@
           <a:prstGeom prst="rect">
             <a:avLst/>
           </a:prstGeom>
-          <a:noFill/>
+          <a:pattFill prst="pct5">
+            <a:fgClr>
+              <a:schemeClr val="accent1"/>
+            </a:fgClr>
+            <a:bgClr>
+              <a:schemeClr val="bg1"/>
+            </a:bgClr>
+          </a:pattFill>
         </p:spPr>
         <p:style>
           <a:lnRef idx="2">
@@ -6114,8 +6126,8 @@
         </p:nvCxnSpPr>
         <p:spPr>
           <a:xfrm>
-            <a:off x="7015567" y="3058920"/>
-            <a:ext cx="29765" cy="2426621"/>
+            <a:off x="7214889" y="1284377"/>
+            <a:ext cx="14882" cy="4168708"/>
           </a:xfrm>
           <a:prstGeom prst="straightConnector1">
             <a:avLst/>
@@ -6160,7 +6172,14 @@
           <a:prstGeom prst="rect">
             <a:avLst/>
           </a:prstGeom>
-          <a:noFill/>
+          <a:pattFill prst="pct5">
+            <a:fgClr>
+              <a:schemeClr val="accent1"/>
+            </a:fgClr>
+            <a:bgClr>
+              <a:schemeClr val="bg1"/>
+            </a:bgClr>
+          </a:pattFill>
         </p:spPr>
         <p:style>
           <a:lnRef idx="2">
@@ -7095,7 +7114,9 @@
             <a:avLst/>
           </a:prstGeom>
           <a:solidFill>
-            <a:schemeClr val="bg1"/>
+            <a:srgbClr val="00B19E">
+              <a:alpha val="96000"/>
+            </a:srgbClr>
           </a:solidFill>
           <a:ln>
             <a:solidFill>
@@ -7278,7 +7299,7 @@
             <a:avLst/>
           </a:prstGeom>
           <a:solidFill>
-            <a:schemeClr val="bg1"/>
+            <a:srgbClr val="00B19E"/>
           </a:solidFill>
           <a:ln>
             <a:solidFill>
@@ -7319,48 +7340,6 @@
           </a:p>
         </p:txBody>
       </p:sp>
-      <p:cxnSp>
-        <p:nvCxnSpPr>
-          <p:cNvPr id="88" name="Straight Arrow Connector 87">
-            <a:extLst>
-              <a:ext uri="{FF2B5EF4-FFF2-40B4-BE49-F238E27FC236}">
-                <a16:creationId xmlns:a16="http://schemas.microsoft.com/office/drawing/2014/main" id="{5ABE9537-3590-D944-A6EF-674D2E7A9B42}"/>
-              </a:ext>
-            </a:extLst>
-          </p:cNvPr>
-          <p:cNvCxnSpPr>
-            <a:cxnSpLocks/>
-          </p:cNvCxnSpPr>
-          <p:nvPr/>
-        </p:nvCxnSpPr>
-        <p:spPr>
-          <a:xfrm>
-            <a:off x="8180765" y="1673444"/>
-            <a:ext cx="0" cy="759483"/>
-          </a:xfrm>
-          <a:prstGeom prst="straightConnector1">
-            <a:avLst/>
-          </a:prstGeom>
-          <a:ln>
-            <a:headEnd type="triangle"/>
-            <a:tailEnd type="triangle"/>
-          </a:ln>
-        </p:spPr>
-        <p:style>
-          <a:lnRef idx="1">
-            <a:schemeClr val="accent1"/>
-          </a:lnRef>
-          <a:fillRef idx="0">
-            <a:schemeClr val="accent1"/>
-          </a:fillRef>
-          <a:effectRef idx="0">
-            <a:schemeClr val="accent1"/>
-          </a:effectRef>
-          <a:fontRef idx="minor">
-            <a:schemeClr val="tx1"/>
-          </a:fontRef>
-        </p:style>
-      </p:cxnSp>
       <p:sp>
         <p:nvSpPr>
           <p:cNvPr id="90" name="Rectangle 89">
@@ -7382,7 +7361,7 @@
             <a:avLst/>
           </a:prstGeom>
           <a:solidFill>
-            <a:schemeClr val="bg1"/>
+            <a:srgbClr val="00B19E"/>
           </a:solidFill>
           <a:ln>
             <a:solidFill>
@@ -7423,49 +7402,6 @@
           </a:p>
         </p:txBody>
       </p:sp>
-      <p:cxnSp>
-        <p:nvCxnSpPr>
-          <p:cNvPr id="91" name="Straight Arrow Connector 90">
-            <a:extLst>
-              <a:ext uri="{FF2B5EF4-FFF2-40B4-BE49-F238E27FC236}">
-                <a16:creationId xmlns:a16="http://schemas.microsoft.com/office/drawing/2014/main" id="{A402D5FD-2326-384E-AC6C-9A6F2F0C7F10}"/>
-              </a:ext>
-            </a:extLst>
-          </p:cNvPr>
-          <p:cNvCxnSpPr>
-            <a:cxnSpLocks/>
-          </p:cNvCxnSpPr>
-          <p:nvPr/>
-        </p:nvCxnSpPr>
-        <p:spPr>
-          <a:xfrm>
-            <a:off x="8420605" y="2459074"/>
-            <a:ext cx="0" cy="599846"/>
-          </a:xfrm>
-          <a:prstGeom prst="straightConnector1">
-            <a:avLst/>
-          </a:prstGeom>
-          <a:ln>
-            <a:prstDash val="dash"/>
-            <a:headEnd type="triangle"/>
-            <a:tailEnd type="triangle"/>
-          </a:ln>
-        </p:spPr>
-        <p:style>
-          <a:lnRef idx="1">
-            <a:schemeClr val="accent1"/>
-          </a:lnRef>
-          <a:fillRef idx="0">
-            <a:schemeClr val="accent1"/>
-          </a:fillRef>
-          <a:effectRef idx="0">
-            <a:schemeClr val="accent1"/>
-          </a:effectRef>
-          <a:fontRef idx="minor">
-            <a:schemeClr val="tx1"/>
-          </a:fontRef>
-        </p:style>
-      </p:cxnSp>
       <p:sp>
         <p:nvSpPr>
           <p:cNvPr id="92" name="Rectangle 91">
@@ -7487,7 +7423,7 @@
             <a:avLst/>
           </a:prstGeom>
           <a:solidFill>
-            <a:schemeClr val="bg1"/>
+            <a:srgbClr val="00B19E"/>
           </a:solidFill>
           <a:ln>
             <a:solidFill>
@@ -7542,15 +7478,20 @@
         </p:nvSpPr>
         <p:spPr>
           <a:xfrm>
-            <a:off x="9241967" y="6252890"/>
+            <a:off x="9241967" y="6218165"/>
             <a:ext cx="647780" cy="476275"/>
           </a:xfrm>
           <a:prstGeom prst="rect">
             <a:avLst/>
           </a:prstGeom>
-          <a:solidFill>
-            <a:schemeClr val="bg1"/>
-          </a:solidFill>
+          <a:pattFill prst="pct5">
+            <a:fgClr>
+              <a:schemeClr val="accent1"/>
+            </a:fgClr>
+            <a:bgClr>
+              <a:schemeClr val="bg1"/>
+            </a:bgClr>
+          </a:pattFill>
         </p:spPr>
         <p:style>
           <a:lnRef idx="2">
@@ -7608,9 +7549,7 @@
             <a:avLst/>
           </a:prstGeom>
           <a:solidFill>
-            <a:schemeClr val="accent1">
-              <a:lumMod val="75000"/>
-            </a:schemeClr>
+            <a:srgbClr val="7C7B7B"/>
           </a:solidFill>
         </p:spPr>
         <p:style>
@@ -7664,8 +7603,8 @@
         </p:nvCxnSpPr>
         <p:spPr>
           <a:xfrm>
-            <a:off x="8420605" y="3069852"/>
-            <a:ext cx="1" cy="2377762"/>
+            <a:off x="8390841" y="1319953"/>
+            <a:ext cx="29765" cy="4127661"/>
           </a:xfrm>
           <a:prstGeom prst="straightConnector1">
             <a:avLst/>
@@ -7710,9 +7649,14 @@
           <a:prstGeom prst="rect">
             <a:avLst/>
           </a:prstGeom>
-          <a:solidFill>
-            <a:schemeClr val="bg1"/>
-          </a:solidFill>
+          <a:pattFill prst="pct5">
+            <a:fgClr>
+              <a:schemeClr val="accent1"/>
+            </a:fgClr>
+            <a:bgClr>
+              <a:schemeClr val="bg1"/>
+            </a:bgClr>
+          </a:pattFill>
         </p:spPr>
         <p:style>
           <a:lnRef idx="2">
@@ -7809,9 +7753,7 @@
             <a:avLst/>
           </a:prstGeom>
           <a:solidFill>
-            <a:schemeClr val="accent1">
-              <a:lumMod val="75000"/>
-            </a:schemeClr>
+            <a:srgbClr val="7C7B7B"/>
           </a:solidFill>
         </p:spPr>
         <p:style>
@@ -7849,48 +7791,6 @@
           </a:p>
         </p:txBody>
       </p:sp>
-      <p:cxnSp>
-        <p:nvCxnSpPr>
-          <p:cNvPr id="110" name="Elbow Connector 109">
-            <a:extLst>
-              <a:ext uri="{FF2B5EF4-FFF2-40B4-BE49-F238E27FC236}">
-                <a16:creationId xmlns:a16="http://schemas.microsoft.com/office/drawing/2014/main" id="{5435654E-4C18-3B44-9A64-D86783FFA281}"/>
-              </a:ext>
-            </a:extLst>
-          </p:cNvPr>
-          <p:cNvCxnSpPr>
-            <a:cxnSpLocks/>
-          </p:cNvCxnSpPr>
-          <p:nvPr/>
-        </p:nvCxnSpPr>
-        <p:spPr>
-          <a:xfrm rot="5400000">
-            <a:off x="6593628" y="1818609"/>
-            <a:ext cx="1124367" cy="127056"/>
-          </a:xfrm>
-          <a:prstGeom prst="bentConnector3">
-            <a:avLst/>
-          </a:prstGeom>
-          <a:ln>
-            <a:headEnd type="triangle"/>
-            <a:tailEnd type="triangle"/>
-          </a:ln>
-        </p:spPr>
-        <p:style>
-          <a:lnRef idx="1">
-            <a:schemeClr val="accent1"/>
-          </a:lnRef>
-          <a:fillRef idx="0">
-            <a:schemeClr val="accent1"/>
-          </a:fillRef>
-          <a:effectRef idx="0">
-            <a:schemeClr val="accent1"/>
-          </a:effectRef>
-          <a:fontRef idx="minor">
-            <a:schemeClr val="tx1"/>
-          </a:fontRef>
-        </p:style>
-      </p:cxnSp>
       <p:sp>
         <p:nvSpPr>
           <p:cNvPr id="112" name="Rectangle 111">
@@ -7912,9 +7812,7 @@
             <a:avLst/>
           </a:prstGeom>
           <a:solidFill>
-            <a:schemeClr val="accent1">
-              <a:lumMod val="75000"/>
-            </a:schemeClr>
+            <a:srgbClr val="7C7B7B"/>
           </a:solidFill>
         </p:spPr>
         <p:style>
@@ -8146,122 +8044,6 @@
               </a:rPr>
               <a:t>node</a:t>
             </a:r>
-          </a:p>
-        </p:txBody>
-      </p:sp>
-      <p:sp>
-        <p:nvSpPr>
-          <p:cNvPr id="117" name="TextBox 116">
-            <a:extLst>
-              <a:ext uri="{FF2B5EF4-FFF2-40B4-BE49-F238E27FC236}">
-                <a16:creationId xmlns:a16="http://schemas.microsoft.com/office/drawing/2014/main" id="{50850BE5-F13B-E94A-9661-ACFDE147256B}"/>
-              </a:ext>
-            </a:extLst>
-          </p:cNvPr>
-          <p:cNvSpPr txBox="1"/>
-          <p:nvPr/>
-        </p:nvSpPr>
-        <p:spPr>
-          <a:xfrm>
-            <a:off x="8570251" y="3071080"/>
-            <a:ext cx="562975" cy="307777"/>
-          </a:xfrm>
-          <a:prstGeom prst="rect">
-            <a:avLst/>
-          </a:prstGeom>
-          <a:noFill/>
-        </p:spPr>
-        <p:txBody>
-          <a:bodyPr wrap="none" rtlCol="0">
-            <a:spAutoFit/>
-          </a:bodyPr>
-          <a:lstStyle/>
-          <a:p>
-            <a:r>
-              <a:rPr lang="en-US" sz="1400" dirty="0">
-                <a:solidFill>
-                  <a:schemeClr val="accent4">
-                    <a:lumMod val="75000"/>
-                  </a:schemeClr>
-                </a:solidFill>
-                <a:latin typeface="Arial" panose="020B0604020202020204" pitchFamily="34" charset="0"/>
-                <a:cs typeface="Arial" panose="020B0604020202020204" pitchFamily="34" charset="0"/>
-              </a:rPr>
-              <a:t>Java</a:t>
-            </a:r>
-          </a:p>
-        </p:txBody>
-      </p:sp>
-      <p:sp>
-        <p:nvSpPr>
-          <p:cNvPr id="118" name="TextBox 117">
-            <a:extLst>
-              <a:ext uri="{FF2B5EF4-FFF2-40B4-BE49-F238E27FC236}">
-                <a16:creationId xmlns:a16="http://schemas.microsoft.com/office/drawing/2014/main" id="{441AA412-E83B-4342-90AD-5803F84BB144}"/>
-              </a:ext>
-            </a:extLst>
-          </p:cNvPr>
-          <p:cNvSpPr txBox="1"/>
-          <p:nvPr/>
-        </p:nvSpPr>
-        <p:spPr>
-          <a:xfrm>
-            <a:off x="1971761" y="4586209"/>
-            <a:ext cx="891591" cy="338554"/>
-          </a:xfrm>
-          <a:prstGeom prst="rect">
-            <a:avLst/>
-          </a:prstGeom>
-          <a:noFill/>
-        </p:spPr>
-        <p:txBody>
-          <a:bodyPr wrap="none" rtlCol="0">
-            <a:spAutoFit/>
-          </a:bodyPr>
-          <a:lstStyle/>
-          <a:p>
-            <a:r>
-              <a:rPr lang="en-US" sz="1600" dirty="0">
-                <a:solidFill>
-                  <a:srgbClr val="7030A0"/>
-                </a:solidFill>
-                <a:latin typeface="Arial" panose="020B0604020202020204" pitchFamily="34" charset="0"/>
-                <a:cs typeface="Arial" panose="020B0604020202020204" pitchFamily="34" charset="0"/>
-              </a:rPr>
-              <a:t>metal C</a:t>
-            </a:r>
-          </a:p>
-        </p:txBody>
-      </p:sp>
-      <p:sp>
-        <p:nvSpPr>
-          <p:cNvPr id="36" name="TextBox 35">
-            <a:extLst>
-              <a:ext uri="{FF2B5EF4-FFF2-40B4-BE49-F238E27FC236}">
-                <a16:creationId xmlns:a16="http://schemas.microsoft.com/office/drawing/2014/main" id="{1C3EC10F-89E4-5D41-91AE-7069C2A0F22F}"/>
-              </a:ext>
-            </a:extLst>
-          </p:cNvPr>
-          <p:cNvSpPr txBox="1"/>
-          <p:nvPr/>
-        </p:nvSpPr>
-        <p:spPr>
-          <a:xfrm>
-            <a:off x="4378169" y="5677786"/>
-            <a:ext cx="184731" cy="369332"/>
-          </a:xfrm>
-          <a:prstGeom prst="rect">
-            <a:avLst/>
-          </a:prstGeom>
-          <a:noFill/>
-        </p:spPr>
-        <p:txBody>
-          <a:bodyPr wrap="none" rtlCol="0">
-            <a:spAutoFit/>
-          </a:bodyPr>
-          <a:lstStyle/>
-          <a:p>
-            <a:endParaRPr lang="en-US" dirty="0"/>
           </a:p>
         </p:txBody>
       </p:sp>
@@ -8714,47 +8496,6 @@
           </a:p>
         </p:txBody>
       </p:sp>
-      <p:sp>
-        <p:nvSpPr>
-          <p:cNvPr id="144" name="TextBox 143">
-            <a:extLst>
-              <a:ext uri="{FF2B5EF4-FFF2-40B4-BE49-F238E27FC236}">
-                <a16:creationId xmlns:a16="http://schemas.microsoft.com/office/drawing/2014/main" id="{7C63BE34-CBB7-A843-8086-348B4DEBE3C4}"/>
-              </a:ext>
-            </a:extLst>
-          </p:cNvPr>
-          <p:cNvSpPr txBox="1"/>
-          <p:nvPr/>
-        </p:nvSpPr>
-        <p:spPr>
-          <a:xfrm>
-            <a:off x="2092565" y="6268594"/>
-            <a:ext cx="332142" cy="338554"/>
-          </a:xfrm>
-          <a:prstGeom prst="rect">
-            <a:avLst/>
-          </a:prstGeom>
-          <a:noFill/>
-        </p:spPr>
-        <p:txBody>
-          <a:bodyPr wrap="none" rtlCol="0">
-            <a:spAutoFit/>
-          </a:bodyPr>
-          <a:lstStyle/>
-          <a:p>
-            <a:r>
-              <a:rPr lang="en-US" sz="1600" dirty="0">
-                <a:solidFill>
-                  <a:srgbClr val="7030A0"/>
-                </a:solidFill>
-                <a:latin typeface="Arial" panose="020B0604020202020204" pitchFamily="34" charset="0"/>
-                <a:cs typeface="Arial" panose="020B0604020202020204" pitchFamily="34" charset="0"/>
-              </a:rPr>
-              <a:t>C</a:t>
-            </a:r>
-          </a:p>
-        </p:txBody>
-      </p:sp>
       <p:cxnSp>
         <p:nvCxnSpPr>
           <p:cNvPr id="67" name="Straight Arrow Connector 66">
@@ -8811,7 +8552,7 @@
         </p:nvSpPr>
         <p:spPr>
           <a:xfrm>
-            <a:off x="3028030" y="6236904"/>
+            <a:off x="2912349" y="6218165"/>
             <a:ext cx="1448579" cy="307777"/>
           </a:xfrm>
           <a:prstGeom prst="rect">
@@ -8952,7 +8693,14 @@
           <a:prstGeom prst="rect">
             <a:avLst/>
           </a:prstGeom>
-          <a:noFill/>
+          <a:pattFill prst="pct5">
+            <a:fgClr>
+              <a:schemeClr val="accent1"/>
+            </a:fgClr>
+            <a:bgClr>
+              <a:schemeClr val="bg1"/>
+            </a:bgClr>
+          </a:pattFill>
           <a:ln>
             <a:solidFill>
               <a:schemeClr val="tx1"/>
@@ -9011,7 +8759,7 @@
         <p:spPr>
           <a:xfrm>
             <a:off x="9606489" y="5944978"/>
-            <a:ext cx="0" cy="323616"/>
+            <a:ext cx="0" cy="230426"/>
           </a:xfrm>
           <a:prstGeom prst="straightConnector1">
             <a:avLst/>
@@ -9057,7 +8805,7 @@
             <a:avLst/>
           </a:prstGeom>
           <a:solidFill>
-            <a:schemeClr val="bg1"/>
+            <a:srgbClr val="00B19E"/>
           </a:solidFill>
           <a:ln>
             <a:solidFill>
@@ -9118,9 +8866,14 @@
           <a:prstGeom prst="rect">
             <a:avLst/>
           </a:prstGeom>
-          <a:solidFill>
-            <a:schemeClr val="bg1"/>
-          </a:solidFill>
+          <a:pattFill prst="pct10">
+            <a:fgClr>
+              <a:schemeClr val="accent1"/>
+            </a:fgClr>
+            <a:bgClr>
+              <a:schemeClr val="bg1"/>
+            </a:bgClr>
+          </a:pattFill>
         </p:spPr>
         <p:style>
           <a:lnRef idx="2">
@@ -9208,49 +8961,6 @@
           </a:p>
         </p:txBody>
       </p:sp>
-      <p:cxnSp>
-        <p:nvCxnSpPr>
-          <p:cNvPr id="123" name="Straight Arrow Connector 122">
-            <a:extLst>
-              <a:ext uri="{FF2B5EF4-FFF2-40B4-BE49-F238E27FC236}">
-                <a16:creationId xmlns:a16="http://schemas.microsoft.com/office/drawing/2014/main" id="{7D5D21BC-0A38-A343-B5CB-C83D20C1AA37}"/>
-              </a:ext>
-            </a:extLst>
-          </p:cNvPr>
-          <p:cNvCxnSpPr>
-            <a:cxnSpLocks/>
-          </p:cNvCxnSpPr>
-          <p:nvPr/>
-        </p:nvCxnSpPr>
-        <p:spPr>
-          <a:xfrm>
-            <a:off x="7018489" y="2476232"/>
-            <a:ext cx="0" cy="599846"/>
-          </a:xfrm>
-          <a:prstGeom prst="straightConnector1">
-            <a:avLst/>
-          </a:prstGeom>
-          <a:ln>
-            <a:prstDash val="dash"/>
-            <a:headEnd type="triangle"/>
-            <a:tailEnd type="triangle"/>
-          </a:ln>
-        </p:spPr>
-        <p:style>
-          <a:lnRef idx="1">
-            <a:schemeClr val="accent1"/>
-          </a:lnRef>
-          <a:fillRef idx="0">
-            <a:schemeClr val="accent1"/>
-          </a:fillRef>
-          <a:effectRef idx="0">
-            <a:schemeClr val="accent1"/>
-          </a:effectRef>
-          <a:fontRef idx="minor">
-            <a:schemeClr val="tx1"/>
-          </a:fontRef>
-        </p:style>
-      </p:cxnSp>
       <p:sp>
         <p:nvSpPr>
           <p:cNvPr id="124" name="Rectangle 123">
@@ -9265,8 +8975,8 @@
         </p:nvSpPr>
         <p:spPr>
           <a:xfrm rot="5400000">
-            <a:off x="10046780" y="1277063"/>
-            <a:ext cx="599846" cy="2965535"/>
+            <a:off x="9198610" y="428893"/>
+            <a:ext cx="599846" cy="4661875"/>
           </a:xfrm>
           <a:prstGeom prst="rect">
             <a:avLst/>
@@ -9641,8 +9351,8 @@
         </p:nvSpPr>
         <p:spPr>
           <a:xfrm>
-            <a:off x="9543295" y="2483114"/>
-            <a:ext cx="2124299" cy="235449"/>
+            <a:off x="8846286" y="2518905"/>
+            <a:ext cx="2157963" cy="235449"/>
           </a:xfrm>
           <a:prstGeom prst="rect">
             <a:avLst/>
@@ -9660,7 +9370,7 @@
                 <a:latin typeface="Arial" panose="020B0604020202020204" pitchFamily="34" charset="0"/>
                 <a:cs typeface="Arial" panose="020B0604020202020204" pitchFamily="34" charset="0"/>
               </a:rPr>
-              <a:t>(optional       needed for   SSO/MFA)</a:t>
+              <a:t>(optional       needed for    SSO/MFA)</a:t>
             </a:r>
           </a:p>
         </p:txBody>
@@ -9963,9 +9673,14 @@
           <a:prstGeom prst="rect">
             <a:avLst/>
           </a:prstGeom>
-          <a:solidFill>
-            <a:schemeClr val="bg1"/>
-          </a:solidFill>
+          <a:pattFill prst="pct5">
+            <a:fgClr>
+              <a:schemeClr val="accent1"/>
+            </a:fgClr>
+            <a:bgClr>
+              <a:schemeClr val="bg1"/>
+            </a:bgClr>
+          </a:pattFill>
         </p:spPr>
         <p:style>
           <a:lnRef idx="2">
@@ -10022,9 +9737,14 @@
           <a:prstGeom prst="rect">
             <a:avLst/>
           </a:prstGeom>
-          <a:solidFill>
-            <a:schemeClr val="bg1"/>
-          </a:solidFill>
+          <a:pattFill prst="pct5">
+            <a:fgClr>
+              <a:schemeClr val="accent1"/>
+            </a:fgClr>
+            <a:bgClr>
+              <a:schemeClr val="bg1"/>
+            </a:bgClr>
+          </a:pattFill>
         </p:spPr>
         <p:style>
           <a:lnRef idx="2">
@@ -10137,7 +9857,7 @@
                 <a:ea typeface="Menlo" panose="020B0609030804020204" pitchFamily="49" charset="0"/>
                 <a:cs typeface="Arial" panose="020B0604020202020204" pitchFamily="34" charset="0"/>
               </a:rPr>
-              <a:t>23</a:t>
+              <a:t>22</a:t>
             </a:r>
           </a:p>
         </p:txBody>
@@ -10258,6 +9978,131 @@
                 <a:cs typeface="Arial" panose="020B0604020202020204" pitchFamily="34" charset="0"/>
               </a:rPr>
               <a:t>ZLUX</a:t>
+            </a:r>
+          </a:p>
+        </p:txBody>
+      </p:sp>
+      <p:sp>
+        <p:nvSpPr>
+          <p:cNvPr id="131" name="TextBox 130">
+            <a:extLst>
+              <a:ext uri="{FF2B5EF4-FFF2-40B4-BE49-F238E27FC236}">
+                <a16:creationId xmlns:a16="http://schemas.microsoft.com/office/drawing/2014/main" id="{91CCDF08-B5C5-5549-A8D7-30660EADEC08}"/>
+              </a:ext>
+            </a:extLst>
+          </p:cNvPr>
+          <p:cNvSpPr txBox="1"/>
+          <p:nvPr/>
+        </p:nvSpPr>
+        <p:spPr>
+          <a:xfrm>
+            <a:off x="4655760" y="5936375"/>
+            <a:ext cx="562975" cy="307777"/>
+          </a:xfrm>
+          <a:prstGeom prst="rect">
+            <a:avLst/>
+          </a:prstGeom>
+          <a:noFill/>
+        </p:spPr>
+        <p:txBody>
+          <a:bodyPr wrap="none" rtlCol="0">
+            <a:spAutoFit/>
+          </a:bodyPr>
+          <a:lstStyle/>
+          <a:p>
+            <a:r>
+              <a:rPr lang="en-US" sz="1400" dirty="0">
+                <a:solidFill>
+                  <a:schemeClr val="accent4">
+                    <a:lumMod val="75000"/>
+                  </a:schemeClr>
+                </a:solidFill>
+                <a:latin typeface="Arial" panose="020B0604020202020204" pitchFamily="34" charset="0"/>
+                <a:cs typeface="Arial" panose="020B0604020202020204" pitchFamily="34" charset="0"/>
+              </a:rPr>
+              <a:t>Java</a:t>
+            </a:r>
+          </a:p>
+        </p:txBody>
+      </p:sp>
+      <p:sp>
+        <p:nvSpPr>
+          <p:cNvPr id="146" name="TextBox 145">
+            <a:extLst>
+              <a:ext uri="{FF2B5EF4-FFF2-40B4-BE49-F238E27FC236}">
+                <a16:creationId xmlns:a16="http://schemas.microsoft.com/office/drawing/2014/main" id="{518F8221-BEA5-8642-B541-E261F133B78B}"/>
+              </a:ext>
+            </a:extLst>
+          </p:cNvPr>
+          <p:cNvSpPr txBox="1"/>
+          <p:nvPr/>
+        </p:nvSpPr>
+        <p:spPr>
+          <a:xfrm>
+            <a:off x="4646607" y="6183235"/>
+            <a:ext cx="792205" cy="307777"/>
+          </a:xfrm>
+          <a:prstGeom prst="rect">
+            <a:avLst/>
+          </a:prstGeom>
+          <a:noFill/>
+        </p:spPr>
+        <p:txBody>
+          <a:bodyPr wrap="none" rtlCol="0">
+            <a:spAutoFit/>
+          </a:bodyPr>
+          <a:lstStyle/>
+          <a:p>
+            <a:r>
+              <a:rPr lang="en-US" sz="1400" dirty="0">
+                <a:solidFill>
+                  <a:srgbClr val="00B19E"/>
+                </a:solidFill>
+                <a:latin typeface="Arial" panose="020B0604020202020204" pitchFamily="34" charset="0"/>
+                <a:cs typeface="Arial" panose="020B0604020202020204" pitchFamily="34" charset="0"/>
+              </a:rPr>
+              <a:t>Node.js</a:t>
+            </a:r>
+          </a:p>
+        </p:txBody>
+      </p:sp>
+      <p:sp>
+        <p:nvSpPr>
+          <p:cNvPr id="154" name="TextBox 153">
+            <a:extLst>
+              <a:ext uri="{FF2B5EF4-FFF2-40B4-BE49-F238E27FC236}">
+                <a16:creationId xmlns:a16="http://schemas.microsoft.com/office/drawing/2014/main" id="{A9F02D7E-9694-6247-BCCA-F0034D843606}"/>
+              </a:ext>
+            </a:extLst>
+          </p:cNvPr>
+          <p:cNvSpPr txBox="1"/>
+          <p:nvPr/>
+        </p:nvSpPr>
+        <p:spPr>
+          <a:xfrm>
+            <a:off x="4646607" y="6421911"/>
+            <a:ext cx="1080745" cy="307777"/>
+          </a:xfrm>
+          <a:prstGeom prst="rect">
+            <a:avLst/>
+          </a:prstGeom>
+          <a:noFill/>
+        </p:spPr>
+        <p:txBody>
+          <a:bodyPr wrap="none" rtlCol="0">
+            <a:spAutoFit/>
+          </a:bodyPr>
+          <a:lstStyle/>
+          <a:p>
+            <a:r>
+              <a:rPr lang="en-US" sz="1400" dirty="0">
+                <a:solidFill>
+                  <a:srgbClr val="7030A0"/>
+                </a:solidFill>
+                <a:latin typeface="Arial" panose="020B0604020202020204" pitchFamily="34" charset="0"/>
+                <a:cs typeface="Arial" panose="020B0604020202020204" pitchFamily="34" charset="0"/>
+              </a:rPr>
+              <a:t>metal C / C</a:t>
             </a:r>
           </a:p>
         </p:txBody>

</xml_diff>

<commit_message>
update icons in images
Signed-off-by: nellietan <tanzhiqian@ibm.com>
</commit_message>
<xml_diff>
--- a/docs/images/common/zowe-architecture.pptx
+++ b/docs/images/common/zowe-architecture.pptx
@@ -200,7 +200,7 @@
           <a:p>
             <a:fld id="{26E70E1E-3B7C-8D4D-B700-360134022E14}" type="datetimeFigureOut">
               <a:rPr lang="en-CN" smtClean="0"/>
-              <a:t>01/13/2022</a:t>
+              <a:t>08/16/2023</a:t>
             </a:fld>
             <a:endParaRPr lang="en-CN"/>
           </a:p>
@@ -963,7 +963,7 @@
           <a:p>
             <a:fld id="{B1DB1BE8-3F77-D044-8747-9903AC5CD864}" type="datetimeFigureOut">
               <a:rPr lang="en-US" smtClean="0"/>
-              <a:t>1/13/2022</a:t>
+              <a:t>8/16/2023</a:t>
             </a:fld>
             <a:endParaRPr lang="en-US"/>
           </a:p>
@@ -1161,7 +1161,7 @@
           <a:p>
             <a:fld id="{B1DB1BE8-3F77-D044-8747-9903AC5CD864}" type="datetimeFigureOut">
               <a:rPr lang="en-US" smtClean="0"/>
-              <a:t>1/13/2022</a:t>
+              <a:t>8/16/2023</a:t>
             </a:fld>
             <a:endParaRPr lang="en-US"/>
           </a:p>
@@ -1369,7 +1369,7 @@
           <a:p>
             <a:fld id="{B1DB1BE8-3F77-D044-8747-9903AC5CD864}" type="datetimeFigureOut">
               <a:rPr lang="en-US" smtClean="0"/>
-              <a:t>1/13/2022</a:t>
+              <a:t>8/16/2023</a:t>
             </a:fld>
             <a:endParaRPr lang="en-US"/>
           </a:p>
@@ -1567,7 +1567,7 @@
           <a:p>
             <a:fld id="{B1DB1BE8-3F77-D044-8747-9903AC5CD864}" type="datetimeFigureOut">
               <a:rPr lang="en-US" smtClean="0"/>
-              <a:t>1/13/2022</a:t>
+              <a:t>8/16/2023</a:t>
             </a:fld>
             <a:endParaRPr lang="en-US"/>
           </a:p>
@@ -1842,7 +1842,7 @@
           <a:p>
             <a:fld id="{B1DB1BE8-3F77-D044-8747-9903AC5CD864}" type="datetimeFigureOut">
               <a:rPr lang="en-US" smtClean="0"/>
-              <a:t>1/13/2022</a:t>
+              <a:t>8/16/2023</a:t>
             </a:fld>
             <a:endParaRPr lang="en-US"/>
           </a:p>
@@ -2107,7 +2107,7 @@
           <a:p>
             <a:fld id="{B1DB1BE8-3F77-D044-8747-9903AC5CD864}" type="datetimeFigureOut">
               <a:rPr lang="en-US" smtClean="0"/>
-              <a:t>1/13/2022</a:t>
+              <a:t>8/16/2023</a:t>
             </a:fld>
             <a:endParaRPr lang="en-US"/>
           </a:p>
@@ -2519,7 +2519,7 @@
           <a:p>
             <a:fld id="{B1DB1BE8-3F77-D044-8747-9903AC5CD864}" type="datetimeFigureOut">
               <a:rPr lang="en-US" smtClean="0"/>
-              <a:t>1/13/2022</a:t>
+              <a:t>8/16/2023</a:t>
             </a:fld>
             <a:endParaRPr lang="en-US"/>
           </a:p>
@@ -2660,7 +2660,7 @@
           <a:p>
             <a:fld id="{B1DB1BE8-3F77-D044-8747-9903AC5CD864}" type="datetimeFigureOut">
               <a:rPr lang="en-US" smtClean="0"/>
-              <a:t>1/13/2022</a:t>
+              <a:t>8/16/2023</a:t>
             </a:fld>
             <a:endParaRPr lang="en-US"/>
           </a:p>
@@ -2773,7 +2773,7 @@
           <a:p>
             <a:fld id="{B1DB1BE8-3F77-D044-8747-9903AC5CD864}" type="datetimeFigureOut">
               <a:rPr lang="en-US" smtClean="0"/>
-              <a:t>1/13/2022</a:t>
+              <a:t>8/16/2023</a:t>
             </a:fld>
             <a:endParaRPr lang="en-US"/>
           </a:p>
@@ -3084,7 +3084,7 @@
           <a:p>
             <a:fld id="{B1DB1BE8-3F77-D044-8747-9903AC5CD864}" type="datetimeFigureOut">
               <a:rPr lang="en-US" smtClean="0"/>
-              <a:t>1/13/2022</a:t>
+              <a:t>8/16/2023</a:t>
             </a:fld>
             <a:endParaRPr lang="en-US"/>
           </a:p>
@@ -3372,7 +3372,7 @@
           <a:p>
             <a:fld id="{B1DB1BE8-3F77-D044-8747-9903AC5CD864}" type="datetimeFigureOut">
               <a:rPr lang="en-US" smtClean="0"/>
-              <a:t>1/13/2022</a:t>
+              <a:t>8/16/2023</a:t>
             </a:fld>
             <a:endParaRPr lang="en-US"/>
           </a:p>
@@ -3613,7 +3613,7 @@
           <a:p>
             <a:fld id="{B1DB1BE8-3F77-D044-8747-9903AC5CD864}" type="datetimeFigureOut">
               <a:rPr lang="en-US" smtClean="0"/>
-              <a:t>1/13/2022</a:t>
+              <a:t>8/16/2023</a:t>
             </a:fld>
             <a:endParaRPr lang="en-US"/>
           </a:p>
@@ -4032,6 +4032,58 @@
       </p:grpSpPr>
       <p:sp>
         <p:nvSpPr>
+          <p:cNvPr id="6" name="Rectangle 5">
+            <a:extLst>
+              <a:ext uri="{FF2B5EF4-FFF2-40B4-BE49-F238E27FC236}">
+                <a16:creationId xmlns:a16="http://schemas.microsoft.com/office/drawing/2014/main" id="{75AB30E2-F7F3-9131-EB4A-EC310A9D165C}"/>
+              </a:ext>
+            </a:extLst>
+          </p:cNvPr>
+          <p:cNvSpPr/>
+          <p:nvPr/>
+        </p:nvSpPr>
+        <p:spPr>
+          <a:xfrm>
+            <a:off x="0" y="0"/>
+            <a:ext cx="12192000" cy="6858000"/>
+          </a:xfrm>
+          <a:prstGeom prst="rect">
+            <a:avLst/>
+          </a:prstGeom>
+          <a:solidFill>
+            <a:schemeClr val="bg1"/>
+          </a:solidFill>
+          <a:ln>
+            <a:noFill/>
+          </a:ln>
+        </p:spPr>
+        <p:style>
+          <a:lnRef idx="2">
+            <a:schemeClr val="accent1">
+              <a:shade val="15000"/>
+            </a:schemeClr>
+          </a:lnRef>
+          <a:fillRef idx="1">
+            <a:schemeClr val="accent1"/>
+          </a:fillRef>
+          <a:effectRef idx="0">
+            <a:schemeClr val="accent1"/>
+          </a:effectRef>
+          <a:fontRef idx="minor">
+            <a:schemeClr val="lt1"/>
+          </a:fontRef>
+        </p:style>
+        <p:txBody>
+          <a:bodyPr rtlCol="0" anchor="ctr"/>
+          <a:lstStyle/>
+          <a:p>
+            <a:pPr algn="ctr"/>
+            <a:endParaRPr lang="en-US"/>
+          </a:p>
+        </p:txBody>
+      </p:sp>
+      <p:sp>
+        <p:nvSpPr>
           <p:cNvPr id="77" name="Rectangle 76">
             <a:extLst>
               <a:ext uri="{FF2B5EF4-FFF2-40B4-BE49-F238E27FC236}">
@@ -7223,13 +7275,14 @@
           </p:cNvPr>
           <p:cNvCxnSpPr>
             <a:cxnSpLocks/>
+            <a:stCxn id="155" idx="2"/>
           </p:cNvCxnSpPr>
           <p:nvPr/>
         </p:nvCxnSpPr>
         <p:spPr>
-          <a:xfrm>
-            <a:off x="8340775" y="1407533"/>
-            <a:ext cx="65883" cy="4155649"/>
+          <a:xfrm flipH="1">
+            <a:off x="8457106" y="1418717"/>
+            <a:ext cx="4024" cy="4157675"/>
           </a:xfrm>
           <a:prstGeom prst="straightConnector1">
             <a:avLst/>
@@ -7519,36 +7572,6 @@
           </a:prstGeom>
         </p:spPr>
       </p:pic>
-      <p:pic>
-        <p:nvPicPr>
-          <p:cNvPr id="35" name="Picture 34">
-            <a:extLst>
-              <a:ext uri="{FF2B5EF4-FFF2-40B4-BE49-F238E27FC236}">
-                <a16:creationId xmlns:a16="http://schemas.microsoft.com/office/drawing/2014/main" id="{E228FC63-B493-6942-A20B-7B8E61DE4EB9}"/>
-              </a:ext>
-            </a:extLst>
-          </p:cNvPr>
-          <p:cNvPicPr>
-            <a:picLocks noChangeAspect="1"/>
-          </p:cNvPicPr>
-          <p:nvPr/>
-        </p:nvPicPr>
-        <p:blipFill>
-          <a:blip r:embed="rId8"/>
-          <a:stretch>
-            <a:fillRect/>
-          </a:stretch>
-        </p:blipFill>
-        <p:spPr>
-          <a:xfrm>
-            <a:off x="9022452" y="168865"/>
-            <a:ext cx="184243" cy="184243"/>
-          </a:xfrm>
-          <a:prstGeom prst="rect">
-            <a:avLst/>
-          </a:prstGeom>
-        </p:spPr>
-      </p:pic>
       <p:sp>
         <p:nvSpPr>
           <p:cNvPr id="114" name="TextBox 113">
@@ -7704,7 +7727,7 @@
           <p:nvPr/>
         </p:nvPicPr>
         <p:blipFill>
-          <a:blip r:embed="rId9"/>
+          <a:blip r:embed="rId8"/>
           <a:stretch>
             <a:fillRect/>
           </a:stretch>
@@ -10040,6 +10063,53 @@
           </a:p>
         </p:txBody>
       </p:sp>
+      <p:pic>
+        <p:nvPicPr>
+          <p:cNvPr id="1026" name="Picture 2">
+            <a:extLst>
+              <a:ext uri="{FF2B5EF4-FFF2-40B4-BE49-F238E27FC236}">
+                <a16:creationId xmlns:a16="http://schemas.microsoft.com/office/drawing/2014/main" id="{96D86C19-998B-6695-7556-F03B303894BF}"/>
+              </a:ext>
+            </a:extLst>
+          </p:cNvPr>
+          <p:cNvPicPr>
+            <a:picLocks noChangeAspect="1" noChangeArrowheads="1"/>
+          </p:cNvPicPr>
+          <p:nvPr/>
+        </p:nvPicPr>
+        <p:blipFill>
+          <a:blip r:embed="rId9">
+            <a:extLst>
+              <a:ext uri="{28A0092B-C50C-407E-A947-70E740481C1C}">
+                <a14:useLocalDpi xmlns:a14="http://schemas.microsoft.com/office/drawing/2010/main" val="0"/>
+              </a:ext>
+            </a:extLst>
+          </a:blip>
+          <a:srcRect/>
+          <a:stretch>
+            <a:fillRect/>
+          </a:stretch>
+        </p:blipFill>
+        <p:spPr bwMode="auto">
+          <a:xfrm>
+            <a:off x="8971201" y="106592"/>
+            <a:ext cx="270766" cy="270766"/>
+          </a:xfrm>
+          <a:prstGeom prst="rect">
+            <a:avLst/>
+          </a:prstGeom>
+          <a:noFill/>
+          <a:extLst>
+            <a:ext uri="{909E8E84-426E-40DD-AFC4-6F175D3DCCD1}">
+              <a14:hiddenFill xmlns:a14="http://schemas.microsoft.com/office/drawing/2010/main">
+                <a:solidFill>
+                  <a:srgbClr val="FFFFFF"/>
+                </a:solidFill>
+              </a14:hiddenFill>
+            </a:ext>
+          </a:extLst>
+        </p:spPr>
+      </p:pic>
     </p:spTree>
     <p:extLst>
       <p:ext uri="{BB962C8B-B14F-4D97-AF65-F5344CB8AC3E}">
@@ -10084,6 +10154,58 @@
       </p:grpSpPr>
       <p:sp>
         <p:nvSpPr>
+          <p:cNvPr id="3" name="Rectangle 2">
+            <a:extLst>
+              <a:ext uri="{FF2B5EF4-FFF2-40B4-BE49-F238E27FC236}">
+                <a16:creationId xmlns:a16="http://schemas.microsoft.com/office/drawing/2014/main" id="{46662261-FAD2-65EA-76B9-53388AA8CACB}"/>
+              </a:ext>
+            </a:extLst>
+          </p:cNvPr>
+          <p:cNvSpPr/>
+          <p:nvPr/>
+        </p:nvSpPr>
+        <p:spPr>
+          <a:xfrm>
+            <a:off x="0" y="0"/>
+            <a:ext cx="12192000" cy="6858000"/>
+          </a:xfrm>
+          <a:prstGeom prst="rect">
+            <a:avLst/>
+          </a:prstGeom>
+          <a:solidFill>
+            <a:schemeClr val="bg1"/>
+          </a:solidFill>
+          <a:ln>
+            <a:noFill/>
+          </a:ln>
+        </p:spPr>
+        <p:style>
+          <a:lnRef idx="2">
+            <a:schemeClr val="accent1">
+              <a:shade val="15000"/>
+            </a:schemeClr>
+          </a:lnRef>
+          <a:fillRef idx="1">
+            <a:schemeClr val="accent1"/>
+          </a:fillRef>
+          <a:effectRef idx="0">
+            <a:schemeClr val="accent1"/>
+          </a:effectRef>
+          <a:fontRef idx="minor">
+            <a:schemeClr val="lt1"/>
+          </a:fontRef>
+        </p:style>
+        <p:txBody>
+          <a:bodyPr rtlCol="0" anchor="ctr"/>
+          <a:lstStyle/>
+          <a:p>
+            <a:pPr algn="ctr"/>
+            <a:endParaRPr lang="en-US"/>
+          </a:p>
+        </p:txBody>
+      </p:sp>
+      <p:sp>
+        <p:nvSpPr>
           <p:cNvPr id="117" name="Rectangle 116">
             <a:extLst>
               <a:ext uri="{FF2B5EF4-FFF2-40B4-BE49-F238E27FC236}">
@@ -13275,36 +13397,6 @@
           </a:prstGeom>
         </p:spPr>
       </p:pic>
-      <p:pic>
-        <p:nvPicPr>
-          <p:cNvPr id="35" name="Picture 34">
-            <a:extLst>
-              <a:ext uri="{FF2B5EF4-FFF2-40B4-BE49-F238E27FC236}">
-                <a16:creationId xmlns:a16="http://schemas.microsoft.com/office/drawing/2014/main" id="{E228FC63-B493-6942-A20B-7B8E61DE4EB9}"/>
-              </a:ext>
-            </a:extLst>
-          </p:cNvPr>
-          <p:cNvPicPr>
-            <a:picLocks noChangeAspect="1"/>
-          </p:cNvPicPr>
-          <p:nvPr/>
-        </p:nvPicPr>
-        <p:blipFill>
-          <a:blip r:embed="rId8"/>
-          <a:stretch>
-            <a:fillRect/>
-          </a:stretch>
-        </p:blipFill>
-        <p:spPr>
-          <a:xfrm>
-            <a:off x="9022452" y="168865"/>
-            <a:ext cx="184243" cy="184243"/>
-          </a:xfrm>
-          <a:prstGeom prst="rect">
-            <a:avLst/>
-          </a:prstGeom>
-        </p:spPr>
-      </p:pic>
       <p:sp>
         <p:nvSpPr>
           <p:cNvPr id="114" name="TextBox 113">
@@ -13460,7 +13552,7 @@
           <p:nvPr/>
         </p:nvPicPr>
         <p:blipFill>
-          <a:blip r:embed="rId9"/>
+          <a:blip r:embed="rId8"/>
           <a:stretch>
             <a:fillRect/>
           </a:stretch>
@@ -15639,7 +15731,7 @@
           <p:nvPr/>
         </p:nvPicPr>
         <p:blipFill>
-          <a:blip r:embed="rId10">
+          <a:blip r:embed="rId9">
             <a:extLst>
               <a:ext uri="{28A0092B-C50C-407E-A947-70E740481C1C}">
                 <a14:useLocalDpi xmlns:a14="http://schemas.microsoft.com/office/drawing/2010/main" val="0"/>
@@ -16247,6 +16339,53 @@
           </a:fontRef>
         </p:style>
       </p:cxnSp>
+      <p:pic>
+        <p:nvPicPr>
+          <p:cNvPr id="2" name="Picture 2">
+            <a:extLst>
+              <a:ext uri="{FF2B5EF4-FFF2-40B4-BE49-F238E27FC236}">
+                <a16:creationId xmlns:a16="http://schemas.microsoft.com/office/drawing/2014/main" id="{D62F1F07-DCC5-0BE3-6C38-3AFAC731FB90}"/>
+              </a:ext>
+            </a:extLst>
+          </p:cNvPr>
+          <p:cNvPicPr>
+            <a:picLocks noChangeAspect="1" noChangeArrowheads="1"/>
+          </p:cNvPicPr>
+          <p:nvPr/>
+        </p:nvPicPr>
+        <p:blipFill>
+          <a:blip r:embed="rId10">
+            <a:extLst>
+              <a:ext uri="{28A0092B-C50C-407E-A947-70E740481C1C}">
+                <a14:useLocalDpi xmlns:a14="http://schemas.microsoft.com/office/drawing/2010/main" val="0"/>
+              </a:ext>
+            </a:extLst>
+          </a:blip>
+          <a:srcRect/>
+          <a:stretch>
+            <a:fillRect/>
+          </a:stretch>
+        </p:blipFill>
+        <p:spPr bwMode="auto">
+          <a:xfrm>
+            <a:off x="8971201" y="106592"/>
+            <a:ext cx="270766" cy="270766"/>
+          </a:xfrm>
+          <a:prstGeom prst="rect">
+            <a:avLst/>
+          </a:prstGeom>
+          <a:noFill/>
+          <a:extLst>
+            <a:ext uri="{909E8E84-426E-40DD-AFC4-6F175D3DCCD1}">
+              <a14:hiddenFill xmlns:a14="http://schemas.microsoft.com/office/drawing/2010/main">
+                <a:solidFill>
+                  <a:srgbClr val="FFFFFF"/>
+                </a:solidFill>
+              </a14:hiddenFill>
+            </a:ext>
+          </a:extLst>
+        </p:spPr>
+      </p:pic>
     </p:spTree>
     <p:extLst>
       <p:ext uri="{BB962C8B-B14F-4D97-AF65-F5344CB8AC3E}">
@@ -16257,13 +16396,13 @@
   <p:clrMapOvr>
     <a:masterClrMapping/>
   </p:clrMapOvr>
-  <mc:AlternateContent xmlns:mc="http://schemas.openxmlformats.org/markup-compatibility/2006">
-    <mc:Choice xmlns:p14="http://schemas.microsoft.com/office/powerpoint/2010/main" Requires="p14">
+  <mc:AlternateContent xmlns:mc="http://schemas.openxmlformats.org/markup-compatibility/2006" xmlns:p14="http://schemas.microsoft.com/office/powerpoint/2010/main">
+    <mc:Choice Requires="p14">
       <p:transition spd="med" p14:dur="700">
         <p:fade/>
       </p:transition>
     </mc:Choice>
-    <mc:Fallback>
+    <mc:Fallback xmlns="">
       <p:transition spd="med">
         <p:fade/>
       </p:transition>
@@ -16291,6 +16430,58 @@
       </p:grpSpPr>
       <p:sp>
         <p:nvSpPr>
+          <p:cNvPr id="2" name="Rectangle 1">
+            <a:extLst>
+              <a:ext uri="{FF2B5EF4-FFF2-40B4-BE49-F238E27FC236}">
+                <a16:creationId xmlns:a16="http://schemas.microsoft.com/office/drawing/2014/main" id="{2EC5A686-03C7-2614-D093-D1AFE99AFD6F}"/>
+              </a:ext>
+            </a:extLst>
+          </p:cNvPr>
+          <p:cNvSpPr/>
+          <p:nvPr/>
+        </p:nvSpPr>
+        <p:spPr>
+          <a:xfrm>
+            <a:off x="0" y="0"/>
+            <a:ext cx="12192000" cy="6858000"/>
+          </a:xfrm>
+          <a:prstGeom prst="rect">
+            <a:avLst/>
+          </a:prstGeom>
+          <a:solidFill>
+            <a:schemeClr val="bg1"/>
+          </a:solidFill>
+          <a:ln>
+            <a:noFill/>
+          </a:ln>
+        </p:spPr>
+        <p:style>
+          <a:lnRef idx="2">
+            <a:schemeClr val="accent1">
+              <a:shade val="15000"/>
+            </a:schemeClr>
+          </a:lnRef>
+          <a:fillRef idx="1">
+            <a:schemeClr val="accent1"/>
+          </a:fillRef>
+          <a:effectRef idx="0">
+            <a:schemeClr val="accent1"/>
+          </a:effectRef>
+          <a:fontRef idx="minor">
+            <a:schemeClr val="lt1"/>
+          </a:fontRef>
+        </p:style>
+        <p:txBody>
+          <a:bodyPr rtlCol="0" anchor="ctr"/>
+          <a:lstStyle/>
+          <a:p>
+            <a:pPr algn="ctr"/>
+            <a:endParaRPr lang="en-US"/>
+          </a:p>
+        </p:txBody>
+      </p:sp>
+      <p:sp>
+        <p:nvSpPr>
           <p:cNvPr id="94" name="Rectangle 93">
             <a:extLst>
               <a:ext uri="{FF2B5EF4-FFF2-40B4-BE49-F238E27FC236}">
@@ -20213,36 +20404,6 @@
           </a:prstGeom>
         </p:spPr>
       </p:pic>
-      <p:pic>
-        <p:nvPicPr>
-          <p:cNvPr id="35" name="Picture 34">
-            <a:extLst>
-              <a:ext uri="{FF2B5EF4-FFF2-40B4-BE49-F238E27FC236}">
-                <a16:creationId xmlns:a16="http://schemas.microsoft.com/office/drawing/2014/main" id="{E228FC63-B493-6942-A20B-7B8E61DE4EB9}"/>
-              </a:ext>
-            </a:extLst>
-          </p:cNvPr>
-          <p:cNvPicPr>
-            <a:picLocks noChangeAspect="1"/>
-          </p:cNvPicPr>
-          <p:nvPr/>
-        </p:nvPicPr>
-        <p:blipFill>
-          <a:blip r:embed="rId9"/>
-          <a:stretch>
-            <a:fillRect/>
-          </a:stretch>
-        </p:blipFill>
-        <p:spPr>
-          <a:xfrm>
-            <a:off x="9022452" y="168865"/>
-            <a:ext cx="184243" cy="184243"/>
-          </a:xfrm>
-          <a:prstGeom prst="rect">
-            <a:avLst/>
-          </a:prstGeom>
-        </p:spPr>
-      </p:pic>
       <p:sp>
         <p:nvSpPr>
           <p:cNvPr id="114" name="TextBox 113">
@@ -20398,7 +20559,7 @@
           <p:nvPr/>
         </p:nvPicPr>
         <p:blipFill>
-          <a:blip r:embed="rId10"/>
+          <a:blip r:embed="rId9"/>
           <a:stretch>
             <a:fillRect/>
           </a:stretch>
@@ -23973,6 +24134,53 @@
           </a:p>
         </p:txBody>
       </p:sp>
+      <p:pic>
+        <p:nvPicPr>
+          <p:cNvPr id="3" name="Picture 2">
+            <a:extLst>
+              <a:ext uri="{FF2B5EF4-FFF2-40B4-BE49-F238E27FC236}">
+                <a16:creationId xmlns:a16="http://schemas.microsoft.com/office/drawing/2014/main" id="{25233438-9F8C-230D-878B-F2CEAA35F048}"/>
+              </a:ext>
+            </a:extLst>
+          </p:cNvPr>
+          <p:cNvPicPr>
+            <a:picLocks noChangeAspect="1" noChangeArrowheads="1"/>
+          </p:cNvPicPr>
+          <p:nvPr/>
+        </p:nvPicPr>
+        <p:blipFill>
+          <a:blip r:embed="rId10">
+            <a:extLst>
+              <a:ext uri="{28A0092B-C50C-407E-A947-70E740481C1C}">
+                <a14:useLocalDpi xmlns:a14="http://schemas.microsoft.com/office/drawing/2010/main" val="0"/>
+              </a:ext>
+            </a:extLst>
+          </a:blip>
+          <a:srcRect/>
+          <a:stretch>
+            <a:fillRect/>
+          </a:stretch>
+        </p:blipFill>
+        <p:spPr bwMode="auto">
+          <a:xfrm>
+            <a:off x="8971201" y="106592"/>
+            <a:ext cx="270766" cy="270766"/>
+          </a:xfrm>
+          <a:prstGeom prst="rect">
+            <a:avLst/>
+          </a:prstGeom>
+          <a:noFill/>
+          <a:extLst>
+            <a:ext uri="{909E8E84-426E-40DD-AFC4-6F175D3DCCD1}">
+              <a14:hiddenFill xmlns:a14="http://schemas.microsoft.com/office/drawing/2010/main">
+                <a:solidFill>
+                  <a:srgbClr val="FFFFFF"/>
+                </a:solidFill>
+              </a14:hiddenFill>
+            </a:ext>
+          </a:extLst>
+        </p:spPr>
+      </p:pic>
     </p:spTree>
     <p:extLst>
       <p:ext uri="{BB962C8B-B14F-4D97-AF65-F5344CB8AC3E}">
@@ -23983,13 +24191,13 @@
   <p:clrMapOvr>
     <a:masterClrMapping/>
   </p:clrMapOvr>
-  <mc:AlternateContent xmlns:mc="http://schemas.openxmlformats.org/markup-compatibility/2006">
-    <mc:Choice xmlns:p14="http://schemas.microsoft.com/office/powerpoint/2010/main" Requires="p14">
+  <mc:AlternateContent xmlns:mc="http://schemas.openxmlformats.org/markup-compatibility/2006" xmlns:p14="http://schemas.microsoft.com/office/powerpoint/2010/main">
+    <mc:Choice Requires="p14">
       <p:transition spd="med" p14:dur="700">
         <p:fade/>
       </p:transition>
     </mc:Choice>
-    <mc:Fallback>
+    <mc:Fallback xmlns="">
       <p:transition spd="med">
         <p:fade/>
       </p:transition>

</xml_diff>

<commit_message>
Jobs, Files, Metrics and IMS removal
Signed-off-by: Pavel Jares <Pavel.Jares@broadcom.com>
</commit_message>
<xml_diff>
--- a/docs/images/common/zowe-architecture.pptx
+++ b/docs/images/common/zowe-architecture.pptx
@@ -200,7 +200,7 @@
           <a:p>
             <a:fld id="{26E70E1E-3B7C-8D4D-B700-360134022E14}" type="datetimeFigureOut">
               <a:rPr lang="en-CN" smtClean="0"/>
-              <a:t>08/16/2023</a:t>
+              <a:t>03/12/2024</a:t>
             </a:fld>
             <a:endParaRPr lang="en-CN"/>
           </a:p>
@@ -963,7 +963,7 @@
           <a:p>
             <a:fld id="{B1DB1BE8-3F77-D044-8747-9903AC5CD864}" type="datetimeFigureOut">
               <a:rPr lang="en-US" smtClean="0"/>
-              <a:t>8/16/2023</a:t>
+              <a:t>3/12/2024</a:t>
             </a:fld>
             <a:endParaRPr lang="en-US"/>
           </a:p>
@@ -1161,7 +1161,7 @@
           <a:p>
             <a:fld id="{B1DB1BE8-3F77-D044-8747-9903AC5CD864}" type="datetimeFigureOut">
               <a:rPr lang="en-US" smtClean="0"/>
-              <a:t>8/16/2023</a:t>
+              <a:t>3/12/2024</a:t>
             </a:fld>
             <a:endParaRPr lang="en-US"/>
           </a:p>
@@ -1369,7 +1369,7 @@
           <a:p>
             <a:fld id="{B1DB1BE8-3F77-D044-8747-9903AC5CD864}" type="datetimeFigureOut">
               <a:rPr lang="en-US" smtClean="0"/>
-              <a:t>8/16/2023</a:t>
+              <a:t>3/12/2024</a:t>
             </a:fld>
             <a:endParaRPr lang="en-US"/>
           </a:p>
@@ -1567,7 +1567,7 @@
           <a:p>
             <a:fld id="{B1DB1BE8-3F77-D044-8747-9903AC5CD864}" type="datetimeFigureOut">
               <a:rPr lang="en-US" smtClean="0"/>
-              <a:t>8/16/2023</a:t>
+              <a:t>3/12/2024</a:t>
             </a:fld>
             <a:endParaRPr lang="en-US"/>
           </a:p>
@@ -1842,7 +1842,7 @@
           <a:p>
             <a:fld id="{B1DB1BE8-3F77-D044-8747-9903AC5CD864}" type="datetimeFigureOut">
               <a:rPr lang="en-US" smtClean="0"/>
-              <a:t>8/16/2023</a:t>
+              <a:t>3/12/2024</a:t>
             </a:fld>
             <a:endParaRPr lang="en-US"/>
           </a:p>
@@ -2107,7 +2107,7 @@
           <a:p>
             <a:fld id="{B1DB1BE8-3F77-D044-8747-9903AC5CD864}" type="datetimeFigureOut">
               <a:rPr lang="en-US" smtClean="0"/>
-              <a:t>8/16/2023</a:t>
+              <a:t>3/12/2024</a:t>
             </a:fld>
             <a:endParaRPr lang="en-US"/>
           </a:p>
@@ -2519,7 +2519,7 @@
           <a:p>
             <a:fld id="{B1DB1BE8-3F77-D044-8747-9903AC5CD864}" type="datetimeFigureOut">
               <a:rPr lang="en-US" smtClean="0"/>
-              <a:t>8/16/2023</a:t>
+              <a:t>3/12/2024</a:t>
             </a:fld>
             <a:endParaRPr lang="en-US"/>
           </a:p>
@@ -2660,7 +2660,7 @@
           <a:p>
             <a:fld id="{B1DB1BE8-3F77-D044-8747-9903AC5CD864}" type="datetimeFigureOut">
               <a:rPr lang="en-US" smtClean="0"/>
-              <a:t>8/16/2023</a:t>
+              <a:t>3/12/2024</a:t>
             </a:fld>
             <a:endParaRPr lang="en-US"/>
           </a:p>
@@ -2773,7 +2773,7 @@
           <a:p>
             <a:fld id="{B1DB1BE8-3F77-D044-8747-9903AC5CD864}" type="datetimeFigureOut">
               <a:rPr lang="en-US" smtClean="0"/>
-              <a:t>8/16/2023</a:t>
+              <a:t>3/12/2024</a:t>
             </a:fld>
             <a:endParaRPr lang="en-US"/>
           </a:p>
@@ -3084,7 +3084,7 @@
           <a:p>
             <a:fld id="{B1DB1BE8-3F77-D044-8747-9903AC5CD864}" type="datetimeFigureOut">
               <a:rPr lang="en-US" smtClean="0"/>
-              <a:t>8/16/2023</a:t>
+              <a:t>3/12/2024</a:t>
             </a:fld>
             <a:endParaRPr lang="en-US"/>
           </a:p>
@@ -3372,7 +3372,7 @@
           <a:p>
             <a:fld id="{B1DB1BE8-3F77-D044-8747-9903AC5CD864}" type="datetimeFigureOut">
               <a:rPr lang="en-US" smtClean="0"/>
-              <a:t>8/16/2023</a:t>
+              <a:t>3/12/2024</a:t>
             </a:fld>
             <a:endParaRPr lang="en-US"/>
           </a:p>
@@ -3613,7 +3613,7 @@
           <a:p>
             <a:fld id="{B1DB1BE8-3F77-D044-8747-9903AC5CD864}" type="datetimeFigureOut">
               <a:rPr lang="en-US" smtClean="0"/>
-              <a:t>8/16/2023</a:t>
+              <a:t>3/12/2024</a:t>
             </a:fld>
             <a:endParaRPr lang="en-US"/>
           </a:p>
@@ -4955,160 +4955,12 @@
           </a:fontRef>
         </p:style>
       </p:cxnSp>
-      <p:sp>
-        <p:nvSpPr>
-          <p:cNvPr id="42" name="Rectangle 41">
-            <a:extLst>
-              <a:ext uri="{FF2B5EF4-FFF2-40B4-BE49-F238E27FC236}">
-                <a16:creationId xmlns:a16="http://schemas.microsoft.com/office/drawing/2014/main" id="{7A2C7D56-E8C6-1042-9DF3-33D6754C7710}"/>
-              </a:ext>
-            </a:extLst>
-          </p:cNvPr>
-          <p:cNvSpPr/>
-          <p:nvPr/>
-        </p:nvSpPr>
-        <p:spPr>
-          <a:xfrm>
-            <a:off x="6153605" y="4247506"/>
-            <a:ext cx="517682" cy="311869"/>
-          </a:xfrm>
-          <a:prstGeom prst="rect">
-            <a:avLst/>
-          </a:prstGeom>
-          <a:pattFill prst="pct50">
-            <a:fgClr>
-              <a:schemeClr val="accent4">
-                <a:lumMod val="60000"/>
-                <a:lumOff val="40000"/>
-              </a:schemeClr>
-            </a:fgClr>
-            <a:bgClr>
-              <a:schemeClr val="bg1"/>
-            </a:bgClr>
-          </a:pattFill>
-          <a:ln>
-            <a:solidFill>
-              <a:schemeClr val="accent4">
-                <a:lumMod val="75000"/>
-              </a:schemeClr>
-            </a:solidFill>
-          </a:ln>
-        </p:spPr>
-        <p:style>
-          <a:lnRef idx="2">
-            <a:schemeClr val="accent1">
-              <a:shade val="50000"/>
-            </a:schemeClr>
-          </a:lnRef>
-          <a:fillRef idx="1">
-            <a:schemeClr val="accent1"/>
-          </a:fillRef>
-          <a:effectRef idx="0">
-            <a:schemeClr val="accent1"/>
-          </a:effectRef>
-          <a:fontRef idx="minor">
-            <a:schemeClr val="lt1"/>
-          </a:fontRef>
-        </p:style>
-        <p:txBody>
-          <a:bodyPr rtlCol="0" anchor="ctr"/>
-          <a:lstStyle/>
-          <a:p>
-            <a:pPr algn="ctr"/>
-            <a:r>
-              <a:rPr lang="en-US" sz="933">
-                <a:solidFill>
-                  <a:schemeClr val="tx1"/>
-                </a:solidFill>
-                <a:latin typeface="Arial" panose="020B0604020202020204" pitchFamily="34" charset="0"/>
-                <a:ea typeface="Menlo" panose="020B0609030804020204" pitchFamily="49" charset="0"/>
-                <a:cs typeface="Arial" panose="020B0604020202020204" pitchFamily="34" charset="0"/>
-              </a:rPr>
-              <a:t>File API</a:t>
-            </a:r>
-          </a:p>
-        </p:txBody>
-      </p:sp>
-      <p:sp>
-        <p:nvSpPr>
-          <p:cNvPr id="43" name="Rectangle 42">
-            <a:extLst>
-              <a:ext uri="{FF2B5EF4-FFF2-40B4-BE49-F238E27FC236}">
-                <a16:creationId xmlns:a16="http://schemas.microsoft.com/office/drawing/2014/main" id="{9CF8B830-DC0B-A740-A36B-B958C1A572E0}"/>
-              </a:ext>
-            </a:extLst>
-          </p:cNvPr>
-          <p:cNvSpPr/>
-          <p:nvPr/>
-        </p:nvSpPr>
-        <p:spPr>
-          <a:xfrm>
-            <a:off x="6732723" y="4247506"/>
-            <a:ext cx="498855" cy="311869"/>
-          </a:xfrm>
-          <a:prstGeom prst="rect">
-            <a:avLst/>
-          </a:prstGeom>
-          <a:pattFill prst="pct50">
-            <a:fgClr>
-              <a:schemeClr val="accent4">
-                <a:lumMod val="60000"/>
-                <a:lumOff val="40000"/>
-              </a:schemeClr>
-            </a:fgClr>
-            <a:bgClr>
-              <a:schemeClr val="bg1"/>
-            </a:bgClr>
-          </a:pattFill>
-          <a:ln>
-            <a:solidFill>
-              <a:schemeClr val="accent4">
-                <a:lumMod val="75000"/>
-              </a:schemeClr>
-            </a:solidFill>
-          </a:ln>
-        </p:spPr>
-        <p:style>
-          <a:lnRef idx="2">
-            <a:schemeClr val="accent1">
-              <a:shade val="50000"/>
-            </a:schemeClr>
-          </a:lnRef>
-          <a:fillRef idx="1">
-            <a:schemeClr val="accent1"/>
-          </a:fillRef>
-          <a:effectRef idx="0">
-            <a:schemeClr val="accent1"/>
-          </a:effectRef>
-          <a:fontRef idx="minor">
-            <a:schemeClr val="lt1"/>
-          </a:fontRef>
-        </p:style>
-        <p:txBody>
-          <a:bodyPr rtlCol="0" anchor="ctr"/>
-          <a:lstStyle/>
-          <a:p>
-            <a:pPr algn="ctr"/>
-            <a:r>
-              <a:rPr lang="en-US" sz="933" dirty="0">
-                <a:solidFill>
-                  <a:schemeClr val="tx1"/>
-                </a:solidFill>
-                <a:latin typeface="Arial" panose="020B0604020202020204" pitchFamily="34" charset="0"/>
-                <a:ea typeface="Menlo" panose="020B0609030804020204" pitchFamily="49" charset="0"/>
-                <a:cs typeface="Arial" panose="020B0604020202020204" pitchFamily="34" charset="0"/>
-              </a:rPr>
-              <a:t>JES API</a:t>
-            </a:r>
-          </a:p>
-        </p:txBody>
-      </p:sp>
       <p:cxnSp>
         <p:nvCxnSpPr>
-          <p:cNvPr id="45" name="Straight Arrow Connector 44">
-            <a:extLst>
-              <a:ext uri="{FF2B5EF4-FFF2-40B4-BE49-F238E27FC236}">
-                <a16:creationId xmlns:a16="http://schemas.microsoft.com/office/drawing/2014/main" id="{3892E7B8-0947-C447-9E5E-CE36A08691A2}"/>
+          <p:cNvPr id="46" name="Straight Arrow Connector 45">
+            <a:extLst>
+              <a:ext uri="{FF2B5EF4-FFF2-40B4-BE49-F238E27FC236}">
+                <a16:creationId xmlns:a16="http://schemas.microsoft.com/office/drawing/2014/main" id="{021AF651-50B6-6746-B692-A167727F149A}"/>
               </a:ext>
             </a:extLst>
           </p:cNvPr>
@@ -5119,8 +4971,8 @@
         </p:nvCxnSpPr>
         <p:spPr>
           <a:xfrm>
-            <a:off x="6586026" y="3069751"/>
-            <a:ext cx="9031" cy="1344229"/>
+            <a:off x="4556191" y="1699591"/>
+            <a:ext cx="0" cy="759483"/>
           </a:xfrm>
           <a:prstGeom prst="straightConnector1">
             <a:avLst/>
@@ -5145,48 +4997,6 @@
           </a:fontRef>
         </p:style>
       </p:cxnSp>
-      <p:cxnSp>
-        <p:nvCxnSpPr>
-          <p:cNvPr id="46" name="Straight Arrow Connector 45">
-            <a:extLst>
-              <a:ext uri="{FF2B5EF4-FFF2-40B4-BE49-F238E27FC236}">
-                <a16:creationId xmlns:a16="http://schemas.microsoft.com/office/drawing/2014/main" id="{021AF651-50B6-6746-B692-A167727F149A}"/>
-              </a:ext>
-            </a:extLst>
-          </p:cNvPr>
-          <p:cNvCxnSpPr>
-            <a:cxnSpLocks/>
-          </p:cNvCxnSpPr>
-          <p:nvPr/>
-        </p:nvCxnSpPr>
-        <p:spPr>
-          <a:xfrm>
-            <a:off x="4556191" y="1699591"/>
-            <a:ext cx="0" cy="759483"/>
-          </a:xfrm>
-          <a:prstGeom prst="straightConnector1">
-            <a:avLst/>
-          </a:prstGeom>
-          <a:ln>
-            <a:headEnd type="triangle"/>
-            <a:tailEnd type="triangle"/>
-          </a:ln>
-        </p:spPr>
-        <p:style>
-          <a:lnRef idx="1">
-            <a:schemeClr val="accent1"/>
-          </a:lnRef>
-          <a:fillRef idx="0">
-            <a:schemeClr val="accent1"/>
-          </a:fillRef>
-          <a:effectRef idx="0">
-            <a:schemeClr val="accent1"/>
-          </a:effectRef>
-          <a:fontRef idx="minor">
-            <a:schemeClr val="tx1"/>
-          </a:fontRef>
-        </p:style>
-      </p:cxnSp>
       <p:sp>
         <p:nvSpPr>
           <p:cNvPr id="48" name="TextBox 47">
@@ -5300,131 +5110,6 @@
                 <a:cs typeface="Arial" panose="020B0604020202020204" pitchFamily="34" charset="0"/>
               </a:rPr>
               <a:t>7552</a:t>
-            </a:r>
-          </a:p>
-        </p:txBody>
-      </p:sp>
-      <p:sp>
-        <p:nvSpPr>
-          <p:cNvPr id="51" name="TextBox 50">
-            <a:extLst>
-              <a:ext uri="{FF2B5EF4-FFF2-40B4-BE49-F238E27FC236}">
-                <a16:creationId xmlns:a16="http://schemas.microsoft.com/office/drawing/2014/main" id="{C24C4305-5BA2-1B43-A80B-DF777ED8E227}"/>
-              </a:ext>
-            </a:extLst>
-          </p:cNvPr>
-          <p:cNvSpPr txBox="1"/>
-          <p:nvPr/>
-        </p:nvSpPr>
-        <p:spPr>
-          <a:xfrm>
-            <a:off x="6133558" y="3993721"/>
-            <a:ext cx="486030" cy="253916"/>
-          </a:xfrm>
-          <a:prstGeom prst="rect">
-            <a:avLst/>
-          </a:prstGeom>
-          <a:noFill/>
-        </p:spPr>
-        <p:txBody>
-          <a:bodyPr wrap="none" rtlCol="0">
-            <a:spAutoFit/>
-          </a:bodyPr>
-          <a:lstStyle/>
-          <a:p>
-            <a:r>
-              <a:rPr lang="en-US" sz="1050" dirty="0">
-                <a:latin typeface="Arial" panose="020B0604020202020204" pitchFamily="34" charset="0"/>
-                <a:ea typeface="Menlo" panose="020B0609030804020204" pitchFamily="49" charset="0"/>
-                <a:cs typeface="Arial" panose="020B0604020202020204" pitchFamily="34" charset="0"/>
-              </a:rPr>
-              <a:t>8547</a:t>
-            </a:r>
-            <a:endParaRPr lang="en-US" sz="1067" dirty="0">
-              <a:latin typeface="Arial" panose="020B0604020202020204" pitchFamily="34" charset="0"/>
-              <a:ea typeface="Menlo" panose="020B0609030804020204" pitchFamily="49" charset="0"/>
-              <a:cs typeface="Arial" panose="020B0604020202020204" pitchFamily="34" charset="0"/>
-            </a:endParaRPr>
-          </a:p>
-        </p:txBody>
-      </p:sp>
-      <p:cxnSp>
-        <p:nvCxnSpPr>
-          <p:cNvPr id="52" name="Straight Arrow Connector 51">
-            <a:extLst>
-              <a:ext uri="{FF2B5EF4-FFF2-40B4-BE49-F238E27FC236}">
-                <a16:creationId xmlns:a16="http://schemas.microsoft.com/office/drawing/2014/main" id="{1A8D5EA7-D754-BD43-8ADC-13C0B2EE28C5}"/>
-              </a:ext>
-            </a:extLst>
-          </p:cNvPr>
-          <p:cNvCxnSpPr>
-            <a:cxnSpLocks/>
-          </p:cNvCxnSpPr>
-          <p:nvPr/>
-        </p:nvCxnSpPr>
-        <p:spPr>
-          <a:xfrm>
-            <a:off x="6794568" y="3045566"/>
-            <a:ext cx="0" cy="1371280"/>
-          </a:xfrm>
-          <a:prstGeom prst="straightConnector1">
-            <a:avLst/>
-          </a:prstGeom>
-          <a:ln>
-            <a:headEnd type="triangle"/>
-            <a:tailEnd type="triangle"/>
-          </a:ln>
-        </p:spPr>
-        <p:style>
-          <a:lnRef idx="1">
-            <a:schemeClr val="accent1"/>
-          </a:lnRef>
-          <a:fillRef idx="0">
-            <a:schemeClr val="accent1"/>
-          </a:fillRef>
-          <a:effectRef idx="0">
-            <a:schemeClr val="accent1"/>
-          </a:effectRef>
-          <a:fontRef idx="minor">
-            <a:schemeClr val="tx1"/>
-          </a:fontRef>
-        </p:style>
-      </p:cxnSp>
-      <p:sp>
-        <p:nvSpPr>
-          <p:cNvPr id="54" name="TextBox 53">
-            <a:extLst>
-              <a:ext uri="{FF2B5EF4-FFF2-40B4-BE49-F238E27FC236}">
-                <a16:creationId xmlns:a16="http://schemas.microsoft.com/office/drawing/2014/main" id="{522E71EC-E73F-8045-92CA-2E9B816D4A91}"/>
-              </a:ext>
-            </a:extLst>
-          </p:cNvPr>
-          <p:cNvSpPr txBox="1"/>
-          <p:nvPr/>
-        </p:nvSpPr>
-        <p:spPr>
-          <a:xfrm>
-            <a:off x="6784338" y="3994207"/>
-            <a:ext cx="498855" cy="261610"/>
-          </a:xfrm>
-          <a:prstGeom prst="rect">
-            <a:avLst/>
-          </a:prstGeom>
-          <a:noFill/>
-        </p:spPr>
-        <p:txBody>
-          <a:bodyPr wrap="none" rtlCol="0">
-            <a:spAutoFit/>
-          </a:bodyPr>
-          <a:lstStyle/>
-          <a:p>
-            <a:r>
-              <a:rPr lang="en-US" sz="1100" dirty="0">
-                <a:latin typeface="Arial" panose="020B0604020202020204" pitchFamily="34" charset="0"/>
-                <a:ea typeface="Menlo" panose="020B0609030804020204" pitchFamily="49" charset="0"/>
-                <a:cs typeface="Arial" panose="020B0604020202020204" pitchFamily="34" charset="0"/>
-              </a:rPr>
-              <a:t>8545</a:t>
             </a:r>
           </a:p>
         </p:txBody>
@@ -7652,66 +7337,6 @@
           </a:fontRef>
         </p:style>
       </p:cxnSp>
-      <p:sp>
-        <p:nvSpPr>
-          <p:cNvPr id="126" name="Rectangle 125">
-            <a:extLst>
-              <a:ext uri="{FF2B5EF4-FFF2-40B4-BE49-F238E27FC236}">
-                <a16:creationId xmlns:a16="http://schemas.microsoft.com/office/drawing/2014/main" id="{6499A0B0-043E-6F4F-B3CD-A7E0448871C6}"/>
-              </a:ext>
-            </a:extLst>
-          </p:cNvPr>
-          <p:cNvSpPr/>
-          <p:nvPr/>
-        </p:nvSpPr>
-        <p:spPr>
-          <a:xfrm>
-            <a:off x="6082170" y="3974491"/>
-            <a:ext cx="1243933" cy="711947"/>
-          </a:xfrm>
-          <a:prstGeom prst="rect">
-            <a:avLst/>
-          </a:prstGeom>
-          <a:noFill/>
-          <a:ln w="25400">
-            <a:solidFill>
-              <a:srgbClr val="FFC000"/>
-            </a:solidFill>
-            <a:prstDash val="dash"/>
-          </a:ln>
-        </p:spPr>
-        <p:style>
-          <a:lnRef idx="2">
-            <a:schemeClr val="accent1">
-              <a:shade val="50000"/>
-            </a:schemeClr>
-          </a:lnRef>
-          <a:fillRef idx="1">
-            <a:schemeClr val="accent1"/>
-          </a:fillRef>
-          <a:effectRef idx="0">
-            <a:schemeClr val="accent1"/>
-          </a:effectRef>
-          <a:fontRef idx="minor">
-            <a:schemeClr val="lt1"/>
-          </a:fontRef>
-        </p:style>
-        <p:txBody>
-          <a:bodyPr rtlCol="0" anchor="ctr"/>
-          <a:lstStyle/>
-          <a:p>
-            <a:pPr algn="ctr"/>
-            <a:endParaRPr lang="en-US" sz="1000">
-              <a:solidFill>
-                <a:schemeClr val="tx1"/>
-              </a:solidFill>
-              <a:latin typeface="Menlo" panose="020B0609030804020204" pitchFamily="49" charset="0"/>
-              <a:ea typeface="Menlo" panose="020B0609030804020204" pitchFamily="49" charset="0"/>
-              <a:cs typeface="Menlo" panose="020B0609030804020204" pitchFamily="49" charset="0"/>
-            </a:endParaRPr>
-          </a:p>
-        </p:txBody>
-      </p:sp>
       <p:pic>
         <p:nvPicPr>
           <p:cNvPr id="130" name="Picture 129">
@@ -9870,195 +9495,6 @@
                 <a:cs typeface="Arial" panose="020B0604020202020204" pitchFamily="34" charset="0"/>
               </a:rPr>
               <a:t>22</a:t>
-            </a:r>
-          </a:p>
-        </p:txBody>
-      </p:sp>
-      <p:sp>
-        <p:nvSpPr>
-          <p:cNvPr id="123" name="Rectangle 122">
-            <a:extLst>
-              <a:ext uri="{FF2B5EF4-FFF2-40B4-BE49-F238E27FC236}">
-                <a16:creationId xmlns:a16="http://schemas.microsoft.com/office/drawing/2014/main" id="{AA21E856-BB8E-4656-850C-FA5485C663D1}"/>
-              </a:ext>
-            </a:extLst>
-          </p:cNvPr>
-          <p:cNvSpPr/>
-          <p:nvPr/>
-        </p:nvSpPr>
-        <p:spPr>
-          <a:xfrm>
-            <a:off x="3625736" y="3373607"/>
-            <a:ext cx="723375" cy="360236"/>
-          </a:xfrm>
-          <a:prstGeom prst="rect">
-            <a:avLst/>
-          </a:prstGeom>
-          <a:solidFill>
-            <a:schemeClr val="accent4">
-              <a:lumMod val="60000"/>
-              <a:lumOff val="40000"/>
-              <a:alpha val="97647"/>
-            </a:schemeClr>
-          </a:solidFill>
-          <a:ln>
-            <a:solidFill>
-              <a:schemeClr val="accent4">
-                <a:lumMod val="75000"/>
-              </a:schemeClr>
-            </a:solidFill>
-          </a:ln>
-        </p:spPr>
-        <p:style>
-          <a:lnRef idx="2">
-            <a:schemeClr val="accent1">
-              <a:shade val="50000"/>
-            </a:schemeClr>
-          </a:lnRef>
-          <a:fillRef idx="1">
-            <a:schemeClr val="accent1"/>
-          </a:fillRef>
-          <a:effectRef idx="0">
-            <a:schemeClr val="accent1"/>
-          </a:effectRef>
-          <a:fontRef idx="minor">
-            <a:schemeClr val="lt1"/>
-          </a:fontRef>
-        </p:style>
-        <p:txBody>
-          <a:bodyPr rtlCol="0" anchor="ctr"/>
-          <a:lstStyle/>
-          <a:p>
-            <a:pPr algn="ctr"/>
-            <a:r>
-              <a:rPr lang="en-US" sz="933" dirty="0">
-                <a:solidFill>
-                  <a:schemeClr val="tx1"/>
-                </a:solidFill>
-                <a:latin typeface="Arial" panose="020B0604020202020204" pitchFamily="34" charset="0"/>
-                <a:ea typeface="Menlo" panose="020B0609030804020204" pitchFamily="49" charset="0"/>
-                <a:cs typeface="Arial" panose="020B0604020202020204" pitchFamily="34" charset="0"/>
-              </a:rPr>
-              <a:t>Metrics Service</a:t>
-            </a:r>
-          </a:p>
-        </p:txBody>
-      </p:sp>
-      <p:sp>
-        <p:nvSpPr>
-          <p:cNvPr id="125" name="TextBox 124">
-            <a:extLst>
-              <a:ext uri="{FF2B5EF4-FFF2-40B4-BE49-F238E27FC236}">
-                <a16:creationId xmlns:a16="http://schemas.microsoft.com/office/drawing/2014/main" id="{7F4D2A41-7768-4760-AAEC-157425E0AD93}"/>
-              </a:ext>
-            </a:extLst>
-          </p:cNvPr>
-          <p:cNvSpPr txBox="1"/>
-          <p:nvPr/>
-        </p:nvSpPr>
-        <p:spPr>
-          <a:xfrm>
-            <a:off x="3680352" y="3131869"/>
-            <a:ext cx="536683" cy="261610"/>
-          </a:xfrm>
-          <a:prstGeom prst="rect">
-            <a:avLst/>
-          </a:prstGeom>
-          <a:noFill/>
-        </p:spPr>
-        <p:txBody>
-          <a:bodyPr wrap="square" rtlCol="0">
-            <a:spAutoFit/>
-          </a:bodyPr>
-          <a:lstStyle/>
-          <a:p>
-            <a:r>
-              <a:rPr lang="en-US" sz="1100" dirty="0">
-                <a:latin typeface="Arial" panose="020B0604020202020204" pitchFamily="34" charset="0"/>
-                <a:ea typeface="Menlo" panose="020B0609030804020204" pitchFamily="49" charset="0"/>
-                <a:cs typeface="Arial" panose="020B0604020202020204" pitchFamily="34" charset="0"/>
-              </a:rPr>
-              <a:t>7551</a:t>
-            </a:r>
-          </a:p>
-        </p:txBody>
-      </p:sp>
-      <p:cxnSp>
-        <p:nvCxnSpPr>
-          <p:cNvPr id="128" name="Straight Arrow Connector 127">
-            <a:extLst>
-              <a:ext uri="{FF2B5EF4-FFF2-40B4-BE49-F238E27FC236}">
-                <a16:creationId xmlns:a16="http://schemas.microsoft.com/office/drawing/2014/main" id="{48D924D7-7D2D-4BD4-813D-D1A32E39EA27}"/>
-              </a:ext>
-            </a:extLst>
-          </p:cNvPr>
-          <p:cNvCxnSpPr>
-            <a:cxnSpLocks/>
-          </p:cNvCxnSpPr>
-          <p:nvPr/>
-        </p:nvCxnSpPr>
-        <p:spPr>
-          <a:xfrm>
-            <a:off x="4216274" y="3058455"/>
-            <a:ext cx="0" cy="304147"/>
-          </a:xfrm>
-          <a:prstGeom prst="straightConnector1">
-            <a:avLst/>
-          </a:prstGeom>
-          <a:ln>
-            <a:headEnd type="triangle"/>
-            <a:tailEnd type="triangle"/>
-          </a:ln>
-        </p:spPr>
-        <p:style>
-          <a:lnRef idx="1">
-            <a:schemeClr val="accent1"/>
-          </a:lnRef>
-          <a:fillRef idx="0">
-            <a:schemeClr val="accent1"/>
-          </a:fillRef>
-          <a:effectRef idx="0">
-            <a:schemeClr val="accent1"/>
-          </a:effectRef>
-          <a:fontRef idx="minor">
-            <a:schemeClr val="tx1"/>
-          </a:fontRef>
-        </p:style>
-      </p:cxnSp>
-      <p:sp>
-        <p:nvSpPr>
-          <p:cNvPr id="145" name="TextBox 144">
-            <a:extLst>
-              <a:ext uri="{FF2B5EF4-FFF2-40B4-BE49-F238E27FC236}">
-                <a16:creationId xmlns:a16="http://schemas.microsoft.com/office/drawing/2014/main" id="{0F71EF4B-E004-46B8-8753-BCCAE09B6ACC}"/>
-              </a:ext>
-            </a:extLst>
-          </p:cNvPr>
-          <p:cNvSpPr txBox="1"/>
-          <p:nvPr/>
-        </p:nvSpPr>
-        <p:spPr>
-          <a:xfrm>
-            <a:off x="5974609" y="4697849"/>
-            <a:ext cx="1459054" cy="235449"/>
-          </a:xfrm>
-          <a:prstGeom prst="rect">
-            <a:avLst/>
-          </a:prstGeom>
-          <a:noFill/>
-        </p:spPr>
-        <p:txBody>
-          <a:bodyPr wrap="none" rtlCol="0">
-            <a:spAutoFit/>
-          </a:bodyPr>
-          <a:lstStyle/>
-          <a:p>
-            <a:r>
-              <a:rPr lang="en-US" sz="930" dirty="0">
-                <a:latin typeface="Arial" panose="020B0604020202020204" pitchFamily="34" charset="0"/>
-                <a:cs typeface="Arial" panose="020B0604020202020204" pitchFamily="34" charset="0"/>
-              </a:rPr>
-              <a:t>(Optional, off by default)</a:t>
             </a:r>
           </a:p>
         </p:txBody>
@@ -11024,160 +10460,12 @@
           </a:fontRef>
         </p:style>
       </p:cxnSp>
-      <p:sp>
-        <p:nvSpPr>
-          <p:cNvPr id="42" name="Rectangle 41">
-            <a:extLst>
-              <a:ext uri="{FF2B5EF4-FFF2-40B4-BE49-F238E27FC236}">
-                <a16:creationId xmlns:a16="http://schemas.microsoft.com/office/drawing/2014/main" id="{7A2C7D56-E8C6-1042-9DF3-33D6754C7710}"/>
-              </a:ext>
-            </a:extLst>
-          </p:cNvPr>
-          <p:cNvSpPr/>
-          <p:nvPr/>
-        </p:nvSpPr>
-        <p:spPr>
-          <a:xfrm>
-            <a:off x="6153605" y="4247506"/>
-            <a:ext cx="517682" cy="311869"/>
-          </a:xfrm>
-          <a:prstGeom prst="rect">
-            <a:avLst/>
-          </a:prstGeom>
-          <a:pattFill prst="pct50">
-            <a:fgClr>
-              <a:schemeClr val="accent4">
-                <a:lumMod val="60000"/>
-                <a:lumOff val="40000"/>
-              </a:schemeClr>
-            </a:fgClr>
-            <a:bgClr>
-              <a:schemeClr val="bg1"/>
-            </a:bgClr>
-          </a:pattFill>
-          <a:ln>
-            <a:solidFill>
-              <a:schemeClr val="accent4">
-                <a:lumMod val="75000"/>
-              </a:schemeClr>
-            </a:solidFill>
-          </a:ln>
-        </p:spPr>
-        <p:style>
-          <a:lnRef idx="2">
-            <a:schemeClr val="accent1">
-              <a:shade val="50000"/>
-            </a:schemeClr>
-          </a:lnRef>
-          <a:fillRef idx="1">
-            <a:schemeClr val="accent1"/>
-          </a:fillRef>
-          <a:effectRef idx="0">
-            <a:schemeClr val="accent1"/>
-          </a:effectRef>
-          <a:fontRef idx="minor">
-            <a:schemeClr val="lt1"/>
-          </a:fontRef>
-        </p:style>
-        <p:txBody>
-          <a:bodyPr rtlCol="0" anchor="ctr"/>
-          <a:lstStyle/>
-          <a:p>
-            <a:pPr algn="ctr"/>
-            <a:r>
-              <a:rPr lang="en-US" sz="933">
-                <a:solidFill>
-                  <a:schemeClr val="tx1"/>
-                </a:solidFill>
-                <a:latin typeface="Arial" panose="020B0604020202020204" pitchFamily="34" charset="0"/>
-                <a:ea typeface="Menlo" panose="020B0609030804020204" pitchFamily="49" charset="0"/>
-                <a:cs typeface="Arial" panose="020B0604020202020204" pitchFamily="34" charset="0"/>
-              </a:rPr>
-              <a:t>File API</a:t>
-            </a:r>
-          </a:p>
-        </p:txBody>
-      </p:sp>
-      <p:sp>
-        <p:nvSpPr>
-          <p:cNvPr id="43" name="Rectangle 42">
-            <a:extLst>
-              <a:ext uri="{FF2B5EF4-FFF2-40B4-BE49-F238E27FC236}">
-                <a16:creationId xmlns:a16="http://schemas.microsoft.com/office/drawing/2014/main" id="{9CF8B830-DC0B-A740-A36B-B958C1A572E0}"/>
-              </a:ext>
-            </a:extLst>
-          </p:cNvPr>
-          <p:cNvSpPr/>
-          <p:nvPr/>
-        </p:nvSpPr>
-        <p:spPr>
-          <a:xfrm>
-            <a:off x="6732723" y="4247506"/>
-            <a:ext cx="498855" cy="311869"/>
-          </a:xfrm>
-          <a:prstGeom prst="rect">
-            <a:avLst/>
-          </a:prstGeom>
-          <a:pattFill prst="pct50">
-            <a:fgClr>
-              <a:schemeClr val="accent4">
-                <a:lumMod val="60000"/>
-                <a:lumOff val="40000"/>
-              </a:schemeClr>
-            </a:fgClr>
-            <a:bgClr>
-              <a:schemeClr val="bg1"/>
-            </a:bgClr>
-          </a:pattFill>
-          <a:ln>
-            <a:solidFill>
-              <a:schemeClr val="accent4">
-                <a:lumMod val="75000"/>
-              </a:schemeClr>
-            </a:solidFill>
-          </a:ln>
-        </p:spPr>
-        <p:style>
-          <a:lnRef idx="2">
-            <a:schemeClr val="accent1">
-              <a:shade val="50000"/>
-            </a:schemeClr>
-          </a:lnRef>
-          <a:fillRef idx="1">
-            <a:schemeClr val="accent1"/>
-          </a:fillRef>
-          <a:effectRef idx="0">
-            <a:schemeClr val="accent1"/>
-          </a:effectRef>
-          <a:fontRef idx="minor">
-            <a:schemeClr val="lt1"/>
-          </a:fontRef>
-        </p:style>
-        <p:txBody>
-          <a:bodyPr rtlCol="0" anchor="ctr"/>
-          <a:lstStyle/>
-          <a:p>
-            <a:pPr algn="ctr"/>
-            <a:r>
-              <a:rPr lang="en-US" sz="933" dirty="0">
-                <a:solidFill>
-                  <a:schemeClr val="tx1"/>
-                </a:solidFill>
-                <a:latin typeface="Arial" panose="020B0604020202020204" pitchFamily="34" charset="0"/>
-                <a:ea typeface="Menlo" panose="020B0609030804020204" pitchFamily="49" charset="0"/>
-                <a:cs typeface="Arial" panose="020B0604020202020204" pitchFamily="34" charset="0"/>
-              </a:rPr>
-              <a:t>JES API</a:t>
-            </a:r>
-          </a:p>
-        </p:txBody>
-      </p:sp>
       <p:cxnSp>
         <p:nvCxnSpPr>
-          <p:cNvPr id="45" name="Straight Arrow Connector 44">
-            <a:extLst>
-              <a:ext uri="{FF2B5EF4-FFF2-40B4-BE49-F238E27FC236}">
-                <a16:creationId xmlns:a16="http://schemas.microsoft.com/office/drawing/2014/main" id="{3892E7B8-0947-C447-9E5E-CE36A08691A2}"/>
+          <p:cNvPr id="46" name="Straight Arrow Connector 45">
+            <a:extLst>
+              <a:ext uri="{FF2B5EF4-FFF2-40B4-BE49-F238E27FC236}">
+                <a16:creationId xmlns:a16="http://schemas.microsoft.com/office/drawing/2014/main" id="{021AF651-50B6-6746-B692-A167727F149A}"/>
               </a:ext>
             </a:extLst>
           </p:cNvPr>
@@ -11188,8 +10476,8 @@
         </p:nvCxnSpPr>
         <p:spPr>
           <a:xfrm>
-            <a:off x="6586026" y="3069751"/>
-            <a:ext cx="9031" cy="1344229"/>
+            <a:off x="4556191" y="1699591"/>
+            <a:ext cx="0" cy="759483"/>
           </a:xfrm>
           <a:prstGeom prst="straightConnector1">
             <a:avLst/>
@@ -11214,48 +10502,6 @@
           </a:fontRef>
         </p:style>
       </p:cxnSp>
-      <p:cxnSp>
-        <p:nvCxnSpPr>
-          <p:cNvPr id="46" name="Straight Arrow Connector 45">
-            <a:extLst>
-              <a:ext uri="{FF2B5EF4-FFF2-40B4-BE49-F238E27FC236}">
-                <a16:creationId xmlns:a16="http://schemas.microsoft.com/office/drawing/2014/main" id="{021AF651-50B6-6746-B692-A167727F149A}"/>
-              </a:ext>
-            </a:extLst>
-          </p:cNvPr>
-          <p:cNvCxnSpPr>
-            <a:cxnSpLocks/>
-          </p:cNvCxnSpPr>
-          <p:nvPr/>
-        </p:nvCxnSpPr>
-        <p:spPr>
-          <a:xfrm>
-            <a:off x="4556191" y="1699591"/>
-            <a:ext cx="0" cy="759483"/>
-          </a:xfrm>
-          <a:prstGeom prst="straightConnector1">
-            <a:avLst/>
-          </a:prstGeom>
-          <a:ln>
-            <a:headEnd type="triangle"/>
-            <a:tailEnd type="triangle"/>
-          </a:ln>
-        </p:spPr>
-        <p:style>
-          <a:lnRef idx="1">
-            <a:schemeClr val="accent1"/>
-          </a:lnRef>
-          <a:fillRef idx="0">
-            <a:schemeClr val="accent1"/>
-          </a:fillRef>
-          <a:effectRef idx="0">
-            <a:schemeClr val="accent1"/>
-          </a:effectRef>
-          <a:fontRef idx="minor">
-            <a:schemeClr val="tx1"/>
-          </a:fontRef>
-        </p:style>
-      </p:cxnSp>
       <p:sp>
         <p:nvSpPr>
           <p:cNvPr id="48" name="TextBox 47">
@@ -11369,131 +10615,6 @@
                 <a:cs typeface="Arial" panose="020B0604020202020204" pitchFamily="34" charset="0"/>
               </a:rPr>
               <a:t>7552</a:t>
-            </a:r>
-          </a:p>
-        </p:txBody>
-      </p:sp>
-      <p:sp>
-        <p:nvSpPr>
-          <p:cNvPr id="51" name="TextBox 50">
-            <a:extLst>
-              <a:ext uri="{FF2B5EF4-FFF2-40B4-BE49-F238E27FC236}">
-                <a16:creationId xmlns:a16="http://schemas.microsoft.com/office/drawing/2014/main" id="{C24C4305-5BA2-1B43-A80B-DF777ED8E227}"/>
-              </a:ext>
-            </a:extLst>
-          </p:cNvPr>
-          <p:cNvSpPr txBox="1"/>
-          <p:nvPr/>
-        </p:nvSpPr>
-        <p:spPr>
-          <a:xfrm>
-            <a:off x="6139001" y="3993721"/>
-            <a:ext cx="486030" cy="253916"/>
-          </a:xfrm>
-          <a:prstGeom prst="rect">
-            <a:avLst/>
-          </a:prstGeom>
-          <a:noFill/>
-        </p:spPr>
-        <p:txBody>
-          <a:bodyPr wrap="none" rtlCol="0">
-            <a:spAutoFit/>
-          </a:bodyPr>
-          <a:lstStyle/>
-          <a:p>
-            <a:r>
-              <a:rPr lang="en-US" sz="1050" dirty="0">
-                <a:latin typeface="Arial" panose="020B0604020202020204" pitchFamily="34" charset="0"/>
-                <a:ea typeface="Menlo" panose="020B0609030804020204" pitchFamily="49" charset="0"/>
-                <a:cs typeface="Arial" panose="020B0604020202020204" pitchFamily="34" charset="0"/>
-              </a:rPr>
-              <a:t>8547</a:t>
-            </a:r>
-            <a:endParaRPr lang="en-US" sz="1067" dirty="0">
-              <a:latin typeface="Arial" panose="020B0604020202020204" pitchFamily="34" charset="0"/>
-              <a:ea typeface="Menlo" panose="020B0609030804020204" pitchFamily="49" charset="0"/>
-              <a:cs typeface="Arial" panose="020B0604020202020204" pitchFamily="34" charset="0"/>
-            </a:endParaRPr>
-          </a:p>
-        </p:txBody>
-      </p:sp>
-      <p:cxnSp>
-        <p:nvCxnSpPr>
-          <p:cNvPr id="52" name="Straight Arrow Connector 51">
-            <a:extLst>
-              <a:ext uri="{FF2B5EF4-FFF2-40B4-BE49-F238E27FC236}">
-                <a16:creationId xmlns:a16="http://schemas.microsoft.com/office/drawing/2014/main" id="{1A8D5EA7-D754-BD43-8ADC-13C0B2EE28C5}"/>
-              </a:ext>
-            </a:extLst>
-          </p:cNvPr>
-          <p:cNvCxnSpPr>
-            <a:cxnSpLocks/>
-          </p:cNvCxnSpPr>
-          <p:nvPr/>
-        </p:nvCxnSpPr>
-        <p:spPr>
-          <a:xfrm>
-            <a:off x="6794568" y="3045566"/>
-            <a:ext cx="0" cy="1371280"/>
-          </a:xfrm>
-          <a:prstGeom prst="straightConnector1">
-            <a:avLst/>
-          </a:prstGeom>
-          <a:ln>
-            <a:headEnd type="triangle"/>
-            <a:tailEnd type="triangle"/>
-          </a:ln>
-        </p:spPr>
-        <p:style>
-          <a:lnRef idx="1">
-            <a:schemeClr val="accent1"/>
-          </a:lnRef>
-          <a:fillRef idx="0">
-            <a:schemeClr val="accent1"/>
-          </a:fillRef>
-          <a:effectRef idx="0">
-            <a:schemeClr val="accent1"/>
-          </a:effectRef>
-          <a:fontRef idx="minor">
-            <a:schemeClr val="tx1"/>
-          </a:fontRef>
-        </p:style>
-      </p:cxnSp>
-      <p:sp>
-        <p:nvSpPr>
-          <p:cNvPr id="54" name="TextBox 53">
-            <a:extLst>
-              <a:ext uri="{FF2B5EF4-FFF2-40B4-BE49-F238E27FC236}">
-                <a16:creationId xmlns:a16="http://schemas.microsoft.com/office/drawing/2014/main" id="{522E71EC-E73F-8045-92CA-2E9B816D4A91}"/>
-              </a:ext>
-            </a:extLst>
-          </p:cNvPr>
-          <p:cNvSpPr txBox="1"/>
-          <p:nvPr/>
-        </p:nvSpPr>
-        <p:spPr>
-          <a:xfrm>
-            <a:off x="6789781" y="3994207"/>
-            <a:ext cx="498855" cy="261610"/>
-          </a:xfrm>
-          <a:prstGeom prst="rect">
-            <a:avLst/>
-          </a:prstGeom>
-          <a:noFill/>
-        </p:spPr>
-        <p:txBody>
-          <a:bodyPr wrap="none" rtlCol="0">
-            <a:spAutoFit/>
-          </a:bodyPr>
-          <a:lstStyle/>
-          <a:p>
-            <a:r>
-              <a:rPr lang="en-US" sz="1100" dirty="0">
-                <a:latin typeface="Arial" panose="020B0604020202020204" pitchFamily="34" charset="0"/>
-                <a:ea typeface="Menlo" panose="020B0609030804020204" pitchFamily="49" charset="0"/>
-                <a:cs typeface="Arial" panose="020B0604020202020204" pitchFamily="34" charset="0"/>
-              </a:rPr>
-              <a:t>8545</a:t>
             </a:r>
           </a:p>
         </p:txBody>
@@ -13477,66 +12598,6 @@
           </a:fontRef>
         </p:style>
       </p:cxnSp>
-      <p:sp>
-        <p:nvSpPr>
-          <p:cNvPr id="126" name="Rectangle 125">
-            <a:extLst>
-              <a:ext uri="{FF2B5EF4-FFF2-40B4-BE49-F238E27FC236}">
-                <a16:creationId xmlns:a16="http://schemas.microsoft.com/office/drawing/2014/main" id="{6499A0B0-043E-6F4F-B3CD-A7E0448871C6}"/>
-              </a:ext>
-            </a:extLst>
-          </p:cNvPr>
-          <p:cNvSpPr/>
-          <p:nvPr/>
-        </p:nvSpPr>
-        <p:spPr>
-          <a:xfrm>
-            <a:off x="6082170" y="3974491"/>
-            <a:ext cx="1243933" cy="711947"/>
-          </a:xfrm>
-          <a:prstGeom prst="rect">
-            <a:avLst/>
-          </a:prstGeom>
-          <a:noFill/>
-          <a:ln w="25400">
-            <a:solidFill>
-              <a:srgbClr val="FFC000"/>
-            </a:solidFill>
-            <a:prstDash val="dash"/>
-          </a:ln>
-        </p:spPr>
-        <p:style>
-          <a:lnRef idx="2">
-            <a:schemeClr val="accent1">
-              <a:shade val="50000"/>
-            </a:schemeClr>
-          </a:lnRef>
-          <a:fillRef idx="1">
-            <a:schemeClr val="accent1"/>
-          </a:fillRef>
-          <a:effectRef idx="0">
-            <a:schemeClr val="accent1"/>
-          </a:effectRef>
-          <a:fontRef idx="minor">
-            <a:schemeClr val="lt1"/>
-          </a:fontRef>
-        </p:style>
-        <p:txBody>
-          <a:bodyPr rtlCol="0" anchor="ctr"/>
-          <a:lstStyle/>
-          <a:p>
-            <a:pPr algn="ctr"/>
-            <a:endParaRPr lang="en-US" sz="1000">
-              <a:solidFill>
-                <a:schemeClr val="tx1"/>
-              </a:solidFill>
-              <a:latin typeface="Menlo" panose="020B0609030804020204" pitchFamily="49" charset="0"/>
-              <a:ea typeface="Menlo" panose="020B0609030804020204" pitchFamily="49" charset="0"/>
-              <a:cs typeface="Menlo" panose="020B0609030804020204" pitchFamily="49" charset="0"/>
-            </a:endParaRPr>
-          </a:p>
-        </p:txBody>
-      </p:sp>
       <p:pic>
         <p:nvPicPr>
           <p:cNvPr id="130" name="Picture 129">
@@ -15523,195 +14584,6 @@
                 <a:cs typeface="Arial" panose="020B0604020202020204" pitchFamily="34" charset="0"/>
               </a:rPr>
               <a:t>22</a:t>
-            </a:r>
-          </a:p>
-        </p:txBody>
-      </p:sp>
-      <p:sp>
-        <p:nvSpPr>
-          <p:cNvPr id="123" name="Rectangle 122">
-            <a:extLst>
-              <a:ext uri="{FF2B5EF4-FFF2-40B4-BE49-F238E27FC236}">
-                <a16:creationId xmlns:a16="http://schemas.microsoft.com/office/drawing/2014/main" id="{AA21E856-BB8E-4656-850C-FA5485C663D1}"/>
-              </a:ext>
-            </a:extLst>
-          </p:cNvPr>
-          <p:cNvSpPr/>
-          <p:nvPr/>
-        </p:nvSpPr>
-        <p:spPr>
-          <a:xfrm>
-            <a:off x="3625736" y="3373607"/>
-            <a:ext cx="723375" cy="360236"/>
-          </a:xfrm>
-          <a:prstGeom prst="rect">
-            <a:avLst/>
-          </a:prstGeom>
-          <a:solidFill>
-            <a:schemeClr val="accent4">
-              <a:lumMod val="60000"/>
-              <a:lumOff val="40000"/>
-              <a:alpha val="97647"/>
-            </a:schemeClr>
-          </a:solidFill>
-          <a:ln>
-            <a:solidFill>
-              <a:schemeClr val="accent4">
-                <a:lumMod val="75000"/>
-              </a:schemeClr>
-            </a:solidFill>
-          </a:ln>
-        </p:spPr>
-        <p:style>
-          <a:lnRef idx="2">
-            <a:schemeClr val="accent1">
-              <a:shade val="50000"/>
-            </a:schemeClr>
-          </a:lnRef>
-          <a:fillRef idx="1">
-            <a:schemeClr val="accent1"/>
-          </a:fillRef>
-          <a:effectRef idx="0">
-            <a:schemeClr val="accent1"/>
-          </a:effectRef>
-          <a:fontRef idx="minor">
-            <a:schemeClr val="lt1"/>
-          </a:fontRef>
-        </p:style>
-        <p:txBody>
-          <a:bodyPr rtlCol="0" anchor="ctr"/>
-          <a:lstStyle/>
-          <a:p>
-            <a:pPr algn="ctr"/>
-            <a:r>
-              <a:rPr lang="en-US" sz="933" dirty="0">
-                <a:solidFill>
-                  <a:schemeClr val="tx1"/>
-                </a:solidFill>
-                <a:latin typeface="Arial" panose="020B0604020202020204" pitchFamily="34" charset="0"/>
-                <a:ea typeface="Menlo" panose="020B0609030804020204" pitchFamily="49" charset="0"/>
-                <a:cs typeface="Arial" panose="020B0604020202020204" pitchFamily="34" charset="0"/>
-              </a:rPr>
-              <a:t>Metrics Service</a:t>
-            </a:r>
-          </a:p>
-        </p:txBody>
-      </p:sp>
-      <p:sp>
-        <p:nvSpPr>
-          <p:cNvPr id="125" name="TextBox 124">
-            <a:extLst>
-              <a:ext uri="{FF2B5EF4-FFF2-40B4-BE49-F238E27FC236}">
-                <a16:creationId xmlns:a16="http://schemas.microsoft.com/office/drawing/2014/main" id="{7F4D2A41-7768-4760-AAEC-157425E0AD93}"/>
-              </a:ext>
-            </a:extLst>
-          </p:cNvPr>
-          <p:cNvSpPr txBox="1"/>
-          <p:nvPr/>
-        </p:nvSpPr>
-        <p:spPr>
-          <a:xfrm>
-            <a:off x="3680352" y="3131869"/>
-            <a:ext cx="536683" cy="261610"/>
-          </a:xfrm>
-          <a:prstGeom prst="rect">
-            <a:avLst/>
-          </a:prstGeom>
-          <a:noFill/>
-        </p:spPr>
-        <p:txBody>
-          <a:bodyPr wrap="square" rtlCol="0">
-            <a:spAutoFit/>
-          </a:bodyPr>
-          <a:lstStyle/>
-          <a:p>
-            <a:r>
-              <a:rPr lang="en-US" sz="1100" dirty="0">
-                <a:latin typeface="Arial" panose="020B0604020202020204" pitchFamily="34" charset="0"/>
-                <a:ea typeface="Menlo" panose="020B0609030804020204" pitchFamily="49" charset="0"/>
-                <a:cs typeface="Arial" panose="020B0604020202020204" pitchFamily="34" charset="0"/>
-              </a:rPr>
-              <a:t>7551</a:t>
-            </a:r>
-          </a:p>
-        </p:txBody>
-      </p:sp>
-      <p:cxnSp>
-        <p:nvCxnSpPr>
-          <p:cNvPr id="128" name="Straight Arrow Connector 127">
-            <a:extLst>
-              <a:ext uri="{FF2B5EF4-FFF2-40B4-BE49-F238E27FC236}">
-                <a16:creationId xmlns:a16="http://schemas.microsoft.com/office/drawing/2014/main" id="{48D924D7-7D2D-4BD4-813D-D1A32E39EA27}"/>
-              </a:ext>
-            </a:extLst>
-          </p:cNvPr>
-          <p:cNvCxnSpPr>
-            <a:cxnSpLocks/>
-          </p:cNvCxnSpPr>
-          <p:nvPr/>
-        </p:nvCxnSpPr>
-        <p:spPr>
-          <a:xfrm>
-            <a:off x="4216274" y="3058455"/>
-            <a:ext cx="0" cy="304147"/>
-          </a:xfrm>
-          <a:prstGeom prst="straightConnector1">
-            <a:avLst/>
-          </a:prstGeom>
-          <a:ln>
-            <a:headEnd type="triangle"/>
-            <a:tailEnd type="triangle"/>
-          </a:ln>
-        </p:spPr>
-        <p:style>
-          <a:lnRef idx="1">
-            <a:schemeClr val="accent1"/>
-          </a:lnRef>
-          <a:fillRef idx="0">
-            <a:schemeClr val="accent1"/>
-          </a:fillRef>
-          <a:effectRef idx="0">
-            <a:schemeClr val="accent1"/>
-          </a:effectRef>
-          <a:fontRef idx="minor">
-            <a:schemeClr val="tx1"/>
-          </a:fontRef>
-        </p:style>
-      </p:cxnSp>
-      <p:sp>
-        <p:nvSpPr>
-          <p:cNvPr id="145" name="TextBox 144">
-            <a:extLst>
-              <a:ext uri="{FF2B5EF4-FFF2-40B4-BE49-F238E27FC236}">
-                <a16:creationId xmlns:a16="http://schemas.microsoft.com/office/drawing/2014/main" id="{0F71EF4B-E004-46B8-8753-BCCAE09B6ACC}"/>
-              </a:ext>
-            </a:extLst>
-          </p:cNvPr>
-          <p:cNvSpPr txBox="1"/>
-          <p:nvPr/>
-        </p:nvSpPr>
-        <p:spPr>
-          <a:xfrm>
-            <a:off x="5974609" y="4697849"/>
-            <a:ext cx="1459054" cy="235449"/>
-          </a:xfrm>
-          <a:prstGeom prst="rect">
-            <a:avLst/>
-          </a:prstGeom>
-          <a:noFill/>
-        </p:spPr>
-        <p:txBody>
-          <a:bodyPr wrap="none" rtlCol="0">
-            <a:spAutoFit/>
-          </a:bodyPr>
-          <a:lstStyle/>
-          <a:p>
-            <a:r>
-              <a:rPr lang="en-US" sz="930" dirty="0">
-                <a:latin typeface="Arial" panose="020B0604020202020204" pitchFamily="34" charset="0"/>
-                <a:cs typeface="Arial" panose="020B0604020202020204" pitchFamily="34" charset="0"/>
-              </a:rPr>
-              <a:t>(Optional, off by default)</a:t>
             </a:r>
           </a:p>
         </p:txBody>
@@ -16759,148 +15631,6 @@
           </a:p>
         </p:txBody>
       </p:sp>
-      <p:sp>
-        <p:nvSpPr>
-          <p:cNvPr id="210" name="Rectangle 209">
-            <a:extLst>
-              <a:ext uri="{FF2B5EF4-FFF2-40B4-BE49-F238E27FC236}">
-                <a16:creationId xmlns:a16="http://schemas.microsoft.com/office/drawing/2014/main" id="{DFA4CE29-2E57-4B25-9237-5681B1B69AAC}"/>
-              </a:ext>
-            </a:extLst>
-          </p:cNvPr>
-          <p:cNvSpPr/>
-          <p:nvPr/>
-        </p:nvSpPr>
-        <p:spPr>
-          <a:xfrm>
-            <a:off x="6702267" y="4206446"/>
-            <a:ext cx="527861" cy="337239"/>
-          </a:xfrm>
-          <a:prstGeom prst="rect">
-            <a:avLst/>
-          </a:prstGeom>
-          <a:pattFill prst="pct50">
-            <a:fgClr>
-              <a:schemeClr val="accent4">
-                <a:lumMod val="60000"/>
-                <a:lumOff val="40000"/>
-              </a:schemeClr>
-            </a:fgClr>
-            <a:bgClr>
-              <a:schemeClr val="bg1"/>
-            </a:bgClr>
-          </a:pattFill>
-          <a:ln>
-            <a:solidFill>
-              <a:schemeClr val="accent4">
-                <a:lumMod val="75000"/>
-              </a:schemeClr>
-            </a:solidFill>
-          </a:ln>
-        </p:spPr>
-        <p:style>
-          <a:lnRef idx="2">
-            <a:schemeClr val="accent1">
-              <a:shade val="50000"/>
-            </a:schemeClr>
-          </a:lnRef>
-          <a:fillRef idx="1">
-            <a:schemeClr val="accent1"/>
-          </a:fillRef>
-          <a:effectRef idx="0">
-            <a:schemeClr val="accent1"/>
-          </a:effectRef>
-          <a:fontRef idx="minor">
-            <a:schemeClr val="lt1"/>
-          </a:fontRef>
-        </p:style>
-        <p:txBody>
-          <a:bodyPr rtlCol="0" anchor="ctr"/>
-          <a:lstStyle/>
-          <a:p>
-            <a:pPr algn="ctr"/>
-            <a:endParaRPr lang="en-US" sz="933" dirty="0">
-              <a:solidFill>
-                <a:schemeClr val="tx1"/>
-              </a:solidFill>
-              <a:latin typeface="Arial" panose="020B0604020202020204" pitchFamily="34" charset="0"/>
-              <a:ea typeface="Menlo" panose="020B0609030804020204" pitchFamily="49" charset="0"/>
-              <a:cs typeface="Arial" panose="020B0604020202020204" pitchFamily="34" charset="0"/>
-            </a:endParaRPr>
-          </a:p>
-        </p:txBody>
-      </p:sp>
-      <p:sp>
-        <p:nvSpPr>
-          <p:cNvPr id="209" name="Rectangle 208">
-            <a:extLst>
-              <a:ext uri="{FF2B5EF4-FFF2-40B4-BE49-F238E27FC236}">
-                <a16:creationId xmlns:a16="http://schemas.microsoft.com/office/drawing/2014/main" id="{C32C397E-E7B2-4B8D-A038-C325D0C586EC}"/>
-              </a:ext>
-            </a:extLst>
-          </p:cNvPr>
-          <p:cNvSpPr/>
-          <p:nvPr/>
-        </p:nvSpPr>
-        <p:spPr>
-          <a:xfrm>
-            <a:off x="6119880" y="4201006"/>
-            <a:ext cx="527861" cy="337239"/>
-          </a:xfrm>
-          <a:prstGeom prst="rect">
-            <a:avLst/>
-          </a:prstGeom>
-          <a:pattFill prst="pct50">
-            <a:fgClr>
-              <a:schemeClr val="accent4">
-                <a:lumMod val="60000"/>
-                <a:lumOff val="40000"/>
-              </a:schemeClr>
-            </a:fgClr>
-            <a:bgClr>
-              <a:schemeClr val="bg1"/>
-            </a:bgClr>
-          </a:pattFill>
-          <a:ln>
-            <a:solidFill>
-              <a:schemeClr val="accent4">
-                <a:lumMod val="75000"/>
-              </a:schemeClr>
-            </a:solidFill>
-          </a:ln>
-        </p:spPr>
-        <p:style>
-          <a:lnRef idx="2">
-            <a:schemeClr val="accent1">
-              <a:shade val="50000"/>
-            </a:schemeClr>
-          </a:lnRef>
-          <a:fillRef idx="1">
-            <a:schemeClr val="accent1"/>
-          </a:fillRef>
-          <a:effectRef idx="0">
-            <a:schemeClr val="accent1"/>
-          </a:effectRef>
-          <a:fontRef idx="minor">
-            <a:schemeClr val="lt1"/>
-          </a:fontRef>
-        </p:style>
-        <p:txBody>
-          <a:bodyPr rtlCol="0" anchor="ctr"/>
-          <a:lstStyle/>
-          <a:p>
-            <a:pPr algn="ctr"/>
-            <a:endParaRPr lang="en-US" sz="933" dirty="0">
-              <a:solidFill>
-                <a:schemeClr val="tx1"/>
-              </a:solidFill>
-              <a:latin typeface="Arial" panose="020B0604020202020204" pitchFamily="34" charset="0"/>
-              <a:ea typeface="Menlo" panose="020B0609030804020204" pitchFamily="49" charset="0"/>
-              <a:cs typeface="Arial" panose="020B0604020202020204" pitchFamily="34" charset="0"/>
-            </a:endParaRPr>
-          </a:p>
-        </p:txBody>
-      </p:sp>
       <p:pic>
         <p:nvPicPr>
           <p:cNvPr id="149" name="Picture 4">
@@ -18264,160 +16994,12 @@
           </a:fontRef>
         </p:style>
       </p:cxnSp>
-      <p:sp>
-        <p:nvSpPr>
-          <p:cNvPr id="42" name="Rectangle 41">
-            <a:extLst>
-              <a:ext uri="{FF2B5EF4-FFF2-40B4-BE49-F238E27FC236}">
-                <a16:creationId xmlns:a16="http://schemas.microsoft.com/office/drawing/2014/main" id="{7A2C7D56-E8C6-1042-9DF3-33D6754C7710}"/>
-              </a:ext>
-            </a:extLst>
-          </p:cNvPr>
-          <p:cNvSpPr/>
-          <p:nvPr/>
-        </p:nvSpPr>
-        <p:spPr>
-          <a:xfrm>
-            <a:off x="6153605" y="4247506"/>
-            <a:ext cx="517682" cy="311869"/>
-          </a:xfrm>
-          <a:prstGeom prst="rect">
-            <a:avLst/>
-          </a:prstGeom>
-          <a:pattFill prst="pct50">
-            <a:fgClr>
-              <a:schemeClr val="accent4">
-                <a:lumMod val="60000"/>
-                <a:lumOff val="40000"/>
-              </a:schemeClr>
-            </a:fgClr>
-            <a:bgClr>
-              <a:schemeClr val="bg1"/>
-            </a:bgClr>
-          </a:pattFill>
-          <a:ln>
-            <a:solidFill>
-              <a:schemeClr val="accent4">
-                <a:lumMod val="75000"/>
-              </a:schemeClr>
-            </a:solidFill>
-          </a:ln>
-        </p:spPr>
-        <p:style>
-          <a:lnRef idx="2">
-            <a:schemeClr val="accent1">
-              <a:shade val="50000"/>
-            </a:schemeClr>
-          </a:lnRef>
-          <a:fillRef idx="1">
-            <a:schemeClr val="accent1"/>
-          </a:fillRef>
-          <a:effectRef idx="0">
-            <a:schemeClr val="accent1"/>
-          </a:effectRef>
-          <a:fontRef idx="minor">
-            <a:schemeClr val="lt1"/>
-          </a:fontRef>
-        </p:style>
-        <p:txBody>
-          <a:bodyPr rtlCol="0" anchor="ctr"/>
-          <a:lstStyle/>
-          <a:p>
-            <a:pPr algn="ctr"/>
-            <a:r>
-              <a:rPr lang="en-US" sz="933">
-                <a:solidFill>
-                  <a:schemeClr val="tx1"/>
-                </a:solidFill>
-                <a:latin typeface="Arial" panose="020B0604020202020204" pitchFamily="34" charset="0"/>
-                <a:ea typeface="Menlo" panose="020B0609030804020204" pitchFamily="49" charset="0"/>
-                <a:cs typeface="Arial" panose="020B0604020202020204" pitchFamily="34" charset="0"/>
-              </a:rPr>
-              <a:t>File API</a:t>
-            </a:r>
-          </a:p>
-        </p:txBody>
-      </p:sp>
-      <p:sp>
-        <p:nvSpPr>
-          <p:cNvPr id="43" name="Rectangle 42">
-            <a:extLst>
-              <a:ext uri="{FF2B5EF4-FFF2-40B4-BE49-F238E27FC236}">
-                <a16:creationId xmlns:a16="http://schemas.microsoft.com/office/drawing/2014/main" id="{9CF8B830-DC0B-A740-A36B-B958C1A572E0}"/>
-              </a:ext>
-            </a:extLst>
-          </p:cNvPr>
-          <p:cNvSpPr/>
-          <p:nvPr/>
-        </p:nvSpPr>
-        <p:spPr>
-          <a:xfrm>
-            <a:off x="6732723" y="4247506"/>
-            <a:ext cx="498855" cy="311869"/>
-          </a:xfrm>
-          <a:prstGeom prst="rect">
-            <a:avLst/>
-          </a:prstGeom>
-          <a:pattFill prst="pct50">
-            <a:fgClr>
-              <a:schemeClr val="accent4">
-                <a:lumMod val="60000"/>
-                <a:lumOff val="40000"/>
-              </a:schemeClr>
-            </a:fgClr>
-            <a:bgClr>
-              <a:schemeClr val="bg1"/>
-            </a:bgClr>
-          </a:pattFill>
-          <a:ln>
-            <a:solidFill>
-              <a:schemeClr val="accent4">
-                <a:lumMod val="75000"/>
-              </a:schemeClr>
-            </a:solidFill>
-          </a:ln>
-        </p:spPr>
-        <p:style>
-          <a:lnRef idx="2">
-            <a:schemeClr val="accent1">
-              <a:shade val="50000"/>
-            </a:schemeClr>
-          </a:lnRef>
-          <a:fillRef idx="1">
-            <a:schemeClr val="accent1"/>
-          </a:fillRef>
-          <a:effectRef idx="0">
-            <a:schemeClr val="accent1"/>
-          </a:effectRef>
-          <a:fontRef idx="minor">
-            <a:schemeClr val="lt1"/>
-          </a:fontRef>
-        </p:style>
-        <p:txBody>
-          <a:bodyPr rtlCol="0" anchor="ctr"/>
-          <a:lstStyle/>
-          <a:p>
-            <a:pPr algn="ctr"/>
-            <a:r>
-              <a:rPr lang="en-US" sz="933" dirty="0">
-                <a:solidFill>
-                  <a:schemeClr val="tx1"/>
-                </a:solidFill>
-                <a:latin typeface="Arial" panose="020B0604020202020204" pitchFamily="34" charset="0"/>
-                <a:ea typeface="Menlo" panose="020B0609030804020204" pitchFamily="49" charset="0"/>
-                <a:cs typeface="Arial" panose="020B0604020202020204" pitchFamily="34" charset="0"/>
-              </a:rPr>
-              <a:t>JES API</a:t>
-            </a:r>
-          </a:p>
-        </p:txBody>
-      </p:sp>
       <p:cxnSp>
         <p:nvCxnSpPr>
-          <p:cNvPr id="45" name="Straight Arrow Connector 44">
-            <a:extLst>
-              <a:ext uri="{FF2B5EF4-FFF2-40B4-BE49-F238E27FC236}">
-                <a16:creationId xmlns:a16="http://schemas.microsoft.com/office/drawing/2014/main" id="{3892E7B8-0947-C447-9E5E-CE36A08691A2}"/>
+          <p:cNvPr id="46" name="Straight Arrow Connector 45">
+            <a:extLst>
+              <a:ext uri="{FF2B5EF4-FFF2-40B4-BE49-F238E27FC236}">
+                <a16:creationId xmlns:a16="http://schemas.microsoft.com/office/drawing/2014/main" id="{021AF651-50B6-6746-B692-A167727F149A}"/>
               </a:ext>
             </a:extLst>
           </p:cNvPr>
@@ -18427,9 +17009,9 @@
           <p:nvPr/>
         </p:nvCxnSpPr>
         <p:spPr>
-          <a:xfrm flipH="1">
-            <a:off x="6585857" y="3069751"/>
-            <a:ext cx="169" cy="1094035"/>
+          <a:xfrm>
+            <a:off x="4556191" y="1699591"/>
+            <a:ext cx="0" cy="759483"/>
           </a:xfrm>
           <a:prstGeom prst="straightConnector1">
             <a:avLst/>
@@ -18454,48 +17036,6 @@
           </a:fontRef>
         </p:style>
       </p:cxnSp>
-      <p:cxnSp>
-        <p:nvCxnSpPr>
-          <p:cNvPr id="46" name="Straight Arrow Connector 45">
-            <a:extLst>
-              <a:ext uri="{FF2B5EF4-FFF2-40B4-BE49-F238E27FC236}">
-                <a16:creationId xmlns:a16="http://schemas.microsoft.com/office/drawing/2014/main" id="{021AF651-50B6-6746-B692-A167727F149A}"/>
-              </a:ext>
-            </a:extLst>
-          </p:cNvPr>
-          <p:cNvCxnSpPr>
-            <a:cxnSpLocks/>
-          </p:cNvCxnSpPr>
-          <p:nvPr/>
-        </p:nvCxnSpPr>
-        <p:spPr>
-          <a:xfrm>
-            <a:off x="4556191" y="1699591"/>
-            <a:ext cx="0" cy="759483"/>
-          </a:xfrm>
-          <a:prstGeom prst="straightConnector1">
-            <a:avLst/>
-          </a:prstGeom>
-          <a:ln>
-            <a:headEnd type="triangle"/>
-            <a:tailEnd type="triangle"/>
-          </a:ln>
-        </p:spPr>
-        <p:style>
-          <a:lnRef idx="1">
-            <a:schemeClr val="accent1"/>
-          </a:lnRef>
-          <a:fillRef idx="0">
-            <a:schemeClr val="accent1"/>
-          </a:fillRef>
-          <a:effectRef idx="0">
-            <a:schemeClr val="accent1"/>
-          </a:effectRef>
-          <a:fontRef idx="minor">
-            <a:schemeClr val="tx1"/>
-          </a:fontRef>
-        </p:style>
-      </p:cxnSp>
       <p:sp>
         <p:nvSpPr>
           <p:cNvPr id="48" name="TextBox 47">
@@ -18609,131 +17149,6 @@
                 <a:cs typeface="Arial" panose="020B0604020202020204" pitchFamily="34" charset="0"/>
               </a:rPr>
               <a:t>7552</a:t>
-            </a:r>
-          </a:p>
-        </p:txBody>
-      </p:sp>
-      <p:sp>
-        <p:nvSpPr>
-          <p:cNvPr id="51" name="TextBox 50">
-            <a:extLst>
-              <a:ext uri="{FF2B5EF4-FFF2-40B4-BE49-F238E27FC236}">
-                <a16:creationId xmlns:a16="http://schemas.microsoft.com/office/drawing/2014/main" id="{C24C4305-5BA2-1B43-A80B-DF777ED8E227}"/>
-              </a:ext>
-            </a:extLst>
-          </p:cNvPr>
-          <p:cNvSpPr txBox="1"/>
-          <p:nvPr/>
-        </p:nvSpPr>
-        <p:spPr>
-          <a:xfrm>
-            <a:off x="6123017" y="3972084"/>
-            <a:ext cx="486030" cy="253916"/>
-          </a:xfrm>
-          <a:prstGeom prst="rect">
-            <a:avLst/>
-          </a:prstGeom>
-          <a:noFill/>
-        </p:spPr>
-        <p:txBody>
-          <a:bodyPr wrap="none" rtlCol="0">
-            <a:spAutoFit/>
-          </a:bodyPr>
-          <a:lstStyle/>
-          <a:p>
-            <a:r>
-              <a:rPr lang="en-US" sz="1050" dirty="0">
-                <a:latin typeface="Arial" panose="020B0604020202020204" pitchFamily="34" charset="0"/>
-                <a:ea typeface="Menlo" panose="020B0609030804020204" pitchFamily="49" charset="0"/>
-                <a:cs typeface="Arial" panose="020B0604020202020204" pitchFamily="34" charset="0"/>
-              </a:rPr>
-              <a:t>8547</a:t>
-            </a:r>
-            <a:endParaRPr lang="en-US" sz="1067" dirty="0">
-              <a:latin typeface="Arial" panose="020B0604020202020204" pitchFamily="34" charset="0"/>
-              <a:ea typeface="Menlo" panose="020B0609030804020204" pitchFamily="49" charset="0"/>
-              <a:cs typeface="Arial" panose="020B0604020202020204" pitchFamily="34" charset="0"/>
-            </a:endParaRPr>
-          </a:p>
-        </p:txBody>
-      </p:sp>
-      <p:cxnSp>
-        <p:nvCxnSpPr>
-          <p:cNvPr id="52" name="Straight Arrow Connector 51">
-            <a:extLst>
-              <a:ext uri="{FF2B5EF4-FFF2-40B4-BE49-F238E27FC236}">
-                <a16:creationId xmlns:a16="http://schemas.microsoft.com/office/drawing/2014/main" id="{1A8D5EA7-D754-BD43-8ADC-13C0B2EE28C5}"/>
-              </a:ext>
-            </a:extLst>
-          </p:cNvPr>
-          <p:cNvCxnSpPr>
-            <a:cxnSpLocks/>
-          </p:cNvCxnSpPr>
-          <p:nvPr/>
-        </p:nvCxnSpPr>
-        <p:spPr>
-          <a:xfrm flipH="1">
-            <a:off x="6787821" y="3045566"/>
-            <a:ext cx="6747" cy="1122820"/>
-          </a:xfrm>
-          <a:prstGeom prst="straightConnector1">
-            <a:avLst/>
-          </a:prstGeom>
-          <a:ln>
-            <a:headEnd type="triangle"/>
-            <a:tailEnd type="triangle"/>
-          </a:ln>
-        </p:spPr>
-        <p:style>
-          <a:lnRef idx="1">
-            <a:schemeClr val="accent1"/>
-          </a:lnRef>
-          <a:fillRef idx="0">
-            <a:schemeClr val="accent1"/>
-          </a:fillRef>
-          <a:effectRef idx="0">
-            <a:schemeClr val="accent1"/>
-          </a:effectRef>
-          <a:fontRef idx="minor">
-            <a:schemeClr val="tx1"/>
-          </a:fontRef>
-        </p:style>
-      </p:cxnSp>
-      <p:sp>
-        <p:nvSpPr>
-          <p:cNvPr id="54" name="TextBox 53">
-            <a:extLst>
-              <a:ext uri="{FF2B5EF4-FFF2-40B4-BE49-F238E27FC236}">
-                <a16:creationId xmlns:a16="http://schemas.microsoft.com/office/drawing/2014/main" id="{522E71EC-E73F-8045-92CA-2E9B816D4A91}"/>
-              </a:ext>
-            </a:extLst>
-          </p:cNvPr>
-          <p:cNvSpPr txBox="1"/>
-          <p:nvPr/>
-        </p:nvSpPr>
-        <p:spPr>
-          <a:xfrm>
-            <a:off x="6789781" y="3977878"/>
-            <a:ext cx="498855" cy="261610"/>
-          </a:xfrm>
-          <a:prstGeom prst="rect">
-            <a:avLst/>
-          </a:prstGeom>
-          <a:noFill/>
-        </p:spPr>
-        <p:txBody>
-          <a:bodyPr wrap="none" rtlCol="0">
-            <a:spAutoFit/>
-          </a:bodyPr>
-          <a:lstStyle/>
-          <a:p>
-            <a:r>
-              <a:rPr lang="en-US" sz="1100" dirty="0">
-                <a:latin typeface="Arial" panose="020B0604020202020204" pitchFamily="34" charset="0"/>
-                <a:ea typeface="Menlo" panose="020B0609030804020204" pitchFamily="49" charset="0"/>
-                <a:cs typeface="Arial" panose="020B0604020202020204" pitchFamily="34" charset="0"/>
-              </a:rPr>
-              <a:t>8545</a:t>
             </a:r>
           </a:p>
         </p:txBody>
@@ -20484,66 +18899,6 @@
           </a:fontRef>
         </p:style>
       </p:cxnSp>
-      <p:sp>
-        <p:nvSpPr>
-          <p:cNvPr id="126" name="Rectangle 125">
-            <a:extLst>
-              <a:ext uri="{FF2B5EF4-FFF2-40B4-BE49-F238E27FC236}">
-                <a16:creationId xmlns:a16="http://schemas.microsoft.com/office/drawing/2014/main" id="{6499A0B0-043E-6F4F-B3CD-A7E0448871C6}"/>
-              </a:ext>
-            </a:extLst>
-          </p:cNvPr>
-          <p:cNvSpPr/>
-          <p:nvPr/>
-        </p:nvSpPr>
-        <p:spPr>
-          <a:xfrm>
-            <a:off x="6082170" y="3974491"/>
-            <a:ext cx="1243933" cy="711947"/>
-          </a:xfrm>
-          <a:prstGeom prst="rect">
-            <a:avLst/>
-          </a:prstGeom>
-          <a:noFill/>
-          <a:ln w="25400">
-            <a:solidFill>
-              <a:srgbClr val="FFC000"/>
-            </a:solidFill>
-            <a:prstDash val="dash"/>
-          </a:ln>
-        </p:spPr>
-        <p:style>
-          <a:lnRef idx="2">
-            <a:schemeClr val="accent1">
-              <a:shade val="50000"/>
-            </a:schemeClr>
-          </a:lnRef>
-          <a:fillRef idx="1">
-            <a:schemeClr val="accent1"/>
-          </a:fillRef>
-          <a:effectRef idx="0">
-            <a:schemeClr val="accent1"/>
-          </a:effectRef>
-          <a:fontRef idx="minor">
-            <a:schemeClr val="lt1"/>
-          </a:fontRef>
-        </p:style>
-        <p:txBody>
-          <a:bodyPr rtlCol="0" anchor="ctr"/>
-          <a:lstStyle/>
-          <a:p>
-            <a:pPr algn="ctr"/>
-            <a:endParaRPr lang="en-US" sz="1000">
-              <a:solidFill>
-                <a:schemeClr val="tx1"/>
-              </a:solidFill>
-              <a:latin typeface="Menlo" panose="020B0609030804020204" pitchFamily="49" charset="0"/>
-              <a:ea typeface="Menlo" panose="020B0609030804020204" pitchFamily="49" charset="0"/>
-              <a:cs typeface="Menlo" panose="020B0609030804020204" pitchFamily="49" charset="0"/>
-            </a:endParaRPr>
-          </a:p>
-        </p:txBody>
-      </p:sp>
       <p:pic>
         <p:nvPicPr>
           <p:cNvPr id="130" name="Picture 129">
@@ -22169,125 +20524,6 @@
       </p:sp>
       <p:sp>
         <p:nvSpPr>
-          <p:cNvPr id="125" name="TextBox 124">
-            <a:extLst>
-              <a:ext uri="{FF2B5EF4-FFF2-40B4-BE49-F238E27FC236}">
-                <a16:creationId xmlns:a16="http://schemas.microsoft.com/office/drawing/2014/main" id="{7F4D2A41-7768-4760-AAEC-157425E0AD93}"/>
-              </a:ext>
-            </a:extLst>
-          </p:cNvPr>
-          <p:cNvSpPr txBox="1"/>
-          <p:nvPr/>
-        </p:nvSpPr>
-        <p:spPr>
-          <a:xfrm>
-            <a:off x="3680352" y="3131869"/>
-            <a:ext cx="536683" cy="261610"/>
-          </a:xfrm>
-          <a:prstGeom prst="rect">
-            <a:avLst/>
-          </a:prstGeom>
-          <a:noFill/>
-        </p:spPr>
-        <p:txBody>
-          <a:bodyPr wrap="square" rtlCol="0">
-            <a:spAutoFit/>
-          </a:bodyPr>
-          <a:lstStyle/>
-          <a:p>
-            <a:r>
-              <a:rPr lang="en-US" sz="1100" dirty="0">
-                <a:latin typeface="Arial" panose="020B0604020202020204" pitchFamily="34" charset="0"/>
-                <a:ea typeface="Menlo" panose="020B0609030804020204" pitchFamily="49" charset="0"/>
-                <a:cs typeface="Arial" panose="020B0604020202020204" pitchFamily="34" charset="0"/>
-              </a:rPr>
-              <a:t>7551</a:t>
-            </a:r>
-          </a:p>
-        </p:txBody>
-      </p:sp>
-      <p:cxnSp>
-        <p:nvCxnSpPr>
-          <p:cNvPr id="128" name="Straight Arrow Connector 127">
-            <a:extLst>
-              <a:ext uri="{FF2B5EF4-FFF2-40B4-BE49-F238E27FC236}">
-                <a16:creationId xmlns:a16="http://schemas.microsoft.com/office/drawing/2014/main" id="{48D924D7-7D2D-4BD4-813D-D1A32E39EA27}"/>
-              </a:ext>
-            </a:extLst>
-          </p:cNvPr>
-          <p:cNvCxnSpPr>
-            <a:cxnSpLocks/>
-          </p:cNvCxnSpPr>
-          <p:nvPr/>
-        </p:nvCxnSpPr>
-        <p:spPr>
-          <a:xfrm>
-            <a:off x="4216274" y="3058455"/>
-            <a:ext cx="0" cy="304147"/>
-          </a:xfrm>
-          <a:prstGeom prst="straightConnector1">
-            <a:avLst/>
-          </a:prstGeom>
-          <a:ln>
-            <a:headEnd type="triangle"/>
-            <a:tailEnd type="triangle"/>
-          </a:ln>
-        </p:spPr>
-        <p:style>
-          <a:lnRef idx="1">
-            <a:schemeClr val="accent1"/>
-          </a:lnRef>
-          <a:fillRef idx="0">
-            <a:schemeClr val="accent1"/>
-          </a:fillRef>
-          <a:effectRef idx="0">
-            <a:schemeClr val="accent1"/>
-          </a:effectRef>
-          <a:fontRef idx="minor">
-            <a:schemeClr val="tx1"/>
-          </a:fontRef>
-        </p:style>
-      </p:cxnSp>
-      <p:sp>
-        <p:nvSpPr>
-          <p:cNvPr id="145" name="TextBox 144">
-            <a:extLst>
-              <a:ext uri="{FF2B5EF4-FFF2-40B4-BE49-F238E27FC236}">
-                <a16:creationId xmlns:a16="http://schemas.microsoft.com/office/drawing/2014/main" id="{0F71EF4B-E004-46B8-8753-BCCAE09B6ACC}"/>
-              </a:ext>
-            </a:extLst>
-          </p:cNvPr>
-          <p:cNvSpPr txBox="1"/>
-          <p:nvPr/>
-        </p:nvSpPr>
-        <p:spPr>
-          <a:xfrm>
-            <a:off x="5974609" y="4697849"/>
-            <a:ext cx="1459054" cy="235449"/>
-          </a:xfrm>
-          <a:prstGeom prst="rect">
-            <a:avLst/>
-          </a:prstGeom>
-          <a:noFill/>
-        </p:spPr>
-        <p:txBody>
-          <a:bodyPr wrap="none" rtlCol="0">
-            <a:spAutoFit/>
-          </a:bodyPr>
-          <a:lstStyle/>
-          <a:p>
-            <a:r>
-              <a:rPr lang="en-US" sz="930" dirty="0">
-                <a:latin typeface="Arial" panose="020B0604020202020204" pitchFamily="34" charset="0"/>
-                <a:cs typeface="Arial" panose="020B0604020202020204" pitchFamily="34" charset="0"/>
-              </a:rPr>
-              <a:t>(Optional, off by default)</a:t>
-            </a:r>
-          </a:p>
-        </p:txBody>
-      </p:sp>
-      <p:sp>
-        <p:nvSpPr>
           <p:cNvPr id="152" name="Rectangle 151">
             <a:extLst>
               <a:ext uri="{FF2B5EF4-FFF2-40B4-BE49-F238E27FC236}">
@@ -23323,10 +21559,10 @@
       </p:sp>
       <p:sp>
         <p:nvSpPr>
-          <p:cNvPr id="196" name="Rectangle 195">
-            <a:extLst>
-              <a:ext uri="{FF2B5EF4-FFF2-40B4-BE49-F238E27FC236}">
-                <a16:creationId xmlns:a16="http://schemas.microsoft.com/office/drawing/2014/main" id="{27B34912-F1D5-4E36-85D4-6C8545186F21}"/>
+          <p:cNvPr id="197" name="Rectangle 196">
+            <a:extLst>
+              <a:ext uri="{FF2B5EF4-FFF2-40B4-BE49-F238E27FC236}">
+                <a16:creationId xmlns:a16="http://schemas.microsoft.com/office/drawing/2014/main" id="{A0C28B7A-39D3-47A3-B717-373A39BB9F2F}"/>
               </a:ext>
             </a:extLst>
           </p:cNvPr>
@@ -23335,8 +21571,74 @@
         </p:nvSpPr>
         <p:spPr>
           <a:xfrm>
-            <a:off x="3848617" y="3383294"/>
-            <a:ext cx="670956" cy="351196"/>
+            <a:off x="2061127" y="3379469"/>
+            <a:ext cx="723375" cy="369333"/>
+          </a:xfrm>
+          <a:prstGeom prst="rect">
+            <a:avLst/>
+          </a:prstGeom>
+          <a:solidFill>
+            <a:srgbClr val="93E3FF">
+              <a:alpha val="97647"/>
+            </a:srgbClr>
+          </a:solidFill>
+          <a:ln>
+            <a:solidFill>
+              <a:srgbClr val="0070C0"/>
+            </a:solidFill>
+          </a:ln>
+        </p:spPr>
+        <p:style>
+          <a:lnRef idx="2">
+            <a:schemeClr val="accent1">
+              <a:shade val="50000"/>
+            </a:schemeClr>
+          </a:lnRef>
+          <a:fillRef idx="1">
+            <a:schemeClr val="accent1"/>
+          </a:fillRef>
+          <a:effectRef idx="0">
+            <a:schemeClr val="accent1"/>
+          </a:effectRef>
+          <a:fontRef idx="minor">
+            <a:schemeClr val="lt1"/>
+          </a:fontRef>
+        </p:style>
+        <p:txBody>
+          <a:bodyPr rtlCol="0" anchor="ctr"/>
+          <a:lstStyle/>
+          <a:p>
+            <a:pPr algn="ctr"/>
+            <a:r>
+              <a:rPr lang="en-US" sz="933" dirty="0">
+                <a:solidFill>
+                  <a:schemeClr val="tx1"/>
+                </a:solidFill>
+                <a:latin typeface="Arial" panose="020B0604020202020204" pitchFamily="34" charset="0"/>
+                <a:ea typeface="Menlo" panose="020B0609030804020204" pitchFamily="49" charset="0"/>
+                <a:cs typeface="Arial" panose="020B0604020202020204" pitchFamily="34" charset="0"/>
+              </a:rPr>
+              <a:t>API Discovery</a:t>
+            </a:r>
+          </a:p>
+        </p:txBody>
+      </p:sp>
+      <p:sp>
+        <p:nvSpPr>
+          <p:cNvPr id="198" name="Rectangle 197">
+            <a:extLst>
+              <a:ext uri="{FF2B5EF4-FFF2-40B4-BE49-F238E27FC236}">
+                <a16:creationId xmlns:a16="http://schemas.microsoft.com/office/drawing/2014/main" id="{77E90F8D-10DA-4544-8163-AC268080E486}"/>
+              </a:ext>
+            </a:extLst>
+          </p:cNvPr>
+          <p:cNvSpPr/>
+          <p:nvPr/>
+        </p:nvSpPr>
+        <p:spPr>
+          <a:xfrm>
+            <a:off x="1165958" y="3374254"/>
+            <a:ext cx="768237" cy="369333"/>
           </a:xfrm>
           <a:prstGeom prst="rect">
             <a:avLst/>
@@ -23386,61 +21688,9 @@
                 <a:ea typeface="Menlo" panose="020B0609030804020204" pitchFamily="49" charset="0"/>
                 <a:cs typeface="Arial" panose="020B0604020202020204" pitchFamily="34" charset="0"/>
               </a:rPr>
-              <a:t>API Catalog</a:t>
-            </a:r>
-          </a:p>
-        </p:txBody>
-      </p:sp>
-      <p:sp>
-        <p:nvSpPr>
-          <p:cNvPr id="197" name="Rectangle 196">
-            <a:extLst>
-              <a:ext uri="{FF2B5EF4-FFF2-40B4-BE49-F238E27FC236}">
-                <a16:creationId xmlns:a16="http://schemas.microsoft.com/office/drawing/2014/main" id="{A0C28B7A-39D3-47A3-B717-373A39BB9F2F}"/>
-              </a:ext>
-            </a:extLst>
-          </p:cNvPr>
-          <p:cNvSpPr/>
-          <p:nvPr/>
-        </p:nvSpPr>
-        <p:spPr>
-          <a:xfrm>
-            <a:off x="2061127" y="3379469"/>
-            <a:ext cx="723375" cy="369333"/>
-          </a:xfrm>
-          <a:prstGeom prst="rect">
-            <a:avLst/>
-          </a:prstGeom>
-          <a:solidFill>
-            <a:srgbClr val="93E3FF">
-              <a:alpha val="97647"/>
-            </a:srgbClr>
-          </a:solidFill>
-          <a:ln>
-            <a:solidFill>
-              <a:srgbClr val="0070C0"/>
-            </a:solidFill>
-          </a:ln>
-        </p:spPr>
-        <p:style>
-          <a:lnRef idx="2">
-            <a:schemeClr val="accent1">
-              <a:shade val="50000"/>
-            </a:schemeClr>
-          </a:lnRef>
-          <a:fillRef idx="1">
-            <a:schemeClr val="accent1"/>
-          </a:fillRef>
-          <a:effectRef idx="0">
-            <a:schemeClr val="accent1"/>
-          </a:effectRef>
-          <a:fontRef idx="minor">
-            <a:schemeClr val="lt1"/>
-          </a:fontRef>
-        </p:style>
-        <p:txBody>
-          <a:bodyPr rtlCol="0" anchor="ctr"/>
-          <a:lstStyle/>
+              <a:t>Caching</a:t>
+            </a:r>
+          </a:p>
           <a:p>
             <a:pPr algn="ctr"/>
             <a:r>
@@ -23452,17 +21702,17 @@
                 <a:ea typeface="Menlo" panose="020B0609030804020204" pitchFamily="49" charset="0"/>
                 <a:cs typeface="Arial" panose="020B0604020202020204" pitchFamily="34" charset="0"/>
               </a:rPr>
-              <a:t>API Discovery</a:t>
-            </a:r>
-          </a:p>
-        </p:txBody>
-      </p:sp>
-      <p:sp>
-        <p:nvSpPr>
-          <p:cNvPr id="198" name="Rectangle 197">
-            <a:extLst>
-              <a:ext uri="{FF2B5EF4-FFF2-40B4-BE49-F238E27FC236}">
-                <a16:creationId xmlns:a16="http://schemas.microsoft.com/office/drawing/2014/main" id="{77E90F8D-10DA-4544-8163-AC268080E486}"/>
+              <a:t>Service</a:t>
+            </a:r>
+          </a:p>
+        </p:txBody>
+      </p:sp>
+      <p:sp>
+        <p:nvSpPr>
+          <p:cNvPr id="199" name="Rectangle 198">
+            <a:extLst>
+              <a:ext uri="{FF2B5EF4-FFF2-40B4-BE49-F238E27FC236}">
+                <a16:creationId xmlns:a16="http://schemas.microsoft.com/office/drawing/2014/main" id="{4FF11B4F-9E44-4CDF-B217-E8B2FD0D15E1}"/>
               </a:ext>
             </a:extLst>
           </p:cNvPr>
@@ -23471,7 +21721,7 @@
         </p:nvSpPr>
         <p:spPr>
           <a:xfrm>
-            <a:off x="1165958" y="3374254"/>
+            <a:off x="1221246" y="3415709"/>
             <a:ext cx="768237" cy="369333"/>
           </a:xfrm>
           <a:prstGeom prst="rect">
@@ -23543,160 +21793,6 @@
       </p:sp>
       <p:sp>
         <p:nvSpPr>
-          <p:cNvPr id="199" name="Rectangle 198">
-            <a:extLst>
-              <a:ext uri="{FF2B5EF4-FFF2-40B4-BE49-F238E27FC236}">
-                <a16:creationId xmlns:a16="http://schemas.microsoft.com/office/drawing/2014/main" id="{4FF11B4F-9E44-4CDF-B217-E8B2FD0D15E1}"/>
-              </a:ext>
-            </a:extLst>
-          </p:cNvPr>
-          <p:cNvSpPr/>
-          <p:nvPr/>
-        </p:nvSpPr>
-        <p:spPr>
-          <a:xfrm>
-            <a:off x="1221246" y="3415709"/>
-            <a:ext cx="768237" cy="369333"/>
-          </a:xfrm>
-          <a:prstGeom prst="rect">
-            <a:avLst/>
-          </a:prstGeom>
-          <a:solidFill>
-            <a:schemeClr val="accent4">
-              <a:lumMod val="60000"/>
-              <a:lumOff val="40000"/>
-              <a:alpha val="97647"/>
-            </a:schemeClr>
-          </a:solidFill>
-          <a:ln>
-            <a:solidFill>
-              <a:schemeClr val="accent4">
-                <a:lumMod val="75000"/>
-              </a:schemeClr>
-            </a:solidFill>
-          </a:ln>
-        </p:spPr>
-        <p:style>
-          <a:lnRef idx="2">
-            <a:schemeClr val="accent1">
-              <a:shade val="50000"/>
-            </a:schemeClr>
-          </a:lnRef>
-          <a:fillRef idx="1">
-            <a:schemeClr val="accent1"/>
-          </a:fillRef>
-          <a:effectRef idx="0">
-            <a:schemeClr val="accent1"/>
-          </a:effectRef>
-          <a:fontRef idx="minor">
-            <a:schemeClr val="lt1"/>
-          </a:fontRef>
-        </p:style>
-        <p:txBody>
-          <a:bodyPr rtlCol="0" anchor="ctr"/>
-          <a:lstStyle/>
-          <a:p>
-            <a:pPr algn="ctr"/>
-            <a:r>
-              <a:rPr lang="en-US" sz="933" dirty="0">
-                <a:solidFill>
-                  <a:schemeClr val="tx1"/>
-                </a:solidFill>
-                <a:latin typeface="Arial" panose="020B0604020202020204" pitchFamily="34" charset="0"/>
-                <a:ea typeface="Menlo" panose="020B0609030804020204" pitchFamily="49" charset="0"/>
-                <a:cs typeface="Arial" panose="020B0604020202020204" pitchFamily="34" charset="0"/>
-              </a:rPr>
-              <a:t>Caching</a:t>
-            </a:r>
-          </a:p>
-          <a:p>
-            <a:pPr algn="ctr"/>
-            <a:r>
-              <a:rPr lang="en-US" sz="933" dirty="0">
-                <a:solidFill>
-                  <a:schemeClr val="tx1"/>
-                </a:solidFill>
-                <a:latin typeface="Arial" panose="020B0604020202020204" pitchFamily="34" charset="0"/>
-                <a:ea typeface="Menlo" panose="020B0609030804020204" pitchFamily="49" charset="0"/>
-                <a:cs typeface="Arial" panose="020B0604020202020204" pitchFamily="34" charset="0"/>
-              </a:rPr>
-              <a:t>Service</a:t>
-            </a:r>
-          </a:p>
-        </p:txBody>
-      </p:sp>
-      <p:sp>
-        <p:nvSpPr>
-          <p:cNvPr id="200" name="Rectangle 199">
-            <a:extLst>
-              <a:ext uri="{FF2B5EF4-FFF2-40B4-BE49-F238E27FC236}">
-                <a16:creationId xmlns:a16="http://schemas.microsoft.com/office/drawing/2014/main" id="{7C06FBB0-E177-4C6C-B732-D7D18EA31A31}"/>
-              </a:ext>
-            </a:extLst>
-          </p:cNvPr>
-          <p:cNvSpPr/>
-          <p:nvPr/>
-        </p:nvSpPr>
-        <p:spPr>
-          <a:xfrm>
-            <a:off x="3897608" y="3418416"/>
-            <a:ext cx="670956" cy="351196"/>
-          </a:xfrm>
-          <a:prstGeom prst="rect">
-            <a:avLst/>
-          </a:prstGeom>
-          <a:solidFill>
-            <a:schemeClr val="accent4">
-              <a:lumMod val="60000"/>
-              <a:lumOff val="40000"/>
-              <a:alpha val="97647"/>
-            </a:schemeClr>
-          </a:solidFill>
-          <a:ln>
-            <a:solidFill>
-              <a:schemeClr val="accent4">
-                <a:lumMod val="75000"/>
-              </a:schemeClr>
-            </a:solidFill>
-          </a:ln>
-        </p:spPr>
-        <p:style>
-          <a:lnRef idx="2">
-            <a:schemeClr val="accent1">
-              <a:shade val="50000"/>
-            </a:schemeClr>
-          </a:lnRef>
-          <a:fillRef idx="1">
-            <a:schemeClr val="accent1"/>
-          </a:fillRef>
-          <a:effectRef idx="0">
-            <a:schemeClr val="accent1"/>
-          </a:effectRef>
-          <a:fontRef idx="minor">
-            <a:schemeClr val="lt1"/>
-          </a:fontRef>
-        </p:style>
-        <p:txBody>
-          <a:bodyPr rtlCol="0" anchor="ctr"/>
-          <a:lstStyle/>
-          <a:p>
-            <a:pPr algn="ctr"/>
-            <a:r>
-              <a:rPr lang="en-US" sz="933" dirty="0">
-                <a:solidFill>
-                  <a:schemeClr val="tx1"/>
-                </a:solidFill>
-                <a:latin typeface="Arial" panose="020B0604020202020204" pitchFamily="34" charset="0"/>
-                <a:ea typeface="Menlo" panose="020B0609030804020204" pitchFamily="49" charset="0"/>
-                <a:cs typeface="Arial" panose="020B0604020202020204" pitchFamily="34" charset="0"/>
-              </a:rPr>
-              <a:t>Metrics Service</a:t>
-            </a:r>
-          </a:p>
-        </p:txBody>
-      </p:sp>
-      <p:sp>
-        <p:nvSpPr>
           <p:cNvPr id="201" name="Rectangle 200">
             <a:extLst>
               <a:ext uri="{FF2B5EF4-FFF2-40B4-BE49-F238E27FC236}">
@@ -23757,99 +21853,6 @@
                 <a:cs typeface="Arial" panose="020B0604020202020204" pitchFamily="34" charset="0"/>
               </a:rPr>
               <a:t>API Discovery</a:t>
-            </a:r>
-          </a:p>
-        </p:txBody>
-      </p:sp>
-      <p:sp>
-        <p:nvSpPr>
-          <p:cNvPr id="202" name="Rectangle 201">
-            <a:extLst>
-              <a:ext uri="{FF2B5EF4-FFF2-40B4-BE49-F238E27FC236}">
-                <a16:creationId xmlns:a16="http://schemas.microsoft.com/office/drawing/2014/main" id="{5F335FF2-62B2-4D01-8DD8-A1D2D26421FE}"/>
-              </a:ext>
-            </a:extLst>
-          </p:cNvPr>
-          <p:cNvSpPr/>
-          <p:nvPr/>
-        </p:nvSpPr>
-        <p:spPr>
-          <a:xfrm>
-            <a:off x="3814956" y="3319311"/>
-            <a:ext cx="777830" cy="521672"/>
-          </a:xfrm>
-          <a:prstGeom prst="rect">
-            <a:avLst/>
-          </a:prstGeom>
-          <a:noFill/>
-          <a:ln w="9525" cap="flat" cmpd="sng" algn="ctr">
-            <a:solidFill>
-              <a:schemeClr val="dk1"/>
-            </a:solidFill>
-            <a:prstDash val="dash"/>
-            <a:round/>
-            <a:headEnd type="none" w="med" len="med"/>
-            <a:tailEnd type="none" w="med" len="med"/>
-          </a:ln>
-        </p:spPr>
-        <p:style>
-          <a:lnRef idx="0">
-            <a:scrgbClr r="0" g="0" b="0"/>
-          </a:lnRef>
-          <a:fillRef idx="0">
-            <a:scrgbClr r="0" g="0" b="0"/>
-          </a:fillRef>
-          <a:effectRef idx="0">
-            <a:scrgbClr r="0" g="0" b="0"/>
-          </a:effectRef>
-          <a:fontRef idx="minor">
-            <a:schemeClr val="dk1"/>
-          </a:fontRef>
-        </p:style>
-        <p:txBody>
-          <a:bodyPr rtlCol="0" anchor="ctr"/>
-          <a:lstStyle/>
-          <a:p>
-            <a:pPr algn="ctr"/>
-            <a:endParaRPr lang="en-US"/>
-          </a:p>
-        </p:txBody>
-      </p:sp>
-      <p:sp>
-        <p:nvSpPr>
-          <p:cNvPr id="203" name="TextBox 202">
-            <a:extLst>
-              <a:ext uri="{FF2B5EF4-FFF2-40B4-BE49-F238E27FC236}">
-                <a16:creationId xmlns:a16="http://schemas.microsoft.com/office/drawing/2014/main" id="{4C2224B1-8E89-47D8-A6CF-5788A3BF4724}"/>
-              </a:ext>
-            </a:extLst>
-          </p:cNvPr>
-          <p:cNvSpPr txBox="1"/>
-          <p:nvPr/>
-        </p:nvSpPr>
-        <p:spPr>
-          <a:xfrm>
-            <a:off x="3633293" y="3786316"/>
-            <a:ext cx="1037463" cy="215444"/>
-          </a:xfrm>
-          <a:prstGeom prst="rect">
-            <a:avLst/>
-          </a:prstGeom>
-          <a:noFill/>
-        </p:spPr>
-        <p:txBody>
-          <a:bodyPr wrap="none" rtlCol="0">
-            <a:spAutoFit/>
-          </a:bodyPr>
-          <a:lstStyle/>
-          <a:p>
-            <a:r>
-              <a:rPr lang="en-US" sz="800" dirty="0">
-                <a:solidFill>
-                  <a:srgbClr val="C00000"/>
-                </a:solidFill>
-              </a:rPr>
-              <a:t>Deployment/Service</a:t>
             </a:r>
           </a:p>
         </p:txBody>

</xml_diff>

<commit_message>
add ZAAS in the diagrams
Signed-off-by: ac892247 <a.chmelo@gmail.com>
</commit_message>
<xml_diff>
--- a/docs/images/common/zowe-architecture.pptx
+++ b/docs/images/common/zowe-architecture.pptx
@@ -200,7 +200,7 @@
           <a:p>
             <a:fld id="{26E70E1E-3B7C-8D4D-B700-360134022E14}" type="datetimeFigureOut">
               <a:rPr lang="en-CN" smtClean="0"/>
-              <a:t>03/12/2024</a:t>
+              <a:t>9/5/24</a:t>
             </a:fld>
             <a:endParaRPr lang="en-CN"/>
           </a:p>
@@ -963,7 +963,7 @@
           <a:p>
             <a:fld id="{B1DB1BE8-3F77-D044-8747-9903AC5CD864}" type="datetimeFigureOut">
               <a:rPr lang="en-US" smtClean="0"/>
-              <a:t>3/12/2024</a:t>
+              <a:t>9/5/24</a:t>
             </a:fld>
             <a:endParaRPr lang="en-US"/>
           </a:p>
@@ -1161,7 +1161,7 @@
           <a:p>
             <a:fld id="{B1DB1BE8-3F77-D044-8747-9903AC5CD864}" type="datetimeFigureOut">
               <a:rPr lang="en-US" smtClean="0"/>
-              <a:t>3/12/2024</a:t>
+              <a:t>9/5/24</a:t>
             </a:fld>
             <a:endParaRPr lang="en-US"/>
           </a:p>
@@ -1369,7 +1369,7 @@
           <a:p>
             <a:fld id="{B1DB1BE8-3F77-D044-8747-9903AC5CD864}" type="datetimeFigureOut">
               <a:rPr lang="en-US" smtClean="0"/>
-              <a:t>3/12/2024</a:t>
+              <a:t>9/5/24</a:t>
             </a:fld>
             <a:endParaRPr lang="en-US"/>
           </a:p>
@@ -1567,7 +1567,7 @@
           <a:p>
             <a:fld id="{B1DB1BE8-3F77-D044-8747-9903AC5CD864}" type="datetimeFigureOut">
               <a:rPr lang="en-US" smtClean="0"/>
-              <a:t>3/12/2024</a:t>
+              <a:t>9/5/24</a:t>
             </a:fld>
             <a:endParaRPr lang="en-US"/>
           </a:p>
@@ -1842,7 +1842,7 @@
           <a:p>
             <a:fld id="{B1DB1BE8-3F77-D044-8747-9903AC5CD864}" type="datetimeFigureOut">
               <a:rPr lang="en-US" smtClean="0"/>
-              <a:t>3/12/2024</a:t>
+              <a:t>9/5/24</a:t>
             </a:fld>
             <a:endParaRPr lang="en-US"/>
           </a:p>
@@ -2107,7 +2107,7 @@
           <a:p>
             <a:fld id="{B1DB1BE8-3F77-D044-8747-9903AC5CD864}" type="datetimeFigureOut">
               <a:rPr lang="en-US" smtClean="0"/>
-              <a:t>3/12/2024</a:t>
+              <a:t>9/5/24</a:t>
             </a:fld>
             <a:endParaRPr lang="en-US"/>
           </a:p>
@@ -2519,7 +2519,7 @@
           <a:p>
             <a:fld id="{B1DB1BE8-3F77-D044-8747-9903AC5CD864}" type="datetimeFigureOut">
               <a:rPr lang="en-US" smtClean="0"/>
-              <a:t>3/12/2024</a:t>
+              <a:t>9/5/24</a:t>
             </a:fld>
             <a:endParaRPr lang="en-US"/>
           </a:p>
@@ -2660,7 +2660,7 @@
           <a:p>
             <a:fld id="{B1DB1BE8-3F77-D044-8747-9903AC5CD864}" type="datetimeFigureOut">
               <a:rPr lang="en-US" smtClean="0"/>
-              <a:t>3/12/2024</a:t>
+              <a:t>9/5/24</a:t>
             </a:fld>
             <a:endParaRPr lang="en-US"/>
           </a:p>
@@ -2773,7 +2773,7 @@
           <a:p>
             <a:fld id="{B1DB1BE8-3F77-D044-8747-9903AC5CD864}" type="datetimeFigureOut">
               <a:rPr lang="en-US" smtClean="0"/>
-              <a:t>3/12/2024</a:t>
+              <a:t>9/5/24</a:t>
             </a:fld>
             <a:endParaRPr lang="en-US"/>
           </a:p>
@@ -3084,7 +3084,7 @@
           <a:p>
             <a:fld id="{B1DB1BE8-3F77-D044-8747-9903AC5CD864}" type="datetimeFigureOut">
               <a:rPr lang="en-US" smtClean="0"/>
-              <a:t>3/12/2024</a:t>
+              <a:t>9/5/24</a:t>
             </a:fld>
             <a:endParaRPr lang="en-US"/>
           </a:p>
@@ -3372,7 +3372,7 @@
           <a:p>
             <a:fld id="{B1DB1BE8-3F77-D044-8747-9903AC5CD864}" type="datetimeFigureOut">
               <a:rPr lang="en-US" smtClean="0"/>
-              <a:t>3/12/2024</a:t>
+              <a:t>9/5/24</a:t>
             </a:fld>
             <a:endParaRPr lang="en-US"/>
           </a:p>
@@ -3613,7 +3613,7 @@
           <a:p>
             <a:fld id="{B1DB1BE8-3F77-D044-8747-9903AC5CD864}" type="datetimeFigureOut">
               <a:rPr lang="en-US" smtClean="0"/>
-              <a:t>3/12/2024</a:t>
+              <a:t>9/5/24</a:t>
             </a:fld>
             <a:endParaRPr lang="en-US"/>
           </a:p>
@@ -5089,7 +5089,7 @@
         </p:nvSpPr>
         <p:spPr>
           <a:xfrm>
-            <a:off x="2933592" y="3124249"/>
+            <a:off x="2864953" y="3122022"/>
             <a:ext cx="536683" cy="261610"/>
           </a:xfrm>
           <a:prstGeom prst="rect">
@@ -9546,6 +9546,157 @@
           </a:extLst>
         </p:spPr>
       </p:pic>
+      <p:sp>
+        <p:nvSpPr>
+          <p:cNvPr id="2" name="TextBox 1">
+            <a:extLst>
+              <a:ext uri="{FF2B5EF4-FFF2-40B4-BE49-F238E27FC236}">
+                <a16:creationId xmlns:a16="http://schemas.microsoft.com/office/drawing/2014/main" id="{4EFC580D-CD54-75C4-7118-974F957A3E9F}"/>
+              </a:ext>
+            </a:extLst>
+          </p:cNvPr>
+          <p:cNvSpPr txBox="1"/>
+          <p:nvPr/>
+        </p:nvSpPr>
+        <p:spPr>
+          <a:xfrm>
+            <a:off x="3609579" y="3121517"/>
+            <a:ext cx="536683" cy="261610"/>
+          </a:xfrm>
+          <a:prstGeom prst="rect">
+            <a:avLst/>
+          </a:prstGeom>
+          <a:noFill/>
+        </p:spPr>
+        <p:txBody>
+          <a:bodyPr wrap="square" rtlCol="0">
+            <a:spAutoFit/>
+          </a:bodyPr>
+          <a:lstStyle/>
+          <a:p>
+            <a:r>
+              <a:rPr lang="en-US" sz="1100" dirty="0">
+                <a:latin typeface="Arial" panose="020B0604020202020204" pitchFamily="34" charset="0"/>
+                <a:ea typeface="Menlo" panose="020B0609030804020204" pitchFamily="49" charset="0"/>
+                <a:cs typeface="Arial" panose="020B0604020202020204" pitchFamily="34" charset="0"/>
+              </a:rPr>
+              <a:t>7563</a:t>
+            </a:r>
+          </a:p>
+        </p:txBody>
+      </p:sp>
+      <p:sp>
+        <p:nvSpPr>
+          <p:cNvPr id="4" name="Rectangle 3">
+            <a:extLst>
+              <a:ext uri="{FF2B5EF4-FFF2-40B4-BE49-F238E27FC236}">
+                <a16:creationId xmlns:a16="http://schemas.microsoft.com/office/drawing/2014/main" id="{15B5C35B-6DE4-9D57-E36F-3F1BD423A0C6}"/>
+              </a:ext>
+            </a:extLst>
+          </p:cNvPr>
+          <p:cNvSpPr/>
+          <p:nvPr/>
+        </p:nvSpPr>
+        <p:spPr>
+          <a:xfrm>
+            <a:off x="3632780" y="3358015"/>
+            <a:ext cx="723375" cy="382432"/>
+          </a:xfrm>
+          <a:prstGeom prst="rect">
+            <a:avLst/>
+          </a:prstGeom>
+          <a:solidFill>
+            <a:schemeClr val="accent4">
+              <a:lumMod val="60000"/>
+              <a:lumOff val="40000"/>
+              <a:alpha val="97647"/>
+            </a:schemeClr>
+          </a:solidFill>
+          <a:ln>
+            <a:solidFill>
+              <a:schemeClr val="accent4">
+                <a:lumMod val="75000"/>
+              </a:schemeClr>
+            </a:solidFill>
+          </a:ln>
+        </p:spPr>
+        <p:style>
+          <a:lnRef idx="2">
+            <a:schemeClr val="accent1">
+              <a:shade val="50000"/>
+            </a:schemeClr>
+          </a:lnRef>
+          <a:fillRef idx="1">
+            <a:schemeClr val="accent1"/>
+          </a:fillRef>
+          <a:effectRef idx="0">
+            <a:schemeClr val="accent1"/>
+          </a:effectRef>
+          <a:fontRef idx="minor">
+            <a:schemeClr val="lt1"/>
+          </a:fontRef>
+        </p:style>
+        <p:txBody>
+          <a:bodyPr rtlCol="0" anchor="ctr"/>
+          <a:lstStyle/>
+          <a:p>
+            <a:pPr algn="ctr"/>
+            <a:r>
+              <a:rPr lang="en-US" sz="933" dirty="0">
+                <a:solidFill>
+                  <a:schemeClr val="tx1"/>
+                </a:solidFill>
+                <a:latin typeface="Arial" panose="020B0604020202020204" pitchFamily="34" charset="0"/>
+                <a:ea typeface="Menlo" panose="020B0609030804020204" pitchFamily="49" charset="0"/>
+                <a:cs typeface="Arial" panose="020B0604020202020204" pitchFamily="34" charset="0"/>
+              </a:rPr>
+              <a:t>ZAAS</a:t>
+            </a:r>
+          </a:p>
+        </p:txBody>
+      </p:sp>
+      <p:cxnSp>
+        <p:nvCxnSpPr>
+          <p:cNvPr id="5" name="Straight Arrow Connector 4">
+            <a:extLst>
+              <a:ext uri="{FF2B5EF4-FFF2-40B4-BE49-F238E27FC236}">
+                <a16:creationId xmlns:a16="http://schemas.microsoft.com/office/drawing/2014/main" id="{427435EC-7131-9B0E-AD49-32E3CDDEA255}"/>
+              </a:ext>
+            </a:extLst>
+          </p:cNvPr>
+          <p:cNvCxnSpPr>
+            <a:cxnSpLocks/>
+          </p:cNvCxnSpPr>
+          <p:nvPr/>
+        </p:nvCxnSpPr>
+        <p:spPr>
+          <a:xfrm>
+            <a:off x="4147132" y="3059963"/>
+            <a:ext cx="0" cy="304147"/>
+          </a:xfrm>
+          <a:prstGeom prst="straightConnector1">
+            <a:avLst/>
+          </a:prstGeom>
+          <a:ln>
+            <a:headEnd type="triangle"/>
+            <a:tailEnd type="triangle"/>
+          </a:ln>
+        </p:spPr>
+        <p:style>
+          <a:lnRef idx="1">
+            <a:schemeClr val="accent1"/>
+          </a:lnRef>
+          <a:fillRef idx="0">
+            <a:schemeClr val="accent1"/>
+          </a:fillRef>
+          <a:effectRef idx="0">
+            <a:schemeClr val="accent1"/>
+          </a:effectRef>
+          <a:fontRef idx="minor">
+            <a:schemeClr val="tx1"/>
+          </a:fontRef>
+        </p:style>
+      </p:cxnSp>
     </p:spTree>
     <p:extLst>
       <p:ext uri="{BB962C8B-B14F-4D97-AF65-F5344CB8AC3E}">
@@ -15258,6 +15409,157 @@
           </a:extLst>
         </p:spPr>
       </p:pic>
+      <p:sp>
+        <p:nvSpPr>
+          <p:cNvPr id="4" name="Rectangle 3">
+            <a:extLst>
+              <a:ext uri="{FF2B5EF4-FFF2-40B4-BE49-F238E27FC236}">
+                <a16:creationId xmlns:a16="http://schemas.microsoft.com/office/drawing/2014/main" id="{5D3DE8E3-6140-B2DE-CB6F-0569B39CD02E}"/>
+              </a:ext>
+            </a:extLst>
+          </p:cNvPr>
+          <p:cNvSpPr/>
+          <p:nvPr/>
+        </p:nvSpPr>
+        <p:spPr>
+          <a:xfrm>
+            <a:off x="3623682" y="3377488"/>
+            <a:ext cx="768237" cy="360236"/>
+          </a:xfrm>
+          <a:prstGeom prst="rect">
+            <a:avLst/>
+          </a:prstGeom>
+          <a:solidFill>
+            <a:schemeClr val="accent4">
+              <a:lumMod val="60000"/>
+              <a:lumOff val="40000"/>
+              <a:alpha val="97647"/>
+            </a:schemeClr>
+          </a:solidFill>
+          <a:ln>
+            <a:solidFill>
+              <a:schemeClr val="accent4">
+                <a:lumMod val="75000"/>
+              </a:schemeClr>
+            </a:solidFill>
+          </a:ln>
+        </p:spPr>
+        <p:style>
+          <a:lnRef idx="2">
+            <a:schemeClr val="accent1">
+              <a:shade val="50000"/>
+            </a:schemeClr>
+          </a:lnRef>
+          <a:fillRef idx="1">
+            <a:schemeClr val="accent1"/>
+          </a:fillRef>
+          <a:effectRef idx="0">
+            <a:schemeClr val="accent1"/>
+          </a:effectRef>
+          <a:fontRef idx="minor">
+            <a:schemeClr val="lt1"/>
+          </a:fontRef>
+        </p:style>
+        <p:txBody>
+          <a:bodyPr rtlCol="0" anchor="ctr"/>
+          <a:lstStyle/>
+          <a:p>
+            <a:pPr algn="ctr"/>
+            <a:r>
+              <a:rPr lang="en-US" sz="933" dirty="0">
+                <a:solidFill>
+                  <a:schemeClr val="tx1"/>
+                </a:solidFill>
+                <a:latin typeface="Arial" panose="020B0604020202020204" pitchFamily="34" charset="0"/>
+                <a:ea typeface="Menlo" panose="020B0609030804020204" pitchFamily="49" charset="0"/>
+                <a:cs typeface="Arial" panose="020B0604020202020204" pitchFamily="34" charset="0"/>
+              </a:rPr>
+              <a:t>ZAAS</a:t>
+            </a:r>
+          </a:p>
+        </p:txBody>
+      </p:sp>
+      <p:sp>
+        <p:nvSpPr>
+          <p:cNvPr id="5" name="TextBox 4">
+            <a:extLst>
+              <a:ext uri="{FF2B5EF4-FFF2-40B4-BE49-F238E27FC236}">
+                <a16:creationId xmlns:a16="http://schemas.microsoft.com/office/drawing/2014/main" id="{2C4282E9-36DC-254F-C43A-25C9FA69B5E8}"/>
+              </a:ext>
+            </a:extLst>
+          </p:cNvPr>
+          <p:cNvSpPr txBox="1"/>
+          <p:nvPr/>
+        </p:nvSpPr>
+        <p:spPr>
+          <a:xfrm>
+            <a:off x="3708729" y="3118632"/>
+            <a:ext cx="498855" cy="261610"/>
+          </a:xfrm>
+          <a:prstGeom prst="rect">
+            <a:avLst/>
+          </a:prstGeom>
+          <a:noFill/>
+        </p:spPr>
+        <p:txBody>
+          <a:bodyPr wrap="none" rtlCol="0">
+            <a:spAutoFit/>
+          </a:bodyPr>
+          <a:lstStyle/>
+          <a:p>
+            <a:r>
+              <a:rPr lang="en-US" sz="1100" dirty="0">
+                <a:latin typeface="Arial" panose="020B0604020202020204" pitchFamily="34" charset="0"/>
+                <a:ea typeface="Menlo" panose="020B0609030804020204" pitchFamily="49" charset="0"/>
+                <a:cs typeface="Arial" panose="020B0604020202020204" pitchFamily="34" charset="0"/>
+              </a:rPr>
+              <a:t>7563</a:t>
+            </a:r>
+          </a:p>
+        </p:txBody>
+      </p:sp>
+      <p:cxnSp>
+        <p:nvCxnSpPr>
+          <p:cNvPr id="6" name="Straight Arrow Connector 5">
+            <a:extLst>
+              <a:ext uri="{FF2B5EF4-FFF2-40B4-BE49-F238E27FC236}">
+                <a16:creationId xmlns:a16="http://schemas.microsoft.com/office/drawing/2014/main" id="{C9E7ADE6-DC1D-DE38-1508-F1FDD8B273FC}"/>
+              </a:ext>
+            </a:extLst>
+          </p:cNvPr>
+          <p:cNvCxnSpPr>
+            <a:cxnSpLocks/>
+          </p:cNvCxnSpPr>
+          <p:nvPr/>
+        </p:nvCxnSpPr>
+        <p:spPr>
+          <a:xfrm>
+            <a:off x="4212738" y="3084549"/>
+            <a:ext cx="0" cy="304147"/>
+          </a:xfrm>
+          <a:prstGeom prst="straightConnector1">
+            <a:avLst/>
+          </a:prstGeom>
+          <a:ln>
+            <a:headEnd type="triangle"/>
+            <a:tailEnd type="triangle"/>
+          </a:ln>
+        </p:spPr>
+        <p:style>
+          <a:lnRef idx="1">
+            <a:schemeClr val="accent1"/>
+          </a:lnRef>
+          <a:fillRef idx="0">
+            <a:schemeClr val="accent1"/>
+          </a:fillRef>
+          <a:effectRef idx="0">
+            <a:schemeClr val="accent1"/>
+          </a:effectRef>
+          <a:fontRef idx="minor">
+            <a:schemeClr val="tx1"/>
+          </a:fontRef>
+        </p:style>
+      </p:cxnSp>
     </p:spTree>
     <p:extLst>
       <p:ext uri="{BB962C8B-B14F-4D97-AF65-F5344CB8AC3E}">
@@ -21872,7 +22174,7 @@
         <p:spPr>
           <a:xfrm>
             <a:off x="1997322" y="3785400"/>
-            <a:ext cx="979755" cy="215444"/>
+            <a:ext cx="1003801" cy="215444"/>
           </a:xfrm>
           <a:prstGeom prst="rect">
             <a:avLst/>
@@ -22184,6 +22486,157 @@
           </a:extLst>
         </p:spPr>
       </p:pic>
+      <p:sp>
+        <p:nvSpPr>
+          <p:cNvPr id="4" name="TextBox 3">
+            <a:extLst>
+              <a:ext uri="{FF2B5EF4-FFF2-40B4-BE49-F238E27FC236}">
+                <a16:creationId xmlns:a16="http://schemas.microsoft.com/office/drawing/2014/main" id="{659D01F5-8AA7-E975-EB91-AD1AB05DDEAA}"/>
+              </a:ext>
+            </a:extLst>
+          </p:cNvPr>
+          <p:cNvSpPr txBox="1"/>
+          <p:nvPr/>
+        </p:nvSpPr>
+        <p:spPr>
+          <a:xfrm>
+            <a:off x="3857771" y="3117583"/>
+            <a:ext cx="498855" cy="261610"/>
+          </a:xfrm>
+          <a:prstGeom prst="rect">
+            <a:avLst/>
+          </a:prstGeom>
+          <a:noFill/>
+        </p:spPr>
+        <p:txBody>
+          <a:bodyPr wrap="none" rtlCol="0">
+            <a:spAutoFit/>
+          </a:bodyPr>
+          <a:lstStyle/>
+          <a:p>
+            <a:r>
+              <a:rPr lang="en-US" sz="1100" dirty="0">
+                <a:latin typeface="Arial" panose="020B0604020202020204" pitchFamily="34" charset="0"/>
+                <a:ea typeface="Menlo" panose="020B0609030804020204" pitchFamily="49" charset="0"/>
+                <a:cs typeface="Arial" panose="020B0604020202020204" pitchFamily="34" charset="0"/>
+              </a:rPr>
+              <a:t>7563</a:t>
+            </a:r>
+          </a:p>
+        </p:txBody>
+      </p:sp>
+      <p:cxnSp>
+        <p:nvCxnSpPr>
+          <p:cNvPr id="5" name="Straight Arrow Connector 4">
+            <a:extLst>
+              <a:ext uri="{FF2B5EF4-FFF2-40B4-BE49-F238E27FC236}">
+                <a16:creationId xmlns:a16="http://schemas.microsoft.com/office/drawing/2014/main" id="{7F014DD3-9D72-8543-A952-8A9DD650D454}"/>
+              </a:ext>
+            </a:extLst>
+          </p:cNvPr>
+          <p:cNvCxnSpPr>
+            <a:cxnSpLocks/>
+          </p:cNvCxnSpPr>
+          <p:nvPr/>
+        </p:nvCxnSpPr>
+        <p:spPr>
+          <a:xfrm>
+            <a:off x="4361780" y="3083500"/>
+            <a:ext cx="0" cy="304147"/>
+          </a:xfrm>
+          <a:prstGeom prst="straightConnector1">
+            <a:avLst/>
+          </a:prstGeom>
+          <a:ln>
+            <a:headEnd type="triangle"/>
+            <a:tailEnd type="triangle"/>
+          </a:ln>
+        </p:spPr>
+        <p:style>
+          <a:lnRef idx="1">
+            <a:schemeClr val="accent1"/>
+          </a:lnRef>
+          <a:fillRef idx="0">
+            <a:schemeClr val="accent1"/>
+          </a:fillRef>
+          <a:effectRef idx="0">
+            <a:schemeClr val="accent1"/>
+          </a:effectRef>
+          <a:fontRef idx="minor">
+            <a:schemeClr val="tx1"/>
+          </a:fontRef>
+        </p:style>
+      </p:cxnSp>
+      <p:sp>
+        <p:nvSpPr>
+          <p:cNvPr id="6" name="Rectangle 5">
+            <a:extLst>
+              <a:ext uri="{FF2B5EF4-FFF2-40B4-BE49-F238E27FC236}">
+                <a16:creationId xmlns:a16="http://schemas.microsoft.com/office/drawing/2014/main" id="{BFB7C6A2-758A-71B1-80D0-4E0184BA4C6A}"/>
+              </a:ext>
+            </a:extLst>
+          </p:cNvPr>
+          <p:cNvSpPr/>
+          <p:nvPr/>
+        </p:nvSpPr>
+        <p:spPr>
+          <a:xfrm>
+            <a:off x="3828012" y="3417894"/>
+            <a:ext cx="768237" cy="369333"/>
+          </a:xfrm>
+          <a:prstGeom prst="rect">
+            <a:avLst/>
+          </a:prstGeom>
+          <a:solidFill>
+            <a:schemeClr val="accent4">
+              <a:lumMod val="60000"/>
+              <a:lumOff val="40000"/>
+              <a:alpha val="97647"/>
+            </a:schemeClr>
+          </a:solidFill>
+          <a:ln>
+            <a:solidFill>
+              <a:schemeClr val="accent4">
+                <a:lumMod val="75000"/>
+              </a:schemeClr>
+            </a:solidFill>
+          </a:ln>
+        </p:spPr>
+        <p:style>
+          <a:lnRef idx="2">
+            <a:schemeClr val="accent1">
+              <a:shade val="50000"/>
+            </a:schemeClr>
+          </a:lnRef>
+          <a:fillRef idx="1">
+            <a:schemeClr val="accent1"/>
+          </a:fillRef>
+          <a:effectRef idx="0">
+            <a:schemeClr val="accent1"/>
+          </a:effectRef>
+          <a:fontRef idx="minor">
+            <a:schemeClr val="lt1"/>
+          </a:fontRef>
+        </p:style>
+        <p:txBody>
+          <a:bodyPr rtlCol="0" anchor="ctr"/>
+          <a:lstStyle/>
+          <a:p>
+            <a:pPr algn="ctr"/>
+            <a:r>
+              <a:rPr lang="en-US" sz="933" dirty="0">
+                <a:solidFill>
+                  <a:schemeClr val="tx1"/>
+                </a:solidFill>
+                <a:latin typeface="Arial" panose="020B0604020202020204" pitchFamily="34" charset="0"/>
+                <a:ea typeface="Menlo" panose="020B0609030804020204" pitchFamily="49" charset="0"/>
+                <a:cs typeface="Arial" panose="020B0604020202020204" pitchFamily="34" charset="0"/>
+              </a:rPr>
+              <a:t>ZAAS</a:t>
+            </a:r>
+          </a:p>
+        </p:txBody>
+      </p:sp>
     </p:spTree>
     <p:extLst>
       <p:ext uri="{BB962C8B-B14F-4D97-AF65-F5344CB8AC3E}">

</xml_diff>

<commit_message>
Add ZAAS to the HA Scheme
Signed-off-by: Jakub Balhar <jakub.balhar@broadcom.com>
</commit_message>
<xml_diff>
--- a/docs/images/common/zowe-architecture.pptx
+++ b/docs/images/common/zowe-architecture.pptx
@@ -246,7 +246,7 @@
   </p:defaultTextStyle>
   <p:extLst>
     <p:ext uri="GoogleSlidesCustomDataVersion2">
-      <go:slidesCustomData xmlns:go="http://customooxmlschemas.google.com/" r:id="rId9" roundtripDataSignature="AMtx7mjkTUxg1ishM/4h+WttSxTiWjdPGA=="/>
+      <go:slidesCustomData xmlns:go="http://customooxmlschemas.google.com/" r:id="rId9" roundtripDataSignature="AMtx7mgGDU9oZGI7lhEEDRdaq6ztqYV2qw=="/>
     </p:ext>
   </p:extLst>
 </p:presentation>
@@ -30630,7 +30630,7 @@
         <p:spPr>
           <a:xfrm>
             <a:off x="3542920" y="1779746"/>
-            <a:ext cx="0" cy="1174365"/>
+            <a:ext cx="0" cy="1174500"/>
           </a:xfrm>
           <a:prstGeom prst="straightConnector1">
             <a:avLst/>
@@ -30782,7 +30782,7 @@
         <p:spPr>
           <a:xfrm>
             <a:off x="3649521" y="2573183"/>
-            <a:ext cx="536683" cy="261610"/>
+            <a:ext cx="536700" cy="261600"/>
           </a:xfrm>
           <a:prstGeom prst="rect">
             <a:avLst/>
@@ -30996,7 +30996,7 @@
         <p:spPr>
           <a:xfrm>
             <a:off x="3389620" y="2954111"/>
-            <a:ext cx="723375" cy="369333"/>
+            <a:ext cx="723300" cy="369300"/>
           </a:xfrm>
           <a:prstGeom prst="rect">
             <a:avLst/>
@@ -31355,8 +31355,8 @@
         </p:nvSpPr>
         <p:spPr>
           <a:xfrm>
-            <a:off x="8324578" y="3782434"/>
-            <a:ext cx="670956" cy="351196"/>
+            <a:off x="8668703" y="3850009"/>
+            <a:ext cx="671100" cy="351300"/>
           </a:xfrm>
           <a:prstGeom prst="rect">
             <a:avLst/>
@@ -31441,8 +31441,8 @@
         </p:nvCxnSpPr>
         <p:spPr>
           <a:xfrm>
-            <a:off x="8749815" y="1776034"/>
-            <a:ext cx="0" cy="2028649"/>
+            <a:off x="9039525" y="1757525"/>
+            <a:ext cx="11400" cy="2097300"/>
           </a:xfrm>
           <a:prstGeom prst="straightConnector1">
             <a:avLst/>
@@ -31593,8 +31593,8 @@
         </p:nvSpPr>
         <p:spPr>
           <a:xfrm>
-            <a:off x="8261704" y="3543073"/>
-            <a:ext cx="536683" cy="261610"/>
+            <a:off x="8132004" y="3982623"/>
+            <a:ext cx="536700" cy="261600"/>
           </a:xfrm>
           <a:prstGeom prst="rect">
             <a:avLst/>
@@ -32120,17 +32120,19 @@
       <p:cxnSp>
         <p:nvCxnSpPr>
           <p:cNvPr id="466" name="Google Shape;466;p4"/>
-          <p:cNvCxnSpPr/>
+          <p:cNvCxnSpPr>
+            <a:endCxn id="455" idx="1"/>
+          </p:cNvCxnSpPr>
           <p:nvPr/>
         </p:nvCxnSpPr>
         <p:spPr>
           <a:xfrm>
-            <a:off x="3080215" y="1755404"/>
-            <a:ext cx="4368900" cy="1770300"/>
+            <a:off x="3205653" y="1757288"/>
+            <a:ext cx="4243500" cy="1664700"/>
           </a:xfrm>
           <a:prstGeom prst="bentConnector3">
             <a:avLst>
-              <a:gd fmla="val -139" name="adj1"/>
+              <a:gd fmla="val -95" name="adj1"/>
             </a:avLst>
           </a:prstGeom>
           <a:noFill/>
@@ -32221,12 +32223,12 @@
         </p:nvCxnSpPr>
         <p:spPr>
           <a:xfrm>
-            <a:off x="2824522" y="1771290"/>
-            <a:ext cx="5500200" cy="2138400"/>
+            <a:off x="2789900" y="1745225"/>
+            <a:ext cx="5861100" cy="2237400"/>
           </a:xfrm>
           <a:prstGeom prst="bentConnector3">
             <a:avLst>
-              <a:gd fmla="val 124" name="adj1"/>
+              <a:gd fmla="val -105" name="adj1"/>
             </a:avLst>
           </a:prstGeom>
           <a:noFill/>
@@ -34062,6 +34064,342 @@
           </a:p>
         </p:txBody>
       </p:sp>
+      <p:sp>
+        <p:nvSpPr>
+          <p:cNvPr id="512" name="Google Shape;512;p4"/>
+          <p:cNvSpPr/>
+          <p:nvPr/>
+        </p:nvSpPr>
+        <p:spPr>
+          <a:xfrm>
+            <a:off x="2985824" y="3471902"/>
+            <a:ext cx="624600" cy="276900"/>
+          </a:xfrm>
+          <a:prstGeom prst="rect">
+            <a:avLst/>
+          </a:prstGeom>
+          <a:solidFill>
+            <a:srgbClr val="FFD966">
+              <a:alpha val="97250"/>
+            </a:srgbClr>
+          </a:solidFill>
+          <a:ln cap="flat" cmpd="sng" w="12700">
+            <a:solidFill>
+              <a:srgbClr val="BF9000"/>
+            </a:solidFill>
+            <a:prstDash val="solid"/>
+            <a:miter lim="800000"/>
+            <a:headEnd len="sm" w="sm" type="none"/>
+            <a:tailEnd len="sm" w="sm" type="none"/>
+          </a:ln>
+        </p:spPr>
+        <p:txBody>
+          <a:bodyPr anchorCtr="0" anchor="ctr" bIns="45700" lIns="91425" spcFirstLastPara="1" rIns="91425" wrap="square" tIns="45700">
+            <a:noAutofit/>
+          </a:bodyPr>
+          <a:lstStyle/>
+          <a:p>
+            <a:pPr indent="0" lvl="0" marL="0" marR="0" rtl="0" algn="ctr">
+              <a:spcBef>
+                <a:spcPts val="0"/>
+              </a:spcBef>
+              <a:spcAft>
+                <a:spcPts val="0"/>
+              </a:spcAft>
+              <a:buNone/>
+            </a:pPr>
+            <a:r>
+              <a:rPr lang="en-US" sz="933">
+                <a:solidFill>
+                  <a:schemeClr val="dk1"/>
+                </a:solidFill>
+              </a:rPr>
+              <a:t>ZAAS</a:t>
+            </a:r>
+            <a:endParaRPr/>
+          </a:p>
+        </p:txBody>
+      </p:sp>
+      <p:cxnSp>
+        <p:nvCxnSpPr>
+          <p:cNvPr id="513" name="Google Shape;513;p4"/>
+          <p:cNvCxnSpPr/>
+          <p:nvPr/>
+        </p:nvCxnSpPr>
+        <p:spPr>
+          <a:xfrm>
+            <a:off x="3012720" y="1763684"/>
+            <a:ext cx="10800" cy="1689900"/>
+          </a:xfrm>
+          <a:prstGeom prst="straightConnector1">
+            <a:avLst/>
+          </a:prstGeom>
+          <a:noFill/>
+          <a:ln cap="flat" cmpd="sng" w="12700">
+            <a:solidFill>
+              <a:srgbClr val="00B050"/>
+            </a:solidFill>
+            <a:prstDash val="solid"/>
+            <a:miter lim="800000"/>
+            <a:headEnd len="sm" w="sm" type="none"/>
+            <a:tailEnd len="med" w="med" type="triangle"/>
+          </a:ln>
+        </p:spPr>
+      </p:cxnSp>
+      <p:sp>
+        <p:nvSpPr>
+          <p:cNvPr id="514" name="Google Shape;514;p4"/>
+          <p:cNvSpPr txBox="1"/>
+          <p:nvPr/>
+        </p:nvSpPr>
+        <p:spPr>
+          <a:xfrm>
+            <a:off x="3607896" y="3417346"/>
+            <a:ext cx="536700" cy="261600"/>
+          </a:xfrm>
+          <a:prstGeom prst="rect">
+            <a:avLst/>
+          </a:prstGeom>
+          <a:noFill/>
+          <a:ln>
+            <a:noFill/>
+          </a:ln>
+        </p:spPr>
+        <p:txBody>
+          <a:bodyPr anchorCtr="0" anchor="t" bIns="45700" lIns="91425" spcFirstLastPara="1" rIns="91425" wrap="square" tIns="45700">
+            <a:spAutoFit/>
+          </a:bodyPr>
+          <a:lstStyle/>
+          <a:p>
+            <a:pPr indent="0" lvl="0" marL="0" marR="0" rtl="0" algn="l">
+              <a:spcBef>
+                <a:spcPts val="0"/>
+              </a:spcBef>
+              <a:spcAft>
+                <a:spcPts val="0"/>
+              </a:spcAft>
+              <a:buNone/>
+            </a:pPr>
+            <a:r>
+              <a:rPr lang="en-US" sz="1100">
+                <a:solidFill>
+                  <a:schemeClr val="dk1"/>
+                </a:solidFill>
+                <a:latin typeface="Arial"/>
+                <a:ea typeface="Arial"/>
+                <a:cs typeface="Arial"/>
+                <a:sym typeface="Arial"/>
+              </a:rPr>
+              <a:t>755</a:t>
+            </a:r>
+            <a:r>
+              <a:rPr lang="en-US" sz="1100">
+                <a:solidFill>
+                  <a:schemeClr val="dk1"/>
+                </a:solidFill>
+              </a:rPr>
+              <a:t>8</a:t>
+            </a:r>
+            <a:endParaRPr/>
+          </a:p>
+        </p:txBody>
+      </p:sp>
+      <p:cxnSp>
+        <p:nvCxnSpPr>
+          <p:cNvPr id="515" name="Google Shape;515;p4"/>
+          <p:cNvCxnSpPr/>
+          <p:nvPr/>
+        </p:nvCxnSpPr>
+        <p:spPr>
+          <a:xfrm flipH="1">
+            <a:off x="3656447" y="1736378"/>
+            <a:ext cx="4950300" cy="1956900"/>
+          </a:xfrm>
+          <a:prstGeom prst="bentConnector3">
+            <a:avLst>
+              <a:gd fmla="val 7147" name="adj1"/>
+            </a:avLst>
+          </a:prstGeom>
+          <a:noFill/>
+          <a:ln cap="flat" cmpd="sng" w="12700">
+            <a:solidFill>
+              <a:schemeClr val="accent1"/>
+            </a:solidFill>
+            <a:prstDash val="solid"/>
+            <a:miter lim="800000"/>
+            <a:headEnd len="sm" w="sm" type="none"/>
+            <a:tailEnd len="med" w="med" type="triangle"/>
+          </a:ln>
+        </p:spPr>
+      </p:cxnSp>
+      <p:sp>
+        <p:nvSpPr>
+          <p:cNvPr id="516" name="Google Shape;516;p4"/>
+          <p:cNvSpPr/>
+          <p:nvPr/>
+        </p:nvSpPr>
+        <p:spPr>
+          <a:xfrm>
+            <a:off x="8285499" y="3441225"/>
+            <a:ext cx="624600" cy="351300"/>
+          </a:xfrm>
+          <a:prstGeom prst="rect">
+            <a:avLst/>
+          </a:prstGeom>
+          <a:solidFill>
+            <a:srgbClr val="FFD966">
+              <a:alpha val="97250"/>
+            </a:srgbClr>
+          </a:solidFill>
+          <a:ln cap="flat" cmpd="sng" w="12700">
+            <a:solidFill>
+              <a:srgbClr val="BF9000"/>
+            </a:solidFill>
+            <a:prstDash val="solid"/>
+            <a:miter lim="800000"/>
+            <a:headEnd len="sm" w="sm" type="none"/>
+            <a:tailEnd len="sm" w="sm" type="none"/>
+          </a:ln>
+        </p:spPr>
+        <p:txBody>
+          <a:bodyPr anchorCtr="0" anchor="ctr" bIns="45700" lIns="91425" spcFirstLastPara="1" rIns="91425" wrap="square" tIns="45700">
+            <a:noAutofit/>
+          </a:bodyPr>
+          <a:lstStyle/>
+          <a:p>
+            <a:pPr indent="0" lvl="0" marL="0" marR="0" rtl="0" algn="ctr">
+              <a:spcBef>
+                <a:spcPts val="0"/>
+              </a:spcBef>
+              <a:spcAft>
+                <a:spcPts val="0"/>
+              </a:spcAft>
+              <a:buNone/>
+            </a:pPr>
+            <a:r>
+              <a:rPr lang="en-US" sz="933">
+                <a:solidFill>
+                  <a:schemeClr val="dk1"/>
+                </a:solidFill>
+              </a:rPr>
+              <a:t>ZAAS</a:t>
+            </a:r>
+            <a:endParaRPr/>
+          </a:p>
+        </p:txBody>
+      </p:sp>
+      <p:sp>
+        <p:nvSpPr>
+          <p:cNvPr id="517" name="Google Shape;517;p4"/>
+          <p:cNvSpPr txBox="1"/>
+          <p:nvPr/>
+        </p:nvSpPr>
+        <p:spPr>
+          <a:xfrm>
+            <a:off x="8471859" y="3140146"/>
+            <a:ext cx="536700" cy="261600"/>
+          </a:xfrm>
+          <a:prstGeom prst="rect">
+            <a:avLst/>
+          </a:prstGeom>
+          <a:noFill/>
+          <a:ln>
+            <a:noFill/>
+          </a:ln>
+        </p:spPr>
+        <p:txBody>
+          <a:bodyPr anchorCtr="0" anchor="t" bIns="45700" lIns="91425" spcFirstLastPara="1" rIns="91425" wrap="square" tIns="45700">
+            <a:spAutoFit/>
+          </a:bodyPr>
+          <a:lstStyle/>
+          <a:p>
+            <a:pPr indent="0" lvl="0" marL="0" marR="0" rtl="0" algn="l">
+              <a:spcBef>
+                <a:spcPts val="0"/>
+              </a:spcBef>
+              <a:spcAft>
+                <a:spcPts val="0"/>
+              </a:spcAft>
+              <a:buNone/>
+            </a:pPr>
+            <a:r>
+              <a:rPr lang="en-US" sz="1100">
+                <a:solidFill>
+                  <a:schemeClr val="dk1"/>
+                </a:solidFill>
+                <a:latin typeface="Arial"/>
+                <a:ea typeface="Arial"/>
+                <a:cs typeface="Arial"/>
+                <a:sym typeface="Arial"/>
+              </a:rPr>
+              <a:t>755</a:t>
+            </a:r>
+            <a:r>
+              <a:rPr lang="en-US" sz="1100">
+                <a:solidFill>
+                  <a:schemeClr val="dk1"/>
+                </a:solidFill>
+              </a:rPr>
+              <a:t>8</a:t>
+            </a:r>
+            <a:endParaRPr/>
+          </a:p>
+        </p:txBody>
+      </p:sp>
+      <p:cxnSp>
+        <p:nvCxnSpPr>
+          <p:cNvPr id="518" name="Google Shape;518;p4"/>
+          <p:cNvCxnSpPr/>
+          <p:nvPr/>
+        </p:nvCxnSpPr>
+        <p:spPr>
+          <a:xfrm>
+            <a:off x="8485225" y="1725150"/>
+            <a:ext cx="7500" cy="1710000"/>
+          </a:xfrm>
+          <a:prstGeom prst="straightConnector1">
+            <a:avLst/>
+          </a:prstGeom>
+          <a:noFill/>
+          <a:ln cap="flat" cmpd="sng" w="12700">
+            <a:solidFill>
+              <a:schemeClr val="accent1"/>
+            </a:solidFill>
+            <a:prstDash val="solid"/>
+            <a:miter lim="800000"/>
+            <a:headEnd len="sm" w="sm" type="none"/>
+            <a:tailEnd len="med" w="med" type="triangle"/>
+          </a:ln>
+        </p:spPr>
+      </p:cxnSp>
+      <p:cxnSp>
+        <p:nvCxnSpPr>
+          <p:cNvPr id="519" name="Google Shape;519;p4"/>
+          <p:cNvCxnSpPr/>
+          <p:nvPr/>
+        </p:nvCxnSpPr>
+        <p:spPr>
+          <a:xfrm>
+            <a:off x="2858138" y="1743400"/>
+            <a:ext cx="5431800" cy="2066700"/>
+          </a:xfrm>
+          <a:prstGeom prst="bentConnector3">
+            <a:avLst>
+              <a:gd fmla="val 101" name="adj1"/>
+            </a:avLst>
+          </a:prstGeom>
+          <a:noFill/>
+          <a:ln cap="flat" cmpd="sng" w="12700">
+            <a:solidFill>
+              <a:srgbClr val="00B050"/>
+            </a:solidFill>
+            <a:prstDash val="solid"/>
+            <a:miter lim="800000"/>
+            <a:headEnd len="sm" w="sm" type="none"/>
+            <a:tailEnd len="med" w="med" type="triangle"/>
+          </a:ln>
+        </p:spPr>
+      </p:cxnSp>
     </p:spTree>
   </p:cSld>
   <p:clrMapOvr>

</xml_diff>